<commit_message>
added credits and next step slides
</commit_message>
<xml_diff>
--- a/docs/project_management/external_meetings/ICR Workspace Mtg Sept 2008 Slides.pptx
+++ b/docs/project_management/external_meetings/ICR Workspace Mtg Sept 2008 Slides.pptx
@@ -8,6 +8,7 @@
     <p:sldId id="257" r:id="rId2"/>
     <p:sldId id="260" r:id="rId3"/>
     <p:sldId id="261" r:id="rId4"/>
+    <p:sldId id="262" r:id="rId5"/>
   </p:sldIdLst>
   <p:sldSz cx="9144000" cy="6858000" type="screen4x3"/>
   <p:notesSz cx="6858000" cy="9144000"/>
@@ -291,7 +292,7 @@
             <a:fld id="{BFF0141B-3676-46F2-8A5A-C346ECA90DD6}" type="datetimeFigureOut">
               <a:rPr lang="en-US" smtClean="0"/>
               <a:pPr/>
-              <a:t>9/10/2008</a:t>
+              <a:t>9/15/2008</a:t>
             </a:fld>
             <a:endParaRPr lang="en-US"/>
           </a:p>
@@ -458,7 +459,7 @@
             <a:fld id="{BFF0141B-3676-46F2-8A5A-C346ECA90DD6}" type="datetimeFigureOut">
               <a:rPr lang="en-US" smtClean="0"/>
               <a:pPr/>
-              <a:t>9/10/2008</a:t>
+              <a:t>9/15/2008</a:t>
             </a:fld>
             <a:endParaRPr lang="en-US"/>
           </a:p>
@@ -635,7 +636,7 @@
             <a:fld id="{BFF0141B-3676-46F2-8A5A-C346ECA90DD6}" type="datetimeFigureOut">
               <a:rPr lang="en-US" smtClean="0"/>
               <a:pPr/>
-              <a:t>9/10/2008</a:t>
+              <a:t>9/15/2008</a:t>
             </a:fld>
             <a:endParaRPr lang="en-US"/>
           </a:p>
@@ -802,7 +803,7 @@
             <a:fld id="{BFF0141B-3676-46F2-8A5A-C346ECA90DD6}" type="datetimeFigureOut">
               <a:rPr lang="en-US" smtClean="0"/>
               <a:pPr/>
-              <a:t>9/10/2008</a:t>
+              <a:t>9/15/2008</a:t>
             </a:fld>
             <a:endParaRPr lang="en-US"/>
           </a:p>
@@ -1045,7 +1046,7 @@
             <a:fld id="{BFF0141B-3676-46F2-8A5A-C346ECA90DD6}" type="datetimeFigureOut">
               <a:rPr lang="en-US" smtClean="0"/>
               <a:pPr/>
-              <a:t>9/10/2008</a:t>
+              <a:t>9/15/2008</a:t>
             </a:fld>
             <a:endParaRPr lang="en-US"/>
           </a:p>
@@ -1330,7 +1331,7 @@
             <a:fld id="{BFF0141B-3676-46F2-8A5A-C346ECA90DD6}" type="datetimeFigureOut">
               <a:rPr lang="en-US" smtClean="0"/>
               <a:pPr/>
-              <a:t>9/10/2008</a:t>
+              <a:t>9/15/2008</a:t>
             </a:fld>
             <a:endParaRPr lang="en-US"/>
           </a:p>
@@ -1749,7 +1750,7 @@
             <a:fld id="{BFF0141B-3676-46F2-8A5A-C346ECA90DD6}" type="datetimeFigureOut">
               <a:rPr lang="en-US" smtClean="0"/>
               <a:pPr/>
-              <a:t>9/10/2008</a:t>
+              <a:t>9/15/2008</a:t>
             </a:fld>
             <a:endParaRPr lang="en-US"/>
           </a:p>
@@ -1864,7 +1865,7 @@
             <a:fld id="{BFF0141B-3676-46F2-8A5A-C346ECA90DD6}" type="datetimeFigureOut">
               <a:rPr lang="en-US" smtClean="0"/>
               <a:pPr/>
-              <a:t>9/10/2008</a:t>
+              <a:t>9/15/2008</a:t>
             </a:fld>
             <a:endParaRPr lang="en-US"/>
           </a:p>
@@ -1956,7 +1957,7 @@
             <a:fld id="{BFF0141B-3676-46F2-8A5A-C346ECA90DD6}" type="datetimeFigureOut">
               <a:rPr lang="en-US" smtClean="0"/>
               <a:pPr/>
-              <a:t>9/10/2008</a:t>
+              <a:t>9/15/2008</a:t>
             </a:fld>
             <a:endParaRPr lang="en-US"/>
           </a:p>
@@ -2230,7 +2231,7 @@
             <a:fld id="{BFF0141B-3676-46F2-8A5A-C346ECA90DD6}" type="datetimeFigureOut">
               <a:rPr lang="en-US" smtClean="0"/>
               <a:pPr/>
-              <a:t>9/10/2008</a:t>
+              <a:t>9/15/2008</a:t>
             </a:fld>
             <a:endParaRPr lang="en-US"/>
           </a:p>
@@ -2480,7 +2481,7 @@
             <a:fld id="{BFF0141B-3676-46F2-8A5A-C346ECA90DD6}" type="datetimeFigureOut">
               <a:rPr lang="en-US" smtClean="0"/>
               <a:pPr/>
-              <a:t>9/10/2008</a:t>
+              <a:t>9/15/2008</a:t>
             </a:fld>
             <a:endParaRPr lang="en-US"/>
           </a:p>
@@ -2690,7 +2691,7 @@
             <a:fld id="{BFF0141B-3676-46F2-8A5A-C346ECA90DD6}" type="datetimeFigureOut">
               <a:rPr lang="en-US" smtClean="0"/>
               <a:pPr/>
-              <a:t>9/10/2008</a:t>
+              <a:t>9/15/2008</a:t>
             </a:fld>
             <a:endParaRPr lang="en-US"/>
           </a:p>
@@ -6931,7 +6932,7 @@
         <p:spPr/>
         <p:txBody>
           <a:bodyPr>
-            <a:normAutofit fontScale="92500" lnSpcReduction="20000"/>
+            <a:normAutofit fontScale="92500" lnSpcReduction="10000"/>
           </a:bodyPr>
           <a:lstStyle/>
           <a:p>
@@ -6957,37 +6958,38 @@
           <a:p>
             <a:r>
               <a:rPr lang="en-US" dirty="0" smtClean="0"/>
-              <a:t>Write complex queries to test hypotheses and </a:t>
+              <a:t>Write complex </a:t>
             </a:r>
             <a:r>
               <a:rPr lang="en-US" dirty="0" smtClean="0"/>
-              <a:t>publish</a:t>
-            </a:r>
+              <a:t>queries</a:t>
+            </a:r>
+            <a:endParaRPr lang="en-US" dirty="0" smtClean="0"/>
+          </a:p>
+          <a:p>
+            <a:pPr lvl="1"/>
             <a:r>
               <a:rPr lang="en-US" dirty="0" smtClean="0"/>
-              <a:t> </a:t>
-            </a:r>
+              <a:t>Join across clinical, microarray and image data</a:t>
+            </a:r>
+          </a:p>
+          <a:p>
+            <a:pPr lvl="1"/>
             <a:r>
               <a:rPr lang="en-US" dirty="0" smtClean="0"/>
-              <a:t>data sets</a:t>
-            </a:r>
-          </a:p>
-          <a:p>
-            <a:pPr lvl="1"/>
+              <a:t>Publish queries </a:t>
+            </a:r>
             <a:r>
               <a:rPr lang="en-US" dirty="0" smtClean="0"/>
-              <a:t>Join across clinical, microarray and image </a:t>
+              <a:t>to other users that </a:t>
             </a:r>
             <a:r>
               <a:rPr lang="en-US" dirty="0" smtClean="0"/>
-              <a:t>data</a:t>
-            </a:r>
-          </a:p>
-          <a:p>
-            <a:pPr lvl="1"/>
+              <a:t>return lists of interesting genes, subjects and/or </a:t>
+            </a:r>
             <a:r>
               <a:rPr lang="en-US" dirty="0" smtClean="0"/>
-              <a:t>Publish queries that return lists of interesting genes, subjects and/or images.</a:t>
+              <a:t>images</a:t>
             </a:r>
             <a:endParaRPr lang="en-US" dirty="0" smtClean="0"/>
           </a:p>
@@ -7016,11 +7018,7 @@
             </a:r>
             <a:r>
               <a:rPr lang="en-US" dirty="0" smtClean="0"/>
-              <a:t> </a:t>
-            </a:r>
-            <a:r>
-              <a:rPr lang="en-US" dirty="0" smtClean="0"/>
-              <a:t>or </a:t>
+              <a:t> or </a:t>
             </a:r>
             <a:r>
               <a:rPr lang="en-US" dirty="0" err="1" smtClean="0"/>
@@ -7102,13 +7100,77 @@
           <a:p>
             <a:r>
               <a:rPr lang="en-US" dirty="0" smtClean="0"/>
-              <a:t>Schedule?</a:t>
-            </a:r>
-          </a:p>
-          <a:p>
+              <a:t>Schedule</a:t>
+            </a:r>
+          </a:p>
+          <a:p>
+            <a:pPr lvl="1"/>
             <a:r>
               <a:rPr lang="en-US" dirty="0" smtClean="0"/>
-              <a:t>Future Directions?</a:t>
+              <a:t>Version 1.0 on mm/</a:t>
+            </a:r>
+            <a:r>
+              <a:rPr lang="en-US" dirty="0" err="1" smtClean="0"/>
+              <a:t>dd</a:t>
+            </a:r>
+            <a:r>
+              <a:rPr lang="en-US" dirty="0" smtClean="0"/>
+              <a:t>/</a:t>
+            </a:r>
+            <a:r>
+              <a:rPr lang="en-US" dirty="0" err="1" smtClean="0"/>
+              <a:t>yy</a:t>
+            </a:r>
+            <a:r>
+              <a:rPr lang="en-US" dirty="0" smtClean="0"/>
+              <a:t>?</a:t>
+            </a:r>
+          </a:p>
+          <a:p>
+            <a:r>
+              <a:rPr lang="en-US" dirty="0" smtClean="0"/>
+              <a:t>Hosting Details?</a:t>
+            </a:r>
+            <a:endParaRPr lang="en-US" dirty="0" smtClean="0"/>
+          </a:p>
+          <a:p>
+            <a:r>
+              <a:rPr lang="en-US" dirty="0" smtClean="0"/>
+              <a:t>Future </a:t>
+            </a:r>
+            <a:r>
+              <a:rPr lang="en-US" dirty="0" smtClean="0"/>
+              <a:t>Directions</a:t>
+            </a:r>
+          </a:p>
+          <a:p>
+            <a:pPr lvl="1"/>
+            <a:r>
+              <a:rPr lang="en-US" dirty="0" smtClean="0"/>
+              <a:t>Incorporate other types of genomic data such as copy number, </a:t>
+            </a:r>
+            <a:r>
+              <a:rPr lang="en-US" dirty="0" err="1" smtClean="0"/>
+              <a:t>methylation</a:t>
+            </a:r>
+            <a:r>
+              <a:rPr lang="en-US" dirty="0" smtClean="0"/>
+              <a:t>, and genotypes</a:t>
+            </a:r>
+          </a:p>
+          <a:p>
+            <a:pPr lvl="1"/>
+            <a:r>
+              <a:rPr lang="en-US" dirty="0" smtClean="0"/>
+              <a:t>Tighter integration with </a:t>
+            </a:r>
+            <a:r>
+              <a:rPr lang="en-US" dirty="0" err="1" smtClean="0"/>
+              <a:t>GenePattern</a:t>
+            </a:r>
+            <a:r>
+              <a:rPr lang="en-US" dirty="0" smtClean="0"/>
+              <a:t> and other analysis tools</a:t>
             </a:r>
             <a:endParaRPr lang="en-US" dirty="0"/>
           </a:p>
@@ -7126,6 +7188,266 @@
       </p:par>
     </p:tnLst>
   </p:timing>
+</p:sld>
+</file>
+
+<file path=ppt/slides/slide4.xml><?xml version="1.0" encoding="utf-8"?>
+<p:sld xmlns:a="http://schemas.openxmlformats.org/drawingml/2006/main" xmlns:r="http://schemas.openxmlformats.org/officeDocument/2006/relationships" xmlns:p="http://schemas.openxmlformats.org/presentationml/2006/main">
+  <p:cSld>
+    <p:spTree>
+      <p:nvGrpSpPr>
+        <p:cNvPr id="1" name=""/>
+        <p:cNvGrpSpPr/>
+        <p:nvPr/>
+      </p:nvGrpSpPr>
+      <p:grpSpPr>
+        <a:xfrm>
+          <a:off x="0" y="0"/>
+          <a:ext cx="0" cy="0"/>
+          <a:chOff x="0" y="0"/>
+          <a:chExt cx="0" cy="0"/>
+        </a:xfrm>
+      </p:grpSpPr>
+      <p:sp>
+        <p:nvSpPr>
+          <p:cNvPr id="2" name="Title 1"/>
+          <p:cNvSpPr>
+            <a:spLocks noGrp="1"/>
+          </p:cNvSpPr>
+          <p:nvPr>
+            <p:ph type="title"/>
+          </p:nvPr>
+        </p:nvSpPr>
+        <p:spPr/>
+        <p:txBody>
+          <a:bodyPr/>
+          <a:lstStyle/>
+          <a:p>
+            <a:r>
+              <a:rPr lang="en-US" dirty="0" smtClean="0"/>
+              <a:t>Credits</a:t>
+            </a:r>
+            <a:endParaRPr lang="en-US" dirty="0"/>
+          </a:p>
+        </p:txBody>
+      </p:sp>
+      <p:sp>
+        <p:nvSpPr>
+          <p:cNvPr id="4" name="Content Placeholder 3"/>
+          <p:cNvSpPr>
+            <a:spLocks noGrp="1"/>
+          </p:cNvSpPr>
+          <p:nvPr>
+            <p:ph sz="half" idx="1"/>
+          </p:nvPr>
+        </p:nvSpPr>
+        <p:spPr/>
+        <p:txBody>
+          <a:bodyPr>
+            <a:normAutofit fontScale="92500" lnSpcReduction="10000"/>
+          </a:bodyPr>
+          <a:lstStyle/>
+          <a:p>
+            <a:r>
+              <a:rPr lang="en-US" dirty="0" smtClean="0"/>
+              <a:t>Developers and Managers</a:t>
+            </a:r>
+          </a:p>
+          <a:p>
+            <a:pPr lvl="1"/>
+            <a:r>
+              <a:rPr lang="en-US" dirty="0" smtClean="0"/>
+              <a:t>TJ </a:t>
+            </a:r>
+            <a:r>
+              <a:rPr lang="en-US" dirty="0" smtClean="0"/>
+              <a:t>Andrews</a:t>
+            </a:r>
+          </a:p>
+          <a:p>
+            <a:pPr lvl="1"/>
+            <a:r>
+              <a:rPr lang="en-US" dirty="0" smtClean="0"/>
+              <a:t>Michael </a:t>
+            </a:r>
+            <a:r>
+              <a:rPr lang="en-US" dirty="0" err="1" smtClean="0"/>
+              <a:t>Holck</a:t>
+            </a:r>
+            <a:endParaRPr lang="en-US" dirty="0" smtClean="0"/>
+          </a:p>
+          <a:p>
+            <a:pPr lvl="1"/>
+            <a:r>
+              <a:rPr lang="en-US" dirty="0" smtClean="0"/>
+              <a:t>Shine Jacob	</a:t>
+            </a:r>
+          </a:p>
+          <a:p>
+            <a:pPr lvl="1"/>
+            <a:r>
+              <a:rPr lang="en-US" dirty="0" smtClean="0"/>
+              <a:t>Mark Lewis</a:t>
+            </a:r>
+          </a:p>
+          <a:p>
+            <a:pPr lvl="1"/>
+            <a:r>
+              <a:rPr lang="en-US" dirty="0" smtClean="0"/>
+              <a:t>JP </a:t>
+            </a:r>
+            <a:r>
+              <a:rPr lang="en-US" dirty="0" err="1" smtClean="0"/>
+              <a:t>Marple</a:t>
+            </a:r>
+            <a:endParaRPr lang="en-US" dirty="0" smtClean="0"/>
+          </a:p>
+          <a:p>
+            <a:pPr lvl="1"/>
+            <a:r>
+              <a:rPr lang="en-US" dirty="0" err="1" smtClean="0"/>
+              <a:t>Sangeetha</a:t>
+            </a:r>
+            <a:r>
+              <a:rPr lang="en-US" dirty="0" smtClean="0"/>
+              <a:t> </a:t>
+            </a:r>
+            <a:r>
+              <a:rPr lang="en-US" dirty="0" err="1" smtClean="0"/>
+              <a:t>Rajagopal</a:t>
+            </a:r>
+            <a:r>
+              <a:rPr lang="en-US" dirty="0" smtClean="0"/>
+              <a:t> </a:t>
+            </a:r>
+          </a:p>
+          <a:p>
+            <a:pPr lvl="1"/>
+            <a:r>
+              <a:rPr lang="en-US" dirty="0" smtClean="0"/>
+              <a:t>Eric </a:t>
+            </a:r>
+            <a:r>
+              <a:rPr lang="en-US" dirty="0" err="1" smtClean="0"/>
+              <a:t>Tavela</a:t>
+            </a:r>
+            <a:endParaRPr lang="en-US" dirty="0" smtClean="0"/>
+          </a:p>
+        </p:txBody>
+      </p:sp>
+      <p:sp>
+        <p:nvSpPr>
+          <p:cNvPr id="5" name="Content Placeholder 4"/>
+          <p:cNvSpPr>
+            <a:spLocks noGrp="1"/>
+          </p:cNvSpPr>
+          <p:nvPr>
+            <p:ph sz="half" idx="2"/>
+          </p:nvPr>
+        </p:nvSpPr>
+        <p:spPr/>
+        <p:txBody>
+          <a:bodyPr>
+            <a:normAutofit fontScale="92500" lnSpcReduction="10000"/>
+          </a:bodyPr>
+          <a:lstStyle/>
+          <a:p>
+            <a:r>
+              <a:rPr lang="en-US" dirty="0" smtClean="0"/>
+              <a:t>Leadership and Requirements</a:t>
+            </a:r>
+          </a:p>
+          <a:p>
+            <a:pPr lvl="1"/>
+            <a:r>
+              <a:rPr lang="en-US" dirty="0" err="1" smtClean="0"/>
+              <a:t>Anand</a:t>
+            </a:r>
+            <a:r>
+              <a:rPr lang="en-US" dirty="0" smtClean="0"/>
+              <a:t> </a:t>
+            </a:r>
+            <a:r>
+              <a:rPr lang="en-US" dirty="0" err="1" smtClean="0"/>
+              <a:t>Basu</a:t>
+            </a:r>
+            <a:endParaRPr lang="en-US" dirty="0" smtClean="0"/>
+          </a:p>
+          <a:p>
+            <a:pPr lvl="1"/>
+            <a:r>
+              <a:rPr lang="en-US" dirty="0" err="1" smtClean="0"/>
+              <a:t>Subhashree</a:t>
+            </a:r>
+            <a:r>
+              <a:rPr lang="en-US" dirty="0" smtClean="0"/>
+              <a:t> </a:t>
+            </a:r>
+            <a:r>
+              <a:rPr lang="en-US" dirty="0" err="1" smtClean="0"/>
+              <a:t>Madhavan</a:t>
+            </a:r>
+            <a:endParaRPr lang="en-US" dirty="0" smtClean="0"/>
+          </a:p>
+          <a:p>
+            <a:pPr lvl="1"/>
+            <a:r>
+              <a:rPr lang="en-US" dirty="0" smtClean="0"/>
+              <a:t>Who else?</a:t>
+            </a:r>
+          </a:p>
+          <a:p>
+            <a:endParaRPr lang="en-US" dirty="0" smtClean="0"/>
+          </a:p>
+          <a:p>
+            <a:r>
+              <a:rPr lang="en-US" dirty="0" smtClean="0"/>
+              <a:t>NCIA</a:t>
+            </a:r>
+          </a:p>
+          <a:p>
+            <a:pPr lvl="1"/>
+            <a:r>
+              <a:rPr lang="en-US" dirty="0" smtClean="0"/>
+              <a:t>Carl Jaffe</a:t>
+            </a:r>
+          </a:p>
+          <a:p>
+            <a:pPr lvl="1"/>
+            <a:r>
+              <a:rPr lang="en-US" dirty="0" smtClean="0"/>
+              <a:t>John </a:t>
+            </a:r>
+            <a:r>
+              <a:rPr lang="en-US" dirty="0" err="1" smtClean="0"/>
+              <a:t>Freymann</a:t>
+            </a:r>
+            <a:endParaRPr lang="en-US" dirty="0" smtClean="0"/>
+          </a:p>
+          <a:p>
+            <a:pPr lvl="1"/>
+            <a:r>
+              <a:rPr lang="en-US" dirty="0" smtClean="0"/>
+              <a:t>Adam Flanders</a:t>
+            </a:r>
+          </a:p>
+          <a:p>
+            <a:pPr lvl="1"/>
+            <a:r>
+              <a:rPr lang="en-US" dirty="0" smtClean="0"/>
+              <a:t>Daniel Rubin</a:t>
+            </a:r>
+          </a:p>
+          <a:p>
+            <a:endParaRPr lang="en-US" dirty="0"/>
+          </a:p>
+        </p:txBody>
+      </p:sp>
+    </p:spTree>
+  </p:cSld>
+  <p:clrMapOvr>
+    <a:masterClrMapping/>
+  </p:clrMapOvr>
 </p:sld>
 </file>
 

</xml_diff>

<commit_message>
more changes, added some comments.
</commit_message>
<xml_diff>
--- a/docs/project_management/external_meetings/ICR Workspace Mtg Sept 2008 Slides.pptx
+++ b/docs/project_management/external_meetings/ICR Workspace Mtg Sept 2008 Slides.pptx
@@ -110,6 +110,30 @@
 </p:presentation>
 </file>
 
+<file path=ppt/commentAuthors.xml><?xml version="1.0" encoding="utf-8"?>
+<p:cmAuthorLst xmlns:a="http://schemas.openxmlformats.org/drawingml/2006/main" xmlns:r="http://schemas.openxmlformats.org/officeDocument/2006/relationships" xmlns:p="http://schemas.openxmlformats.org/presentationml/2006/main">
+  <p:cmAuthor id="0" name="wfitzhugh" initials="w" lastIdx="2" clrIdx="0"/>
+</p:cmAuthorLst>
+</file>
+
+<file path=ppt/comments/comment1.xml><?xml version="1.0" encoding="utf-8"?>
+<p:cmLst xmlns:a="http://schemas.openxmlformats.org/drawingml/2006/main" xmlns:r="http://schemas.openxmlformats.org/officeDocument/2006/relationships" xmlns:p="http://schemas.openxmlformats.org/presentationml/2006/main">
+  <p:cm authorId="0" dt="2008-09-16T16:00:35.694" idx="1">
+    <p:pos x="10" y="10"/>
+    <p:text>should i have preceding slide talking about caIntegrator implementations (rembrandt, i-spy) in more detail?</p:text>
+  </p:cm>
+</p:cmLst>
+</file>
+
+<file path=ppt/comments/comment2.xml><?xml version="1.0" encoding="utf-8"?>
+<p:cmLst xmlns:a="http://schemas.openxmlformats.org/drawingml/2006/main" xmlns:r="http://schemas.openxmlformats.org/officeDocument/2006/relationships" xmlns:p="http://schemas.openxmlformats.org/presentationml/2006/main">
+  <p:cm authorId="0" dt="2008-09-16T16:01:31.526" idx="2">
+    <p:pos x="10" y="10"/>
+    <p:text>how technical is the audience?  do we want any model diagrams or anything?</p:text>
+  </p:cm>
+</p:cmLst>
+</file>
+
 <file path=ppt/slideLayouts/slideLayout1.xml><?xml version="1.0" encoding="utf-8"?>
 <p:sldLayout xmlns:a="http://schemas.openxmlformats.org/drawingml/2006/main" xmlns:r="http://schemas.openxmlformats.org/officeDocument/2006/relationships" xmlns:p="http://schemas.openxmlformats.org/presentationml/2006/main" type="title" preserve="1">
   <p:cSld name="Title Slide">
@@ -292,7 +316,7 @@
             <a:fld id="{BFF0141B-3676-46F2-8A5A-C346ECA90DD6}" type="datetimeFigureOut">
               <a:rPr lang="en-US" smtClean="0"/>
               <a:pPr/>
-              <a:t>9/15/2008</a:t>
+              <a:t>9/16/2008</a:t>
             </a:fld>
             <a:endParaRPr lang="en-US"/>
           </a:p>
@@ -459,7 +483,7 @@
             <a:fld id="{BFF0141B-3676-46F2-8A5A-C346ECA90DD6}" type="datetimeFigureOut">
               <a:rPr lang="en-US" smtClean="0"/>
               <a:pPr/>
-              <a:t>9/15/2008</a:t>
+              <a:t>9/16/2008</a:t>
             </a:fld>
             <a:endParaRPr lang="en-US"/>
           </a:p>
@@ -636,7 +660,7 @@
             <a:fld id="{BFF0141B-3676-46F2-8A5A-C346ECA90DD6}" type="datetimeFigureOut">
               <a:rPr lang="en-US" smtClean="0"/>
               <a:pPr/>
-              <a:t>9/15/2008</a:t>
+              <a:t>9/16/2008</a:t>
             </a:fld>
             <a:endParaRPr lang="en-US"/>
           </a:p>
@@ -803,7 +827,7 @@
             <a:fld id="{BFF0141B-3676-46F2-8A5A-C346ECA90DD6}" type="datetimeFigureOut">
               <a:rPr lang="en-US" smtClean="0"/>
               <a:pPr/>
-              <a:t>9/15/2008</a:t>
+              <a:t>9/16/2008</a:t>
             </a:fld>
             <a:endParaRPr lang="en-US"/>
           </a:p>
@@ -1046,7 +1070,7 @@
             <a:fld id="{BFF0141B-3676-46F2-8A5A-C346ECA90DD6}" type="datetimeFigureOut">
               <a:rPr lang="en-US" smtClean="0"/>
               <a:pPr/>
-              <a:t>9/15/2008</a:t>
+              <a:t>9/16/2008</a:t>
             </a:fld>
             <a:endParaRPr lang="en-US"/>
           </a:p>
@@ -1331,7 +1355,7 @@
             <a:fld id="{BFF0141B-3676-46F2-8A5A-C346ECA90DD6}" type="datetimeFigureOut">
               <a:rPr lang="en-US" smtClean="0"/>
               <a:pPr/>
-              <a:t>9/15/2008</a:t>
+              <a:t>9/16/2008</a:t>
             </a:fld>
             <a:endParaRPr lang="en-US"/>
           </a:p>
@@ -1750,7 +1774,7 @@
             <a:fld id="{BFF0141B-3676-46F2-8A5A-C346ECA90DD6}" type="datetimeFigureOut">
               <a:rPr lang="en-US" smtClean="0"/>
               <a:pPr/>
-              <a:t>9/15/2008</a:t>
+              <a:t>9/16/2008</a:t>
             </a:fld>
             <a:endParaRPr lang="en-US"/>
           </a:p>
@@ -1865,7 +1889,7 @@
             <a:fld id="{BFF0141B-3676-46F2-8A5A-C346ECA90DD6}" type="datetimeFigureOut">
               <a:rPr lang="en-US" smtClean="0"/>
               <a:pPr/>
-              <a:t>9/15/2008</a:t>
+              <a:t>9/16/2008</a:t>
             </a:fld>
             <a:endParaRPr lang="en-US"/>
           </a:p>
@@ -1957,7 +1981,7 @@
             <a:fld id="{BFF0141B-3676-46F2-8A5A-C346ECA90DD6}" type="datetimeFigureOut">
               <a:rPr lang="en-US" smtClean="0"/>
               <a:pPr/>
-              <a:t>9/15/2008</a:t>
+              <a:t>9/16/2008</a:t>
             </a:fld>
             <a:endParaRPr lang="en-US"/>
           </a:p>
@@ -2231,7 +2255,7 @@
             <a:fld id="{BFF0141B-3676-46F2-8A5A-C346ECA90DD6}" type="datetimeFigureOut">
               <a:rPr lang="en-US" smtClean="0"/>
               <a:pPr/>
-              <a:t>9/15/2008</a:t>
+              <a:t>9/16/2008</a:t>
             </a:fld>
             <a:endParaRPr lang="en-US"/>
           </a:p>
@@ -2481,7 +2505,7 @@
             <a:fld id="{BFF0141B-3676-46F2-8A5A-C346ECA90DD6}" type="datetimeFigureOut">
               <a:rPr lang="en-US" smtClean="0"/>
               <a:pPr/>
-              <a:t>9/15/2008</a:t>
+              <a:t>9/16/2008</a:t>
             </a:fld>
             <a:endParaRPr lang="en-US"/>
           </a:p>
@@ -2691,7 +2715,7 @@
             <a:fld id="{BFF0141B-3676-46F2-8A5A-C346ECA90DD6}" type="datetimeFigureOut">
               <a:rPr lang="en-US" smtClean="0"/>
               <a:pPr/>
-              <a:t>9/15/2008</a:t>
+              <a:t>9/16/2008</a:t>
             </a:fld>
             <a:endParaRPr lang="en-US"/>
           </a:p>
@@ -6958,13 +6982,8 @@
           <a:p>
             <a:r>
               <a:rPr lang="en-US" dirty="0" smtClean="0"/>
-              <a:t>Write complex </a:t>
-            </a:r>
-            <a:r>
-              <a:rPr lang="en-US" dirty="0" smtClean="0"/>
-              <a:t>queries</a:t>
-            </a:r>
-            <a:endParaRPr lang="en-US" dirty="0" smtClean="0"/>
+              <a:t>Write complex queries</a:t>
+            </a:r>
           </a:p>
           <a:p>
             <a:pPr lvl="1"/>
@@ -6977,21 +6996,8 @@
             <a:pPr lvl="1"/>
             <a:r>
               <a:rPr lang="en-US" dirty="0" smtClean="0"/>
-              <a:t>Publish queries </a:t>
-            </a:r>
-            <a:r>
-              <a:rPr lang="en-US" dirty="0" smtClean="0"/>
-              <a:t>to other users that </a:t>
-            </a:r>
-            <a:r>
-              <a:rPr lang="en-US" dirty="0" smtClean="0"/>
-              <a:t>return lists of interesting genes, subjects and/or </a:t>
-            </a:r>
-            <a:r>
-              <a:rPr lang="en-US" dirty="0" smtClean="0"/>
-              <a:t>images</a:t>
-            </a:r>
-            <a:endParaRPr lang="en-US" dirty="0" smtClean="0"/>
+              <a:t>Publish queries to other users that return lists of interesting genes, subjects and/or images</a:t>
+            </a:r>
           </a:p>
           <a:p>
             <a:r>
@@ -7095,7 +7101,9 @@
         </p:nvSpPr>
         <p:spPr/>
         <p:txBody>
-          <a:bodyPr/>
+          <a:bodyPr>
+            <a:normAutofit fontScale="92500" lnSpcReduction="10000"/>
+          </a:bodyPr>
           <a:lstStyle/>
           <a:p>
             <a:r>
@@ -7129,18 +7137,19 @@
           <a:p>
             <a:r>
               <a:rPr lang="en-US" dirty="0" smtClean="0"/>
-              <a:t>Hosting Details?</a:t>
-            </a:r>
-            <a:endParaRPr lang="en-US" dirty="0" smtClean="0"/>
+              <a:t>Where it will be hosted?</a:t>
+            </a:r>
           </a:p>
           <a:p>
             <a:r>
               <a:rPr lang="en-US" dirty="0" smtClean="0"/>
-              <a:t>Future </a:t>
-            </a:r>
+              <a:t>Technology?</a:t>
+            </a:r>
+          </a:p>
+          <a:p>
             <a:r>
               <a:rPr lang="en-US" dirty="0" smtClean="0"/>
-              <a:t>Directions</a:t>
+              <a:t>Future Directions</a:t>
             </a:r>
           </a:p>
           <a:p>
@@ -7170,9 +7179,20 @@
             </a:r>
             <a:r>
               <a:rPr lang="en-US" dirty="0" smtClean="0"/>
-              <a:t> and other analysis tools</a:t>
+              <a:t> and other analysis </a:t>
+            </a:r>
+            <a:r>
+              <a:rPr lang="en-US" dirty="0" smtClean="0"/>
+              <a:t>tools</a:t>
             </a:r>
             <a:endParaRPr lang="en-US" dirty="0"/>
+          </a:p>
+          <a:p>
+            <a:pPr lvl="1"/>
+            <a:r>
+              <a:rPr lang="en-US" dirty="0" smtClean="0"/>
+              <a:t>Allow regular updates of data</a:t>
+            </a:r>
           </a:p>
         </p:txBody>
       </p:sp>
@@ -7257,11 +7277,7 @@
             <a:pPr lvl="1"/>
             <a:r>
               <a:rPr lang="en-US" dirty="0" smtClean="0"/>
-              <a:t>TJ </a:t>
-            </a:r>
-            <a:r>
-              <a:rPr lang="en-US" dirty="0" smtClean="0"/>
-              <a:t>Andrews</a:t>
+              <a:t>TJ Andrews</a:t>
             </a:r>
           </a:p>
           <a:p>
@@ -7402,8 +7418,9 @@
           <a:p>
             <a:r>
               <a:rPr lang="en-US" dirty="0" smtClean="0"/>
-              <a:t>NCIA</a:t>
-            </a:r>
+              <a:t>NCIA &amp; VASARI</a:t>
+            </a:r>
+            <a:endParaRPr lang="en-US" dirty="0" smtClean="0"/>
           </a:p>
           <a:p>
             <a:pPr lvl="1"/>

</xml_diff>

<commit_message>
more tweaks, added more info on Rembrandt and I-Spy
</commit_message>
<xml_diff>
--- a/docs/project_management/external_meetings/ICR Workspace Mtg Sept 2008 Slides.pptx
+++ b/docs/project_management/external_meetings/ICR Workspace Mtg Sept 2008 Slides.pptx
@@ -6,11 +6,12 @@
   </p:sldMasterIdLst>
   <p:sldIdLst>
     <p:sldId id="264" r:id="rId2"/>
-    <p:sldId id="263" r:id="rId3"/>
-    <p:sldId id="257" r:id="rId4"/>
-    <p:sldId id="260" r:id="rId5"/>
-    <p:sldId id="261" r:id="rId6"/>
-    <p:sldId id="262" r:id="rId7"/>
+    <p:sldId id="265" r:id="rId3"/>
+    <p:sldId id="263" r:id="rId4"/>
+    <p:sldId id="257" r:id="rId5"/>
+    <p:sldId id="260" r:id="rId6"/>
+    <p:sldId id="261" r:id="rId7"/>
+    <p:sldId id="262" r:id="rId8"/>
   </p:sldIdLst>
   <p:sldSz cx="9144000" cy="6858000" type="screen4x3"/>
   <p:notesSz cx="6858000" cy="9144000"/>
@@ -318,7 +319,7 @@
             <a:fld id="{BFF0141B-3676-46F2-8A5A-C346ECA90DD6}" type="datetimeFigureOut">
               <a:rPr lang="en-US" smtClean="0"/>
               <a:pPr/>
-              <a:t>9/16/2008</a:t>
+              <a:t>9/17/2008</a:t>
             </a:fld>
             <a:endParaRPr lang="en-US"/>
           </a:p>
@@ -485,7 +486,7 @@
             <a:fld id="{BFF0141B-3676-46F2-8A5A-C346ECA90DD6}" type="datetimeFigureOut">
               <a:rPr lang="en-US" smtClean="0"/>
               <a:pPr/>
-              <a:t>9/16/2008</a:t>
+              <a:t>9/17/2008</a:t>
             </a:fld>
             <a:endParaRPr lang="en-US"/>
           </a:p>
@@ -662,7 +663,7 @@
             <a:fld id="{BFF0141B-3676-46F2-8A5A-C346ECA90DD6}" type="datetimeFigureOut">
               <a:rPr lang="en-US" smtClean="0"/>
               <a:pPr/>
-              <a:t>9/16/2008</a:t>
+              <a:t>9/17/2008</a:t>
             </a:fld>
             <a:endParaRPr lang="en-US"/>
           </a:p>
@@ -829,7 +830,7 @@
             <a:fld id="{BFF0141B-3676-46F2-8A5A-C346ECA90DD6}" type="datetimeFigureOut">
               <a:rPr lang="en-US" smtClean="0"/>
               <a:pPr/>
-              <a:t>9/16/2008</a:t>
+              <a:t>9/17/2008</a:t>
             </a:fld>
             <a:endParaRPr lang="en-US"/>
           </a:p>
@@ -1072,7 +1073,7 @@
             <a:fld id="{BFF0141B-3676-46F2-8A5A-C346ECA90DD6}" type="datetimeFigureOut">
               <a:rPr lang="en-US" smtClean="0"/>
               <a:pPr/>
-              <a:t>9/16/2008</a:t>
+              <a:t>9/17/2008</a:t>
             </a:fld>
             <a:endParaRPr lang="en-US"/>
           </a:p>
@@ -1357,7 +1358,7 @@
             <a:fld id="{BFF0141B-3676-46F2-8A5A-C346ECA90DD6}" type="datetimeFigureOut">
               <a:rPr lang="en-US" smtClean="0"/>
               <a:pPr/>
-              <a:t>9/16/2008</a:t>
+              <a:t>9/17/2008</a:t>
             </a:fld>
             <a:endParaRPr lang="en-US"/>
           </a:p>
@@ -1776,7 +1777,7 @@
             <a:fld id="{BFF0141B-3676-46F2-8A5A-C346ECA90DD6}" type="datetimeFigureOut">
               <a:rPr lang="en-US" smtClean="0"/>
               <a:pPr/>
-              <a:t>9/16/2008</a:t>
+              <a:t>9/17/2008</a:t>
             </a:fld>
             <a:endParaRPr lang="en-US"/>
           </a:p>
@@ -1891,7 +1892,7 @@
             <a:fld id="{BFF0141B-3676-46F2-8A5A-C346ECA90DD6}" type="datetimeFigureOut">
               <a:rPr lang="en-US" smtClean="0"/>
               <a:pPr/>
-              <a:t>9/16/2008</a:t>
+              <a:t>9/17/2008</a:t>
             </a:fld>
             <a:endParaRPr lang="en-US"/>
           </a:p>
@@ -1983,7 +1984,7 @@
             <a:fld id="{BFF0141B-3676-46F2-8A5A-C346ECA90DD6}" type="datetimeFigureOut">
               <a:rPr lang="en-US" smtClean="0"/>
               <a:pPr/>
-              <a:t>9/16/2008</a:t>
+              <a:t>9/17/2008</a:t>
             </a:fld>
             <a:endParaRPr lang="en-US"/>
           </a:p>
@@ -2257,7 +2258,7 @@
             <a:fld id="{BFF0141B-3676-46F2-8A5A-C346ECA90DD6}" type="datetimeFigureOut">
               <a:rPr lang="en-US" smtClean="0"/>
               <a:pPr/>
-              <a:t>9/16/2008</a:t>
+              <a:t>9/17/2008</a:t>
             </a:fld>
             <a:endParaRPr lang="en-US"/>
           </a:p>
@@ -2507,7 +2508,7 @@
             <a:fld id="{BFF0141B-3676-46F2-8A5A-C346ECA90DD6}" type="datetimeFigureOut">
               <a:rPr lang="en-US" smtClean="0"/>
               <a:pPr/>
-              <a:t>9/16/2008</a:t>
+              <a:t>9/17/2008</a:t>
             </a:fld>
             <a:endParaRPr lang="en-US"/>
           </a:p>
@@ -2717,7 +2718,7 @@
             <a:fld id="{BFF0141B-3676-46F2-8A5A-C346ECA90DD6}" type="datetimeFigureOut">
               <a:rPr lang="en-US" smtClean="0"/>
               <a:pPr/>
-              <a:t>9/16/2008</a:t>
+              <a:t>9/17/2008</a:t>
             </a:fld>
             <a:endParaRPr lang="en-US"/>
           </a:p>
@@ -3118,6 +3119,13 @@
               <a:rPr lang="en-US" sz="4900" dirty="0" smtClean="0"/>
               <a:t>CaIntegrator2</a:t>
             </a:r>
+            <a:br>
+              <a:rPr lang="en-US" sz="4900" dirty="0" smtClean="0"/>
+            </a:br>
+            <a:r>
+              <a:rPr lang="en-US" sz="1300" dirty="0" smtClean="0"/>
+              <a:t> </a:t>
+            </a:r>
             <a:r>
               <a:rPr lang="en-US" dirty="0" smtClean="0"/>
               <a:t/>
@@ -3127,11 +3135,7 @@
             </a:br>
             <a:r>
               <a:rPr lang="en-US" sz="3100" dirty="0" smtClean="0"/>
-              <a:t>A </a:t>
-            </a:r>
-            <a:r>
-              <a:rPr lang="en-US" sz="3100" dirty="0" smtClean="0"/>
-              <a:t>Tool for Publishing and Analyzing Integrative Study Data</a:t>
+              <a:t>A Tool for Publishing and Analyzing Integrative Study Data</a:t>
             </a:r>
             <a:endParaRPr lang="en-US" dirty="0"/>
           </a:p>
@@ -3240,7 +3244,7 @@
       </p:grpSpPr>
       <p:sp>
         <p:nvSpPr>
-          <p:cNvPr id="6" name="Title 5"/>
+          <p:cNvPr id="2" name="Title 1"/>
           <p:cNvSpPr>
             <a:spLocks noGrp="1"/>
           </p:cNvSpPr>
@@ -3255,15 +3259,7 @@
           <a:p>
             <a:r>
               <a:rPr lang="en-US" dirty="0" smtClean="0"/>
-              <a:t>Current </a:t>
-            </a:r>
-            <a:r>
-              <a:rPr lang="en-US" dirty="0" err="1" smtClean="0"/>
-              <a:t>caIntegrator</a:t>
-            </a:r>
-            <a:r>
-              <a:rPr lang="en-US" dirty="0" smtClean="0"/>
-              <a:t> Applications</a:t>
+              <a:t>Goals</a:t>
             </a:r>
             <a:endParaRPr lang="en-US" dirty="0"/>
           </a:p>
@@ -3271,7 +3267,7 @@
       </p:sp>
       <p:sp>
         <p:nvSpPr>
-          <p:cNvPr id="7" name="Content Placeholder 6"/>
+          <p:cNvPr id="3" name="Content Placeholder 2"/>
           <p:cNvSpPr>
             <a:spLocks noGrp="1"/>
           </p:cNvSpPr>
@@ -3281,50 +3277,53 @@
         </p:nvSpPr>
         <p:spPr/>
         <p:txBody>
-          <a:bodyPr>
-            <a:normAutofit lnSpcReduction="10000"/>
-          </a:bodyPr>
+          <a:bodyPr/>
           <a:lstStyle/>
           <a:p>
             <a:r>
               <a:rPr lang="en-US" dirty="0" smtClean="0"/>
-              <a:t>Rembrandt</a:t>
+              <a:t>Have a single place where one can go to get all the information about a study</a:t>
             </a:r>
           </a:p>
           <a:p>
             <a:pPr lvl="1"/>
             <a:r>
               <a:rPr lang="en-US" dirty="0" smtClean="0"/>
-              <a:t>A brain tumor study to host and integrate clinical and functional genomics data from clinical trials involving patients suffering from </a:t>
-            </a:r>
-            <a:r>
-              <a:rPr lang="en-US" dirty="0" err="1" smtClean="0"/>
-              <a:t>Gliomas</a:t>
-            </a:r>
+              <a:t>Clinical Data</a:t>
+            </a:r>
+          </a:p>
+          <a:p>
+            <a:pPr lvl="1"/>
             <a:r>
               <a:rPr lang="en-US" dirty="0" smtClean="0"/>
-              <a:t>.</a:t>
-            </a:r>
-            <a:endParaRPr lang="en-US" dirty="0" smtClean="0"/>
-          </a:p>
-          <a:p>
+              <a:t>Imaging Data</a:t>
+            </a:r>
+          </a:p>
+          <a:p>
+            <a:pPr lvl="1"/>
             <a:r>
               <a:rPr lang="en-US" dirty="0" smtClean="0"/>
-              <a:t>I-SPY</a:t>
+              <a:t>Genomic Data</a:t>
+            </a:r>
+          </a:p>
+          <a:p>
+            <a:r>
+              <a:rPr lang="en-US" dirty="0" smtClean="0"/>
+              <a:t>Provide ways to browse and analyze the data</a:t>
             </a:r>
           </a:p>
           <a:p>
             <a:pPr lvl="1"/>
             <a:r>
               <a:rPr lang="en-US" dirty="0" smtClean="0"/>
-              <a:t>The I-Spy trial is a national study to identify biomarkers predictive of response to therapy throughout the treatment cycle for women with Stage 3 breast cancer.</a:t>
-            </a:r>
-            <a:endParaRPr lang="en-US" dirty="0" smtClean="0"/>
-          </a:p>
-          <a:p>
+              <a:t>Explore and confirm hypotheses</a:t>
+            </a:r>
+          </a:p>
+          <a:p>
+            <a:pPr lvl="1"/>
             <a:r>
               <a:rPr lang="en-US" dirty="0" smtClean="0"/>
-              <a:t>???</a:t>
+              <a:t>Publish results and lists, e.g. of interesting genes </a:t>
             </a:r>
             <a:endParaRPr lang="en-US" dirty="0"/>
           </a:p>
@@ -3339,6 +3338,193 @@
 </file>
 
 <file path=ppt/slides/slide3.xml><?xml version="1.0" encoding="utf-8"?>
+<p:sld xmlns:a="http://schemas.openxmlformats.org/drawingml/2006/main" xmlns:r="http://schemas.openxmlformats.org/officeDocument/2006/relationships" xmlns:p="http://schemas.openxmlformats.org/presentationml/2006/main">
+  <p:cSld>
+    <p:spTree>
+      <p:nvGrpSpPr>
+        <p:cNvPr id="1" name=""/>
+        <p:cNvGrpSpPr/>
+        <p:nvPr/>
+      </p:nvGrpSpPr>
+      <p:grpSpPr>
+        <a:xfrm>
+          <a:off x="0" y="0"/>
+          <a:ext cx="0" cy="0"/>
+          <a:chOff x="0" y="0"/>
+          <a:chExt cx="0" cy="0"/>
+        </a:xfrm>
+      </p:grpSpPr>
+      <p:sp>
+        <p:nvSpPr>
+          <p:cNvPr id="6" name="Title 5"/>
+          <p:cNvSpPr>
+            <a:spLocks noGrp="1"/>
+          </p:cNvSpPr>
+          <p:nvPr>
+            <p:ph type="title"/>
+          </p:nvPr>
+        </p:nvSpPr>
+        <p:spPr/>
+        <p:txBody>
+          <a:bodyPr/>
+          <a:lstStyle/>
+          <a:p>
+            <a:r>
+              <a:rPr lang="en-US" dirty="0" err="1" smtClean="0"/>
+              <a:t>caIntegrator</a:t>
+            </a:r>
+            <a:r>
+              <a:rPr lang="en-US" dirty="0" smtClean="0"/>
+              <a:t> Examples</a:t>
+            </a:r>
+            <a:endParaRPr lang="en-US" dirty="0"/>
+          </a:p>
+        </p:txBody>
+      </p:sp>
+      <p:sp>
+        <p:nvSpPr>
+          <p:cNvPr id="7" name="Content Placeholder 6"/>
+          <p:cNvSpPr>
+            <a:spLocks noGrp="1"/>
+          </p:cNvSpPr>
+          <p:nvPr>
+            <p:ph idx="1"/>
+          </p:nvPr>
+        </p:nvSpPr>
+        <p:spPr/>
+        <p:txBody>
+          <a:bodyPr>
+            <a:normAutofit/>
+          </a:bodyPr>
+          <a:lstStyle/>
+          <a:p>
+            <a:r>
+              <a:rPr lang="en-US" dirty="0" smtClean="0"/>
+              <a:t>Rembrandt</a:t>
+            </a:r>
+          </a:p>
+          <a:p>
+            <a:pPr lvl="1"/>
+            <a:r>
+              <a:rPr lang="en-US" dirty="0" smtClean="0"/>
+              <a:t>A brain tumor study to host and integrate clinical and functional genomics data from clinical trials involving patients suffering from </a:t>
+            </a:r>
+            <a:r>
+              <a:rPr lang="en-US" dirty="0" err="1" smtClean="0"/>
+              <a:t>Gliomas</a:t>
+            </a:r>
+            <a:r>
+              <a:rPr lang="en-US" dirty="0" smtClean="0"/>
+              <a:t>.</a:t>
+            </a:r>
+          </a:p>
+          <a:p>
+            <a:pPr lvl="1"/>
+            <a:endParaRPr lang="en-US" dirty="0" smtClean="0"/>
+          </a:p>
+          <a:p>
+            <a:r>
+              <a:rPr lang="en-US" dirty="0" smtClean="0"/>
+              <a:t>I-SPY</a:t>
+            </a:r>
+          </a:p>
+          <a:p>
+            <a:pPr lvl="1"/>
+            <a:r>
+              <a:rPr lang="en-US" dirty="0" smtClean="0"/>
+              <a:t>A</a:t>
+            </a:r>
+            <a:r>
+              <a:rPr lang="en-US" dirty="0" smtClean="0"/>
+              <a:t> study </a:t>
+            </a:r>
+            <a:r>
+              <a:rPr lang="en-US" dirty="0" smtClean="0"/>
+              <a:t>to identify biomarkers predictive of response to therapy throughout the treatment cycle for women with Stage 3 breast cancer</a:t>
+            </a:r>
+            <a:r>
+              <a:rPr lang="en-US" dirty="0" smtClean="0"/>
+              <a:t>.</a:t>
+            </a:r>
+            <a:endParaRPr lang="en-US" dirty="0" smtClean="0"/>
+          </a:p>
+        </p:txBody>
+      </p:sp>
+      <p:pic>
+        <p:nvPicPr>
+          <p:cNvPr id="1027" name="Picture 3"/>
+          <p:cNvPicPr>
+            <a:picLocks noChangeAspect="1" noChangeArrowheads="1"/>
+          </p:cNvPicPr>
+          <p:nvPr/>
+        </p:nvPicPr>
+        <p:blipFill>
+          <a:blip r:embed="rId2"/>
+          <a:srcRect/>
+          <a:stretch>
+            <a:fillRect/>
+          </a:stretch>
+        </p:blipFill>
+        <p:spPr bwMode="auto">
+          <a:xfrm>
+            <a:off x="1819275" y="4038600"/>
+            <a:ext cx="7324725" cy="638175"/>
+          </a:xfrm>
+          <a:prstGeom prst="rect">
+            <a:avLst/>
+          </a:prstGeom>
+          <a:noFill/>
+          <a:ln w="9525">
+            <a:noFill/>
+            <a:miter lim="800000"/>
+            <a:headEnd/>
+            <a:tailEnd/>
+          </a:ln>
+          <a:effectLst/>
+        </p:spPr>
+      </p:pic>
+      <p:pic>
+        <p:nvPicPr>
+          <p:cNvPr id="1029" name="Picture 5"/>
+          <p:cNvPicPr>
+            <a:picLocks noChangeAspect="1" noChangeArrowheads="1"/>
+          </p:cNvPicPr>
+          <p:nvPr/>
+        </p:nvPicPr>
+        <p:blipFill>
+          <a:blip r:embed="rId3"/>
+          <a:srcRect/>
+          <a:stretch>
+            <a:fillRect/>
+          </a:stretch>
+        </p:blipFill>
+        <p:spPr bwMode="auto">
+          <a:xfrm>
+            <a:off x="2895600" y="1600200"/>
+            <a:ext cx="7315200" cy="619125"/>
+          </a:xfrm>
+          <a:prstGeom prst="rect">
+            <a:avLst/>
+          </a:prstGeom>
+          <a:noFill/>
+          <a:ln w="9525">
+            <a:noFill/>
+            <a:miter lim="800000"/>
+            <a:headEnd/>
+            <a:tailEnd/>
+          </a:ln>
+          <a:effectLst/>
+        </p:spPr>
+      </p:pic>
+    </p:spTree>
+  </p:cSld>
+  <p:clrMapOvr>
+    <a:masterClrMapping/>
+  </p:clrMapOvr>
+</p:sld>
+</file>
+
+<file path=ppt/slides/slide4.xml><?xml version="1.0" encoding="utf-8"?>
 <p:sld xmlns:a="http://schemas.openxmlformats.org/drawingml/2006/main" xmlns:r="http://schemas.openxmlformats.org/officeDocument/2006/relationships" xmlns:p="http://schemas.openxmlformats.org/presentationml/2006/main">
   <p:cSld>
     <p:spTree>
@@ -7170,154 +7356,6 @@
 </p:sld>
 </file>
 
-<file path=ppt/slides/slide4.xml><?xml version="1.0" encoding="utf-8"?>
-<p:sld xmlns:a="http://schemas.openxmlformats.org/drawingml/2006/main" xmlns:r="http://schemas.openxmlformats.org/officeDocument/2006/relationships" xmlns:p="http://schemas.openxmlformats.org/presentationml/2006/main">
-  <p:cSld>
-    <p:spTree>
-      <p:nvGrpSpPr>
-        <p:cNvPr id="1" name=""/>
-        <p:cNvGrpSpPr/>
-        <p:nvPr/>
-      </p:nvGrpSpPr>
-      <p:grpSpPr>
-        <a:xfrm>
-          <a:off x="0" y="0"/>
-          <a:ext cx="0" cy="0"/>
-          <a:chOff x="0" y="0"/>
-          <a:chExt cx="0" cy="0"/>
-        </a:xfrm>
-      </p:grpSpPr>
-      <p:sp>
-        <p:nvSpPr>
-          <p:cNvPr id="2" name="Title 1"/>
-          <p:cNvSpPr>
-            <a:spLocks noGrp="1"/>
-          </p:cNvSpPr>
-          <p:nvPr>
-            <p:ph type="title"/>
-          </p:nvPr>
-        </p:nvSpPr>
-        <p:spPr/>
-        <p:txBody>
-          <a:bodyPr>
-            <a:normAutofit/>
-          </a:bodyPr>
-          <a:lstStyle/>
-          <a:p>
-            <a:r>
-              <a:rPr lang="en-US" sz="3600" dirty="0" smtClean="0"/>
-              <a:t>What you can do with caIntegrator2</a:t>
-            </a:r>
-            <a:endParaRPr lang="en-US" sz="3600" dirty="0"/>
-          </a:p>
-        </p:txBody>
-      </p:sp>
-      <p:sp>
-        <p:nvSpPr>
-          <p:cNvPr id="3" name="Content Placeholder 2"/>
-          <p:cNvSpPr>
-            <a:spLocks noGrp="1"/>
-          </p:cNvSpPr>
-          <p:nvPr>
-            <p:ph idx="1"/>
-          </p:nvPr>
-        </p:nvSpPr>
-        <p:spPr/>
-        <p:txBody>
-          <a:bodyPr>
-            <a:normAutofit fontScale="92500" lnSpcReduction="10000"/>
-          </a:bodyPr>
-          <a:lstStyle/>
-          <a:p>
-            <a:r>
-              <a:rPr lang="en-US" dirty="0" smtClean="0"/>
-              <a:t>Browse and filter lists of major entities</a:t>
-            </a:r>
-          </a:p>
-          <a:p>
-            <a:pPr lvl="1"/>
-            <a:r>
-              <a:rPr lang="en-US" dirty="0" smtClean="0"/>
-              <a:t>Subjects</a:t>
-            </a:r>
-          </a:p>
-          <a:p>
-            <a:pPr lvl="1"/>
-            <a:r>
-              <a:rPr lang="en-US" dirty="0" smtClean="0"/>
-              <a:t>Samples</a:t>
-            </a:r>
-          </a:p>
-          <a:p>
-            <a:r>
-              <a:rPr lang="en-US" dirty="0" smtClean="0"/>
-              <a:t>Write complex queries</a:t>
-            </a:r>
-          </a:p>
-          <a:p>
-            <a:pPr lvl="1"/>
-            <a:r>
-              <a:rPr lang="en-US" dirty="0" smtClean="0"/>
-              <a:t>Join across clinical, microarray and image data</a:t>
-            </a:r>
-          </a:p>
-          <a:p>
-            <a:pPr lvl="1"/>
-            <a:r>
-              <a:rPr lang="en-US" dirty="0" smtClean="0"/>
-              <a:t>Publish queries to other users that return lists of interesting genes, subjects and/or images</a:t>
-            </a:r>
-          </a:p>
-          <a:p>
-            <a:r>
-              <a:rPr lang="en-US" dirty="0" smtClean="0"/>
-              <a:t>Do analysis</a:t>
-            </a:r>
-          </a:p>
-          <a:p>
-            <a:pPr lvl="1"/>
-            <a:r>
-              <a:rPr lang="en-US" dirty="0" smtClean="0"/>
-              <a:t>Kaplan-Meier Survival Curves</a:t>
-            </a:r>
-          </a:p>
-          <a:p>
-            <a:pPr lvl="1"/>
-            <a:r>
-              <a:rPr lang="en-US" dirty="0" smtClean="0"/>
-              <a:t>Export to </a:t>
-            </a:r>
-            <a:r>
-              <a:rPr lang="en-US" dirty="0" err="1" smtClean="0"/>
-              <a:t>GenePattern</a:t>
-            </a:r>
-            <a:r>
-              <a:rPr lang="en-US" dirty="0" smtClean="0"/>
-              <a:t> or </a:t>
-            </a:r>
-            <a:r>
-              <a:rPr lang="en-US" dirty="0" err="1" smtClean="0"/>
-              <a:t>GEWorkbench</a:t>
-            </a:r>
-            <a:endParaRPr lang="en-US" dirty="0" smtClean="0"/>
-          </a:p>
-        </p:txBody>
-      </p:sp>
-    </p:spTree>
-  </p:cSld>
-  <p:clrMapOvr>
-    <a:masterClrMapping/>
-  </p:clrMapOvr>
-  <p:timing>
-    <p:tnLst>
-      <p:par>
-        <p:cTn id="1" dur="indefinite" restart="never" nodeType="tmRoot"/>
-      </p:par>
-    </p:tnLst>
-  </p:timing>
-</p:sld>
-</file>
-
 <file path=ppt/slides/slide5.xml><?xml version="1.0" encoding="utf-8"?>
 <p:sld xmlns:a="http://schemas.openxmlformats.org/drawingml/2006/main" xmlns:r="http://schemas.openxmlformats.org/officeDocument/2006/relationships" xmlns:p="http://schemas.openxmlformats.org/presentationml/2006/main">
   <p:cSld>
@@ -7347,14 +7385,16 @@
         </p:nvSpPr>
         <p:spPr/>
         <p:txBody>
-          <a:bodyPr/>
+          <a:bodyPr>
+            <a:normAutofit/>
+          </a:bodyPr>
           <a:lstStyle/>
           <a:p>
             <a:r>
-              <a:rPr lang="en-US" dirty="0" smtClean="0"/>
-              <a:t>Other Stuff</a:t>
-            </a:r>
-            <a:endParaRPr lang="en-US" dirty="0"/>
+              <a:rPr lang="en-US" sz="3600" dirty="0" smtClean="0"/>
+              <a:t>What you can do with caIntegrator2</a:t>
+            </a:r>
+            <a:endParaRPr lang="en-US" sz="3600" dirty="0"/>
           </a:p>
         </p:txBody>
       </p:sp>
@@ -7377,70 +7417,61 @@
           <a:p>
             <a:r>
               <a:rPr lang="en-US" dirty="0" smtClean="0"/>
-              <a:t>Schedule</a:t>
+              <a:t>Browse and filter lists of major entities</a:t>
             </a:r>
           </a:p>
           <a:p>
             <a:pPr lvl="1"/>
             <a:r>
               <a:rPr lang="en-US" dirty="0" smtClean="0"/>
-              <a:t>Version 1.0 on mm/</a:t>
-            </a:r>
-            <a:r>
-              <a:rPr lang="en-US" dirty="0" err="1" smtClean="0"/>
-              <a:t>dd</a:t>
-            </a:r>
+              <a:t>Subjects</a:t>
+            </a:r>
+          </a:p>
+          <a:p>
+            <a:pPr lvl="1"/>
             <a:r>
               <a:rPr lang="en-US" dirty="0" smtClean="0"/>
-              <a:t>/</a:t>
-            </a:r>
-            <a:r>
-              <a:rPr lang="en-US" dirty="0" err="1" smtClean="0"/>
-              <a:t>yy</a:t>
-            </a:r>
+              <a:t>Samples</a:t>
+            </a:r>
+          </a:p>
+          <a:p>
             <a:r>
               <a:rPr lang="en-US" dirty="0" smtClean="0"/>
-              <a:t>?</a:t>
-            </a:r>
-          </a:p>
-          <a:p>
+              <a:t>Write complex queries</a:t>
+            </a:r>
+          </a:p>
+          <a:p>
+            <a:pPr lvl="1"/>
             <a:r>
               <a:rPr lang="en-US" dirty="0" smtClean="0"/>
-              <a:t>Where it will be hosted?</a:t>
-            </a:r>
-          </a:p>
-          <a:p>
+              <a:t>Join across clinical, microarray and image data</a:t>
+            </a:r>
+          </a:p>
+          <a:p>
+            <a:pPr lvl="1"/>
             <a:r>
               <a:rPr lang="en-US" dirty="0" smtClean="0"/>
-              <a:t>Technology?</a:t>
+              <a:t>Publish queries to other users that return lists of interesting genes, subjects and/or images</a:t>
             </a:r>
           </a:p>
           <a:p>
             <a:r>
               <a:rPr lang="en-US" dirty="0" smtClean="0"/>
-              <a:t>Future Directions</a:t>
+              <a:t>Do analysis</a:t>
             </a:r>
           </a:p>
           <a:p>
             <a:pPr lvl="1"/>
             <a:r>
               <a:rPr lang="en-US" dirty="0" smtClean="0"/>
-              <a:t>Incorporate other types of genomic data such as copy number, </a:t>
-            </a:r>
-            <a:r>
-              <a:rPr lang="en-US" dirty="0" err="1" smtClean="0"/>
-              <a:t>methylation</a:t>
-            </a:r>
+              <a:t>Kaplan-Meier Survival Curves</a:t>
+            </a:r>
+          </a:p>
+          <a:p>
+            <a:pPr lvl="1"/>
             <a:r>
               <a:rPr lang="en-US" dirty="0" smtClean="0"/>
-              <a:t>, and genotypes</a:t>
-            </a:r>
-          </a:p>
-          <a:p>
-            <a:pPr lvl="1"/>
-            <a:r>
-              <a:rPr lang="en-US" dirty="0" smtClean="0"/>
-              <a:t>Tighter integration with </a:t>
+              <a:t>Export to </a:t>
             </a:r>
             <a:r>
               <a:rPr lang="en-US" dirty="0" err="1" smtClean="0"/>
@@ -7448,16 +7479,13 @@
             </a:r>
             <a:r>
               <a:rPr lang="en-US" dirty="0" smtClean="0"/>
-              <a:t> and other analysis tools</a:t>
-            </a:r>
-            <a:endParaRPr lang="en-US" dirty="0"/>
-          </a:p>
-          <a:p>
-            <a:pPr lvl="1"/>
-            <a:r>
-              <a:rPr lang="en-US" dirty="0" smtClean="0"/>
-              <a:t>Allow regular updates of data</a:t>
-            </a:r>
+              <a:t> or </a:t>
+            </a:r>
+            <a:r>
+              <a:rPr lang="en-US" dirty="0" err="1" smtClean="0"/>
+              <a:t>GEWorkbench</a:t>
+            </a:r>
+            <a:endParaRPr lang="en-US" dirty="0" smtClean="0"/>
           </a:p>
         </p:txBody>
       </p:sp>
@@ -7510,6 +7538,164 @@
           <a:p>
             <a:r>
               <a:rPr lang="en-US" dirty="0" smtClean="0"/>
+              <a:t>Other Stuff</a:t>
+            </a:r>
+            <a:endParaRPr lang="en-US" dirty="0"/>
+          </a:p>
+        </p:txBody>
+      </p:sp>
+      <p:sp>
+        <p:nvSpPr>
+          <p:cNvPr id="3" name="Content Placeholder 2"/>
+          <p:cNvSpPr>
+            <a:spLocks noGrp="1"/>
+          </p:cNvSpPr>
+          <p:nvPr>
+            <p:ph idx="1"/>
+          </p:nvPr>
+        </p:nvSpPr>
+        <p:spPr/>
+        <p:txBody>
+          <a:bodyPr>
+            <a:normAutofit fontScale="92500" lnSpcReduction="10000"/>
+          </a:bodyPr>
+          <a:lstStyle/>
+          <a:p>
+            <a:r>
+              <a:rPr lang="en-US" dirty="0" smtClean="0"/>
+              <a:t>Schedule</a:t>
+            </a:r>
+          </a:p>
+          <a:p>
+            <a:pPr lvl="1"/>
+            <a:r>
+              <a:rPr lang="en-US" dirty="0" smtClean="0"/>
+              <a:t>Version 1.0 on mm/</a:t>
+            </a:r>
+            <a:r>
+              <a:rPr lang="en-US" dirty="0" err="1" smtClean="0"/>
+              <a:t>dd</a:t>
+            </a:r>
+            <a:r>
+              <a:rPr lang="en-US" dirty="0" smtClean="0"/>
+              <a:t>/</a:t>
+            </a:r>
+            <a:r>
+              <a:rPr lang="en-US" dirty="0" err="1" smtClean="0"/>
+              <a:t>yy</a:t>
+            </a:r>
+            <a:r>
+              <a:rPr lang="en-US" dirty="0" smtClean="0"/>
+              <a:t>?</a:t>
+            </a:r>
+          </a:p>
+          <a:p>
+            <a:r>
+              <a:rPr lang="en-US" dirty="0" smtClean="0"/>
+              <a:t>Where it will be hosted?</a:t>
+            </a:r>
+          </a:p>
+          <a:p>
+            <a:r>
+              <a:rPr lang="en-US" dirty="0" smtClean="0"/>
+              <a:t>Technology?</a:t>
+            </a:r>
+          </a:p>
+          <a:p>
+            <a:r>
+              <a:rPr lang="en-US" dirty="0" smtClean="0"/>
+              <a:t>Future Directions</a:t>
+            </a:r>
+          </a:p>
+          <a:p>
+            <a:pPr lvl="1"/>
+            <a:r>
+              <a:rPr lang="en-US" dirty="0" smtClean="0"/>
+              <a:t>Incorporate other types of genomic data such as copy number, </a:t>
+            </a:r>
+            <a:r>
+              <a:rPr lang="en-US" dirty="0" err="1" smtClean="0"/>
+              <a:t>methylation</a:t>
+            </a:r>
+            <a:r>
+              <a:rPr lang="en-US" dirty="0" smtClean="0"/>
+              <a:t>, and genotypes</a:t>
+            </a:r>
+          </a:p>
+          <a:p>
+            <a:pPr lvl="1"/>
+            <a:r>
+              <a:rPr lang="en-US" dirty="0" smtClean="0"/>
+              <a:t>Tighter integration with </a:t>
+            </a:r>
+            <a:r>
+              <a:rPr lang="en-US" dirty="0" err="1" smtClean="0"/>
+              <a:t>GenePattern</a:t>
+            </a:r>
+            <a:r>
+              <a:rPr lang="en-US" dirty="0" smtClean="0"/>
+              <a:t> and other analysis tools</a:t>
+            </a:r>
+            <a:endParaRPr lang="en-US" dirty="0"/>
+          </a:p>
+          <a:p>
+            <a:pPr lvl="1"/>
+            <a:r>
+              <a:rPr lang="en-US" dirty="0" smtClean="0"/>
+              <a:t>Allow regular updates of data</a:t>
+            </a:r>
+          </a:p>
+        </p:txBody>
+      </p:sp>
+    </p:spTree>
+  </p:cSld>
+  <p:clrMapOvr>
+    <a:masterClrMapping/>
+  </p:clrMapOvr>
+  <p:timing>
+    <p:tnLst>
+      <p:par>
+        <p:cTn id="1" dur="indefinite" restart="never" nodeType="tmRoot"/>
+      </p:par>
+    </p:tnLst>
+  </p:timing>
+</p:sld>
+</file>
+
+<file path=ppt/slides/slide7.xml><?xml version="1.0" encoding="utf-8"?>
+<p:sld xmlns:a="http://schemas.openxmlformats.org/drawingml/2006/main" xmlns:r="http://schemas.openxmlformats.org/officeDocument/2006/relationships" xmlns:p="http://schemas.openxmlformats.org/presentationml/2006/main">
+  <p:cSld>
+    <p:spTree>
+      <p:nvGrpSpPr>
+        <p:cNvPr id="1" name=""/>
+        <p:cNvGrpSpPr/>
+        <p:nvPr/>
+      </p:nvGrpSpPr>
+      <p:grpSpPr>
+        <a:xfrm>
+          <a:off x="0" y="0"/>
+          <a:ext cx="0" cy="0"/>
+          <a:chOff x="0" y="0"/>
+          <a:chExt cx="0" cy="0"/>
+        </a:xfrm>
+      </p:grpSpPr>
+      <p:sp>
+        <p:nvSpPr>
+          <p:cNvPr id="2" name="Title 1"/>
+          <p:cNvSpPr>
+            <a:spLocks noGrp="1"/>
+          </p:cNvSpPr>
+          <p:nvPr>
+            <p:ph type="title"/>
+          </p:nvPr>
+        </p:nvSpPr>
+        <p:spPr/>
+        <p:txBody>
+          <a:bodyPr/>
+          <a:lstStyle/>
+          <a:p>
+            <a:r>
+              <a:rPr lang="en-US" dirty="0" smtClean="0"/>
               <a:t>Credits</a:t>
             </a:r>
             <a:endParaRPr lang="en-US" dirty="0"/>
@@ -7549,7 +7735,7 @@
             <a:pPr lvl="1"/>
             <a:r>
               <a:rPr lang="en-US" dirty="0" smtClean="0"/>
-              <a:t>Will </a:t>
+              <a:t>William </a:t>
             </a:r>
             <a:r>
               <a:rPr lang="en-US" dirty="0" err="1" smtClean="0"/>
@@ -7695,7 +7881,7 @@
             <a:pPr lvl="1"/>
             <a:r>
               <a:rPr lang="en-US" dirty="0" smtClean="0"/>
-              <a:t>Carl Jaffe</a:t>
+              <a:t>Adam Flanders</a:t>
             </a:r>
           </a:p>
           <a:p>
@@ -7714,14 +7900,18 @@
             <a:pPr lvl="1"/>
             <a:r>
               <a:rPr lang="en-US" dirty="0" smtClean="0"/>
-              <a:t>Adam Flanders</a:t>
+              <a:t>Carl Jaffe</a:t>
             </a:r>
           </a:p>
           <a:p>
             <a:pPr lvl="1"/>
             <a:r>
               <a:rPr lang="en-US" dirty="0" smtClean="0"/>
-              <a:t>Daniel Rubin</a:t>
+              <a:t>Daniel </a:t>
+            </a:r>
+            <a:r>
+              <a:rPr lang="en-US" dirty="0" smtClean="0"/>
+              <a:t>Rubin</a:t>
             </a:r>
           </a:p>
           <a:p>

</xml_diff>

<commit_message>
added some screen shots, etc.
</commit_message>
<xml_diff>
--- a/docs/project_management/external_meetings/ICR Workspace Mtg Sept 2008 Slides.pptx
+++ b/docs/project_management/external_meetings/ICR Workspace Mtg Sept 2008 Slides.pptx
@@ -10,8 +10,15 @@
     <p:sldId id="263" r:id="rId4"/>
     <p:sldId id="257" r:id="rId5"/>
     <p:sldId id="260" r:id="rId6"/>
-    <p:sldId id="261" r:id="rId7"/>
-    <p:sldId id="262" r:id="rId8"/>
+    <p:sldId id="266" r:id="rId7"/>
+    <p:sldId id="268" r:id="rId8"/>
+    <p:sldId id="269" r:id="rId9"/>
+    <p:sldId id="270" r:id="rId10"/>
+    <p:sldId id="267" r:id="rId11"/>
+    <p:sldId id="272" r:id="rId12"/>
+    <p:sldId id="273" r:id="rId13"/>
+    <p:sldId id="274" r:id="rId14"/>
+    <p:sldId id="275" r:id="rId15"/>
   </p:sldIdLst>
   <p:sldSz cx="9144000" cy="6858000" type="screen4x3"/>
   <p:notesSz cx="6858000" cy="9144000"/>
@@ -119,24 +126,6 @@
 </p:cmAuthorLst>
 </file>
 
-<file path=ppt/comments/comment1.xml><?xml version="1.0" encoding="utf-8"?>
-<p:cmLst xmlns:a="http://schemas.openxmlformats.org/drawingml/2006/main" xmlns:r="http://schemas.openxmlformats.org/officeDocument/2006/relationships" xmlns:p="http://schemas.openxmlformats.org/presentationml/2006/main">
-  <p:cm authorId="0" dt="2008-09-16T16:00:35.694" idx="1">
-    <p:pos x="10" y="10"/>
-    <p:text>should i have preceding slide talking about caIntegrator implementations (rembrandt, i-spy) in more detail?</p:text>
-  </p:cm>
-</p:cmLst>
-</file>
-
-<file path=ppt/comments/comment2.xml><?xml version="1.0" encoding="utf-8"?>
-<p:cmLst xmlns:a="http://schemas.openxmlformats.org/drawingml/2006/main" xmlns:r="http://schemas.openxmlformats.org/officeDocument/2006/relationships" xmlns:p="http://schemas.openxmlformats.org/presentationml/2006/main">
-  <p:cm authorId="0" dt="2008-09-16T16:01:31.526" idx="2">
-    <p:pos x="10" y="10"/>
-    <p:text>how technical is the audience?  do we want any model diagrams or anything?</p:text>
-  </p:cm>
-</p:cmLst>
-</file>
-
 <file path=ppt/slideLayouts/slideLayout1.xml><?xml version="1.0" encoding="utf-8"?>
 <p:sldLayout xmlns:a="http://schemas.openxmlformats.org/drawingml/2006/main" xmlns:r="http://schemas.openxmlformats.org/officeDocument/2006/relationships" xmlns:p="http://schemas.openxmlformats.org/presentationml/2006/main" type="title" preserve="1">
   <p:cSld name="Title Slide">
@@ -319,7 +308,7 @@
             <a:fld id="{BFF0141B-3676-46F2-8A5A-C346ECA90DD6}" type="datetimeFigureOut">
               <a:rPr lang="en-US" smtClean="0"/>
               <a:pPr/>
-              <a:t>9/17/2008</a:t>
+              <a:t>9/19/2008</a:t>
             </a:fld>
             <a:endParaRPr lang="en-US"/>
           </a:p>
@@ -486,7 +475,7 @@
             <a:fld id="{BFF0141B-3676-46F2-8A5A-C346ECA90DD6}" type="datetimeFigureOut">
               <a:rPr lang="en-US" smtClean="0"/>
               <a:pPr/>
-              <a:t>9/17/2008</a:t>
+              <a:t>9/19/2008</a:t>
             </a:fld>
             <a:endParaRPr lang="en-US"/>
           </a:p>
@@ -663,7 +652,7 @@
             <a:fld id="{BFF0141B-3676-46F2-8A5A-C346ECA90DD6}" type="datetimeFigureOut">
               <a:rPr lang="en-US" smtClean="0"/>
               <a:pPr/>
-              <a:t>9/17/2008</a:t>
+              <a:t>9/19/2008</a:t>
             </a:fld>
             <a:endParaRPr lang="en-US"/>
           </a:p>
@@ -830,7 +819,7 @@
             <a:fld id="{BFF0141B-3676-46F2-8A5A-C346ECA90DD6}" type="datetimeFigureOut">
               <a:rPr lang="en-US" smtClean="0"/>
               <a:pPr/>
-              <a:t>9/17/2008</a:t>
+              <a:t>9/19/2008</a:t>
             </a:fld>
             <a:endParaRPr lang="en-US"/>
           </a:p>
@@ -1073,7 +1062,7 @@
             <a:fld id="{BFF0141B-3676-46F2-8A5A-C346ECA90DD6}" type="datetimeFigureOut">
               <a:rPr lang="en-US" smtClean="0"/>
               <a:pPr/>
-              <a:t>9/17/2008</a:t>
+              <a:t>9/19/2008</a:t>
             </a:fld>
             <a:endParaRPr lang="en-US"/>
           </a:p>
@@ -1358,7 +1347,7 @@
             <a:fld id="{BFF0141B-3676-46F2-8A5A-C346ECA90DD6}" type="datetimeFigureOut">
               <a:rPr lang="en-US" smtClean="0"/>
               <a:pPr/>
-              <a:t>9/17/2008</a:t>
+              <a:t>9/19/2008</a:t>
             </a:fld>
             <a:endParaRPr lang="en-US"/>
           </a:p>
@@ -1777,7 +1766,7 @@
             <a:fld id="{BFF0141B-3676-46F2-8A5A-C346ECA90DD6}" type="datetimeFigureOut">
               <a:rPr lang="en-US" smtClean="0"/>
               <a:pPr/>
-              <a:t>9/17/2008</a:t>
+              <a:t>9/19/2008</a:t>
             </a:fld>
             <a:endParaRPr lang="en-US"/>
           </a:p>
@@ -1892,7 +1881,7 @@
             <a:fld id="{BFF0141B-3676-46F2-8A5A-C346ECA90DD6}" type="datetimeFigureOut">
               <a:rPr lang="en-US" smtClean="0"/>
               <a:pPr/>
-              <a:t>9/17/2008</a:t>
+              <a:t>9/19/2008</a:t>
             </a:fld>
             <a:endParaRPr lang="en-US"/>
           </a:p>
@@ -1984,7 +1973,7 @@
             <a:fld id="{BFF0141B-3676-46F2-8A5A-C346ECA90DD6}" type="datetimeFigureOut">
               <a:rPr lang="en-US" smtClean="0"/>
               <a:pPr/>
-              <a:t>9/17/2008</a:t>
+              <a:t>9/19/2008</a:t>
             </a:fld>
             <a:endParaRPr lang="en-US"/>
           </a:p>
@@ -2258,7 +2247,7 @@
             <a:fld id="{BFF0141B-3676-46F2-8A5A-C346ECA90DD6}" type="datetimeFigureOut">
               <a:rPr lang="en-US" smtClean="0"/>
               <a:pPr/>
-              <a:t>9/17/2008</a:t>
+              <a:t>9/19/2008</a:t>
             </a:fld>
             <a:endParaRPr lang="en-US"/>
           </a:p>
@@ -2508,7 +2497,7 @@
             <a:fld id="{BFF0141B-3676-46F2-8A5A-C346ECA90DD6}" type="datetimeFigureOut">
               <a:rPr lang="en-US" smtClean="0"/>
               <a:pPr/>
-              <a:t>9/17/2008</a:t>
+              <a:t>9/19/2008</a:t>
             </a:fld>
             <a:endParaRPr lang="en-US"/>
           </a:p>
@@ -2718,7 +2707,7 @@
             <a:fld id="{BFF0141B-3676-46F2-8A5A-C346ECA90DD6}" type="datetimeFigureOut">
               <a:rPr lang="en-US" smtClean="0"/>
               <a:pPr/>
-              <a:t>9/17/2008</a:t>
+              <a:t>9/19/2008</a:t>
             </a:fld>
             <a:endParaRPr lang="en-US"/>
           </a:p>
@@ -3113,11 +3102,7 @@
           <a:p>
             <a:r>
               <a:rPr lang="en-US" sz="4900" dirty="0" smtClean="0"/>
-              <a:t>Overview and Demo of </a:t>
-            </a:r>
-            <a:r>
-              <a:rPr lang="en-US" sz="4900" dirty="0" smtClean="0"/>
-              <a:t>CaIntegrator2</a:t>
+              <a:t>Overview and Demo of CaIntegrator2</a:t>
             </a:r>
             <a:br>
               <a:rPr lang="en-US" sz="4900" dirty="0" smtClean="0"/>
@@ -3222,6 +3207,1063 @@
   <p:clrMapOvr>
     <a:masterClrMapping/>
   </p:clrMapOvr>
+  <p:timing>
+    <p:tnLst>
+      <p:par>
+        <p:cTn id="1" dur="indefinite" restart="never" nodeType="tmRoot"/>
+      </p:par>
+    </p:tnLst>
+  </p:timing>
+</p:sld>
+</file>
+
+<file path=ppt/slides/slide10.xml><?xml version="1.0" encoding="utf-8"?>
+<p:sld xmlns:a="http://schemas.openxmlformats.org/drawingml/2006/main" xmlns:r="http://schemas.openxmlformats.org/officeDocument/2006/relationships" xmlns:p="http://schemas.openxmlformats.org/presentationml/2006/main">
+  <p:cSld>
+    <p:spTree>
+      <p:nvGrpSpPr>
+        <p:cNvPr id="1" name=""/>
+        <p:cNvGrpSpPr/>
+        <p:nvPr/>
+      </p:nvGrpSpPr>
+      <p:grpSpPr>
+        <a:xfrm>
+          <a:off x="0" y="0"/>
+          <a:ext cx="0" cy="0"/>
+          <a:chOff x="0" y="0"/>
+          <a:chExt cx="0" cy="0"/>
+        </a:xfrm>
+      </p:grpSpPr>
+      <p:pic>
+        <p:nvPicPr>
+          <p:cNvPr id="2050" name="Picture 2"/>
+          <p:cNvPicPr>
+            <a:picLocks noChangeAspect="1" noChangeArrowheads="1"/>
+          </p:cNvPicPr>
+          <p:nvPr/>
+        </p:nvPicPr>
+        <p:blipFill>
+          <a:blip r:embed="rId2"/>
+          <a:srcRect/>
+          <a:stretch>
+            <a:fillRect/>
+          </a:stretch>
+        </p:blipFill>
+        <p:spPr bwMode="auto">
+          <a:xfrm>
+            <a:off x="795814" y="202882"/>
+            <a:ext cx="7509986" cy="6426518"/>
+          </a:xfrm>
+          <a:prstGeom prst="rect">
+            <a:avLst/>
+          </a:prstGeom>
+          <a:noFill/>
+          <a:ln w="9525">
+            <a:noFill/>
+            <a:miter lim="800000"/>
+            <a:headEnd/>
+            <a:tailEnd/>
+          </a:ln>
+          <a:effectLst/>
+        </p:spPr>
+      </p:pic>
+    </p:spTree>
+  </p:cSld>
+  <p:clrMapOvr>
+    <a:masterClrMapping/>
+  </p:clrMapOvr>
+  <p:timing>
+    <p:tnLst>
+      <p:par>
+        <p:cTn id="1" dur="indefinite" restart="never" nodeType="tmRoot"/>
+      </p:par>
+    </p:tnLst>
+  </p:timing>
+</p:sld>
+</file>
+
+<file path=ppt/slides/slide11.xml><?xml version="1.0" encoding="utf-8"?>
+<p:sld xmlns:a="http://schemas.openxmlformats.org/drawingml/2006/main" xmlns:r="http://schemas.openxmlformats.org/officeDocument/2006/relationships" xmlns:p="http://schemas.openxmlformats.org/presentationml/2006/main">
+  <p:cSld>
+    <p:spTree>
+      <p:nvGrpSpPr>
+        <p:cNvPr id="1" name=""/>
+        <p:cNvGrpSpPr/>
+        <p:nvPr/>
+      </p:nvGrpSpPr>
+      <p:grpSpPr>
+        <a:xfrm>
+          <a:off x="0" y="0"/>
+          <a:ext cx="0" cy="0"/>
+          <a:chOff x="0" y="0"/>
+          <a:chExt cx="0" cy="0"/>
+        </a:xfrm>
+      </p:grpSpPr>
+      <p:pic>
+        <p:nvPicPr>
+          <p:cNvPr id="3074" name="Picture 2"/>
+          <p:cNvPicPr>
+            <a:picLocks noChangeAspect="1" noChangeArrowheads="1"/>
+          </p:cNvPicPr>
+          <p:nvPr/>
+        </p:nvPicPr>
+        <p:blipFill>
+          <a:blip r:embed="rId2"/>
+          <a:srcRect/>
+          <a:stretch>
+            <a:fillRect/>
+          </a:stretch>
+        </p:blipFill>
+        <p:spPr bwMode="auto">
+          <a:xfrm>
+            <a:off x="457200" y="152400"/>
+            <a:ext cx="8263027" cy="6553200"/>
+          </a:xfrm>
+          <a:prstGeom prst="rect">
+            <a:avLst/>
+          </a:prstGeom>
+          <a:noFill/>
+          <a:ln w="9525">
+            <a:noFill/>
+            <a:miter lim="800000"/>
+            <a:headEnd/>
+            <a:tailEnd/>
+          </a:ln>
+          <a:effectLst/>
+        </p:spPr>
+      </p:pic>
+      <p:sp>
+        <p:nvSpPr>
+          <p:cNvPr id="3" name="Left Arrow 2"/>
+          <p:cNvSpPr/>
+          <p:nvPr/>
+        </p:nvSpPr>
+        <p:spPr>
+          <a:xfrm>
+            <a:off x="1138990" y="2562726"/>
+            <a:ext cx="842210" cy="457200"/>
+          </a:xfrm>
+          <a:prstGeom prst="leftArrow">
+            <a:avLst/>
+          </a:prstGeom>
+          <a:solidFill>
+            <a:srgbClr val="FFFF00"/>
+          </a:solidFill>
+          <a:ln>
+            <a:solidFill>
+              <a:schemeClr val="accent6">
+                <a:lumMod val="50000"/>
+              </a:schemeClr>
+            </a:solidFill>
+          </a:ln>
+        </p:spPr>
+        <p:style>
+          <a:lnRef idx="2">
+            <a:schemeClr val="accent1">
+              <a:shade val="50000"/>
+            </a:schemeClr>
+          </a:lnRef>
+          <a:fillRef idx="1">
+            <a:schemeClr val="accent1"/>
+          </a:fillRef>
+          <a:effectRef idx="0">
+            <a:schemeClr val="accent1"/>
+          </a:effectRef>
+          <a:fontRef idx="minor">
+            <a:schemeClr val="lt1"/>
+          </a:fontRef>
+        </p:style>
+        <p:txBody>
+          <a:bodyPr rtlCol="0" anchor="ctr"/>
+          <a:lstStyle/>
+          <a:p>
+            <a:pPr algn="ctr"/>
+            <a:endParaRPr lang="en-US"/>
+          </a:p>
+        </p:txBody>
+      </p:sp>
+    </p:spTree>
+  </p:cSld>
+  <p:clrMapOvr>
+    <a:masterClrMapping/>
+  </p:clrMapOvr>
+  <p:timing>
+    <p:tnLst>
+      <p:par>
+        <p:cTn id="1" dur="indefinite" restart="never" nodeType="tmRoot"/>
+      </p:par>
+    </p:tnLst>
+  </p:timing>
+</p:sld>
+</file>
+
+<file path=ppt/slides/slide12.xml><?xml version="1.0" encoding="utf-8"?>
+<p:sld xmlns:a="http://schemas.openxmlformats.org/drawingml/2006/main" xmlns:r="http://schemas.openxmlformats.org/officeDocument/2006/relationships" xmlns:p="http://schemas.openxmlformats.org/presentationml/2006/main">
+  <p:cSld>
+    <p:spTree>
+      <p:nvGrpSpPr>
+        <p:cNvPr id="1" name=""/>
+        <p:cNvGrpSpPr/>
+        <p:nvPr/>
+      </p:nvGrpSpPr>
+      <p:grpSpPr>
+        <a:xfrm>
+          <a:off x="0" y="0"/>
+          <a:ext cx="0" cy="0"/>
+          <a:chOff x="0" y="0"/>
+          <a:chExt cx="0" cy="0"/>
+        </a:xfrm>
+      </p:grpSpPr>
+      <p:pic>
+        <p:nvPicPr>
+          <p:cNvPr id="4098" name="Picture 2"/>
+          <p:cNvPicPr>
+            <a:picLocks noChangeAspect="1" noChangeArrowheads="1"/>
+          </p:cNvPicPr>
+          <p:nvPr/>
+        </p:nvPicPr>
+        <p:blipFill>
+          <a:blip r:embed="rId2"/>
+          <a:srcRect/>
+          <a:stretch>
+            <a:fillRect/>
+          </a:stretch>
+        </p:blipFill>
+        <p:spPr bwMode="auto">
+          <a:xfrm>
+            <a:off x="990600" y="152400"/>
+            <a:ext cx="7239000" cy="6570601"/>
+          </a:xfrm>
+          <a:prstGeom prst="rect">
+            <a:avLst/>
+          </a:prstGeom>
+          <a:noFill/>
+          <a:ln w="9525">
+            <a:noFill/>
+            <a:miter lim="800000"/>
+            <a:headEnd/>
+            <a:tailEnd/>
+          </a:ln>
+          <a:effectLst/>
+        </p:spPr>
+      </p:pic>
+      <p:sp>
+        <p:nvSpPr>
+          <p:cNvPr id="3" name="Left Arrow 2"/>
+          <p:cNvSpPr/>
+          <p:nvPr/>
+        </p:nvSpPr>
+        <p:spPr>
+          <a:xfrm>
+            <a:off x="1487905" y="2630905"/>
+            <a:ext cx="842210" cy="457200"/>
+          </a:xfrm>
+          <a:prstGeom prst="leftArrow">
+            <a:avLst/>
+          </a:prstGeom>
+          <a:solidFill>
+            <a:srgbClr val="FFFF00"/>
+          </a:solidFill>
+          <a:ln>
+            <a:solidFill>
+              <a:schemeClr val="accent6">
+                <a:lumMod val="50000"/>
+              </a:schemeClr>
+            </a:solidFill>
+          </a:ln>
+        </p:spPr>
+        <p:style>
+          <a:lnRef idx="2">
+            <a:schemeClr val="accent1">
+              <a:shade val="50000"/>
+            </a:schemeClr>
+          </a:lnRef>
+          <a:fillRef idx="1">
+            <a:schemeClr val="accent1"/>
+          </a:fillRef>
+          <a:effectRef idx="0">
+            <a:schemeClr val="accent1"/>
+          </a:effectRef>
+          <a:fontRef idx="minor">
+            <a:schemeClr val="lt1"/>
+          </a:fontRef>
+        </p:style>
+        <p:txBody>
+          <a:bodyPr rtlCol="0" anchor="ctr"/>
+          <a:lstStyle/>
+          <a:p>
+            <a:pPr algn="ctr"/>
+            <a:endParaRPr lang="en-US"/>
+          </a:p>
+        </p:txBody>
+      </p:sp>
+    </p:spTree>
+  </p:cSld>
+  <p:clrMapOvr>
+    <a:masterClrMapping/>
+  </p:clrMapOvr>
+  <p:timing>
+    <p:tnLst>
+      <p:par>
+        <p:cTn id="1" dur="indefinite" restart="never" nodeType="tmRoot"/>
+      </p:par>
+    </p:tnLst>
+  </p:timing>
+</p:sld>
+</file>
+
+<file path=ppt/slides/slide13.xml><?xml version="1.0" encoding="utf-8"?>
+<p:sld xmlns:a="http://schemas.openxmlformats.org/drawingml/2006/main" xmlns:r="http://schemas.openxmlformats.org/officeDocument/2006/relationships" xmlns:p="http://schemas.openxmlformats.org/presentationml/2006/main">
+  <p:cSld>
+    <p:spTree>
+      <p:nvGrpSpPr>
+        <p:cNvPr id="1" name=""/>
+        <p:cNvGrpSpPr/>
+        <p:nvPr/>
+      </p:nvGrpSpPr>
+      <p:grpSpPr>
+        <a:xfrm>
+          <a:off x="0" y="0"/>
+          <a:ext cx="0" cy="0"/>
+          <a:chOff x="0" y="0"/>
+          <a:chExt cx="0" cy="0"/>
+        </a:xfrm>
+      </p:grpSpPr>
+      <p:sp>
+        <p:nvSpPr>
+          <p:cNvPr id="3" name="Content Placeholder 2"/>
+          <p:cNvSpPr>
+            <a:spLocks noGrp="1"/>
+          </p:cNvSpPr>
+          <p:nvPr>
+            <p:ph idx="1"/>
+          </p:nvPr>
+        </p:nvSpPr>
+        <p:spPr>
+          <a:xfrm>
+            <a:off x="457200" y="1267326"/>
+            <a:ext cx="8229600" cy="5133474"/>
+          </a:xfrm>
+        </p:spPr>
+        <p:txBody>
+          <a:bodyPr>
+            <a:normAutofit fontScale="85000" lnSpcReduction="20000"/>
+          </a:bodyPr>
+          <a:lstStyle/>
+          <a:p>
+            <a:r>
+              <a:rPr lang="en-US" dirty="0" smtClean="0"/>
+              <a:t>Schedule</a:t>
+            </a:r>
+          </a:p>
+          <a:p>
+            <a:pPr lvl="1"/>
+            <a:r>
+              <a:rPr lang="en-US" dirty="0" smtClean="0"/>
+              <a:t>A beta release by end of the </a:t>
+            </a:r>
+            <a:r>
+              <a:rPr lang="en-US" dirty="0" smtClean="0"/>
+              <a:t>year</a:t>
+            </a:r>
+          </a:p>
+          <a:p>
+            <a:pPr lvl="1"/>
+            <a:r>
+              <a:rPr lang="en-US" dirty="0" smtClean="0"/>
+              <a:t>Looking for interested partners</a:t>
+            </a:r>
+            <a:endParaRPr lang="en-US" dirty="0" smtClean="0"/>
+          </a:p>
+          <a:p>
+            <a:pPr lvl="1"/>
+            <a:endParaRPr lang="en-US" dirty="0" smtClean="0"/>
+          </a:p>
+          <a:p>
+            <a:r>
+              <a:rPr lang="en-US" dirty="0" smtClean="0"/>
+              <a:t>Future Directions</a:t>
+            </a:r>
+          </a:p>
+          <a:p>
+            <a:pPr lvl="1"/>
+            <a:r>
+              <a:rPr lang="en-US" dirty="0" smtClean="0"/>
+              <a:t>Incorporate other types of genomic data such as copy number, </a:t>
+            </a:r>
+            <a:r>
+              <a:rPr lang="en-US" dirty="0" err="1" smtClean="0"/>
+              <a:t>methylation</a:t>
+            </a:r>
+            <a:r>
+              <a:rPr lang="en-US" dirty="0" smtClean="0"/>
+              <a:t>, and </a:t>
+            </a:r>
+            <a:r>
+              <a:rPr lang="en-US" dirty="0" smtClean="0"/>
+              <a:t>genotypes</a:t>
+            </a:r>
+          </a:p>
+          <a:p>
+            <a:pPr lvl="1"/>
+            <a:endParaRPr lang="en-US" dirty="0" smtClean="0"/>
+          </a:p>
+          <a:p>
+            <a:pPr lvl="1"/>
+            <a:r>
+              <a:rPr lang="en-US" dirty="0" smtClean="0"/>
+              <a:t>Tighter integration with </a:t>
+            </a:r>
+            <a:r>
+              <a:rPr lang="en-US" dirty="0" err="1" smtClean="0"/>
+              <a:t>GenePattern</a:t>
+            </a:r>
+            <a:r>
+              <a:rPr lang="en-US" dirty="0" smtClean="0"/>
+              <a:t> and other analysis </a:t>
+            </a:r>
+            <a:r>
+              <a:rPr lang="en-US" dirty="0" smtClean="0"/>
+              <a:t>tools</a:t>
+            </a:r>
+          </a:p>
+          <a:p>
+            <a:pPr lvl="1"/>
+            <a:endParaRPr lang="en-US" dirty="0" smtClean="0"/>
+          </a:p>
+          <a:p>
+            <a:pPr lvl="1"/>
+            <a:r>
+              <a:rPr lang="en-US" dirty="0" smtClean="0"/>
+              <a:t>Handle studies with multiple </a:t>
+            </a:r>
+            <a:r>
+              <a:rPr lang="en-US" dirty="0" err="1" smtClean="0"/>
+              <a:t>timepoints</a:t>
+            </a:r>
+            <a:endParaRPr lang="en-US" dirty="0" smtClean="0"/>
+          </a:p>
+          <a:p>
+            <a:pPr lvl="1"/>
+            <a:endParaRPr lang="en-US" dirty="0"/>
+          </a:p>
+          <a:p>
+            <a:pPr lvl="1"/>
+            <a:r>
+              <a:rPr lang="en-US" dirty="0" smtClean="0"/>
+              <a:t>Allow regular updates of data</a:t>
+            </a:r>
+          </a:p>
+        </p:txBody>
+      </p:sp>
+      <p:pic>
+        <p:nvPicPr>
+          <p:cNvPr id="1029" name="Picture 5"/>
+          <p:cNvPicPr>
+            <a:picLocks noChangeAspect="1" noChangeArrowheads="1"/>
+          </p:cNvPicPr>
+          <p:nvPr/>
+        </p:nvPicPr>
+        <p:blipFill>
+          <a:blip r:embed="rId2"/>
+          <a:srcRect/>
+          <a:stretch>
+            <a:fillRect/>
+          </a:stretch>
+        </p:blipFill>
+        <p:spPr bwMode="auto">
+          <a:xfrm>
+            <a:off x="4391025" y="4543425"/>
+            <a:ext cx="542925" cy="561518"/>
+          </a:xfrm>
+          <a:prstGeom prst="rect">
+            <a:avLst/>
+          </a:prstGeom>
+          <a:noFill/>
+          <a:ln w="9525">
+            <a:noFill/>
+            <a:miter lim="800000"/>
+            <a:headEnd/>
+            <a:tailEnd/>
+          </a:ln>
+          <a:effectLst/>
+        </p:spPr>
+      </p:pic>
+      <p:sp>
+        <p:nvSpPr>
+          <p:cNvPr id="2" name="Title 1"/>
+          <p:cNvSpPr>
+            <a:spLocks noGrp="1"/>
+          </p:cNvSpPr>
+          <p:nvPr>
+            <p:ph type="title"/>
+          </p:nvPr>
+        </p:nvSpPr>
+        <p:spPr/>
+        <p:txBody>
+          <a:bodyPr/>
+          <a:lstStyle/>
+          <a:p>
+            <a:r>
+              <a:rPr lang="en-US" dirty="0" smtClean="0"/>
+              <a:t>The Future</a:t>
+            </a:r>
+            <a:endParaRPr lang="en-US" dirty="0"/>
+          </a:p>
+        </p:txBody>
+      </p:sp>
+      <p:pic>
+        <p:nvPicPr>
+          <p:cNvPr id="1028" name="Picture 4"/>
+          <p:cNvPicPr>
+            <a:picLocks noChangeAspect="1" noChangeArrowheads="1"/>
+          </p:cNvPicPr>
+          <p:nvPr/>
+        </p:nvPicPr>
+        <p:blipFill>
+          <a:blip r:embed="rId3"/>
+          <a:srcRect/>
+          <a:stretch>
+            <a:fillRect/>
+          </a:stretch>
+        </p:blipFill>
+        <p:spPr bwMode="auto">
+          <a:xfrm>
+            <a:off x="1981200" y="4619625"/>
+            <a:ext cx="2105025" cy="485775"/>
+          </a:xfrm>
+          <a:prstGeom prst="rect">
+            <a:avLst/>
+          </a:prstGeom>
+          <a:noFill/>
+          <a:ln w="9525">
+            <a:noFill/>
+            <a:miter lim="800000"/>
+            <a:headEnd/>
+            <a:tailEnd/>
+          </a:ln>
+          <a:effectLst/>
+        </p:spPr>
+      </p:pic>
+      <p:cxnSp>
+        <p:nvCxnSpPr>
+          <p:cNvPr id="10" name="Straight Connector 9"/>
+          <p:cNvCxnSpPr/>
+          <p:nvPr/>
+        </p:nvCxnSpPr>
+        <p:spPr>
+          <a:xfrm>
+            <a:off x="6781800" y="5562600"/>
+            <a:ext cx="1600200" cy="1588"/>
+          </a:xfrm>
+          <a:prstGeom prst="line">
+            <a:avLst/>
+          </a:prstGeom>
+        </p:spPr>
+        <p:style>
+          <a:lnRef idx="1">
+            <a:schemeClr val="accent1"/>
+          </a:lnRef>
+          <a:fillRef idx="0">
+            <a:schemeClr val="accent1"/>
+          </a:fillRef>
+          <a:effectRef idx="0">
+            <a:schemeClr val="accent1"/>
+          </a:effectRef>
+          <a:fontRef idx="minor">
+            <a:schemeClr val="tx1"/>
+          </a:fontRef>
+        </p:style>
+      </p:cxnSp>
+      <p:sp>
+        <p:nvSpPr>
+          <p:cNvPr id="11" name="Oval 10"/>
+          <p:cNvSpPr/>
+          <p:nvPr/>
+        </p:nvSpPr>
+        <p:spPr>
+          <a:xfrm>
+            <a:off x="8305800" y="5486400"/>
+            <a:ext cx="152400" cy="152400"/>
+          </a:xfrm>
+          <a:prstGeom prst="ellipse">
+            <a:avLst/>
+          </a:prstGeom>
+          <a:scene3d>
+            <a:camera prst="orthographicFront"/>
+            <a:lightRig rig="threePt" dir="t"/>
+          </a:scene3d>
+          <a:sp3d>
+            <a:bevelT/>
+          </a:sp3d>
+        </p:spPr>
+        <p:style>
+          <a:lnRef idx="2">
+            <a:schemeClr val="accent1">
+              <a:shade val="50000"/>
+            </a:schemeClr>
+          </a:lnRef>
+          <a:fillRef idx="1">
+            <a:schemeClr val="accent1"/>
+          </a:fillRef>
+          <a:effectRef idx="0">
+            <a:schemeClr val="accent1"/>
+          </a:effectRef>
+          <a:fontRef idx="minor">
+            <a:schemeClr val="lt1"/>
+          </a:fontRef>
+        </p:style>
+        <p:txBody>
+          <a:bodyPr rtlCol="0" anchor="ctr"/>
+          <a:lstStyle/>
+          <a:p>
+            <a:pPr algn="ctr"/>
+            <a:endParaRPr lang="en-US"/>
+          </a:p>
+        </p:txBody>
+      </p:sp>
+      <p:sp>
+        <p:nvSpPr>
+          <p:cNvPr id="12" name="Oval 11"/>
+          <p:cNvSpPr/>
+          <p:nvPr/>
+        </p:nvSpPr>
+        <p:spPr>
+          <a:xfrm>
+            <a:off x="7315200" y="5486400"/>
+            <a:ext cx="152400" cy="152400"/>
+          </a:xfrm>
+          <a:prstGeom prst="ellipse">
+            <a:avLst/>
+          </a:prstGeom>
+          <a:scene3d>
+            <a:camera prst="orthographicFront"/>
+            <a:lightRig rig="threePt" dir="t"/>
+          </a:scene3d>
+          <a:sp3d>
+            <a:bevelT/>
+          </a:sp3d>
+        </p:spPr>
+        <p:style>
+          <a:lnRef idx="2">
+            <a:schemeClr val="accent1">
+              <a:shade val="50000"/>
+            </a:schemeClr>
+          </a:lnRef>
+          <a:fillRef idx="1">
+            <a:schemeClr val="accent1"/>
+          </a:fillRef>
+          <a:effectRef idx="0">
+            <a:schemeClr val="accent1"/>
+          </a:effectRef>
+          <a:fontRef idx="minor">
+            <a:schemeClr val="lt1"/>
+          </a:fontRef>
+        </p:style>
+        <p:txBody>
+          <a:bodyPr rtlCol="0" anchor="ctr"/>
+          <a:lstStyle/>
+          <a:p>
+            <a:pPr algn="ctr"/>
+            <a:endParaRPr lang="en-US"/>
+          </a:p>
+        </p:txBody>
+      </p:sp>
+      <p:sp>
+        <p:nvSpPr>
+          <p:cNvPr id="13" name="Oval 12"/>
+          <p:cNvSpPr/>
+          <p:nvPr/>
+        </p:nvSpPr>
+        <p:spPr>
+          <a:xfrm>
+            <a:off x="6705600" y="5502442"/>
+            <a:ext cx="152400" cy="152400"/>
+          </a:xfrm>
+          <a:prstGeom prst="ellipse">
+            <a:avLst/>
+          </a:prstGeom>
+          <a:scene3d>
+            <a:camera prst="orthographicFront"/>
+            <a:lightRig rig="threePt" dir="t"/>
+          </a:scene3d>
+          <a:sp3d>
+            <a:bevelT/>
+          </a:sp3d>
+        </p:spPr>
+        <p:style>
+          <a:lnRef idx="2">
+            <a:schemeClr val="accent1">
+              <a:shade val="50000"/>
+            </a:schemeClr>
+          </a:lnRef>
+          <a:fillRef idx="1">
+            <a:schemeClr val="accent1"/>
+          </a:fillRef>
+          <a:effectRef idx="0">
+            <a:schemeClr val="accent1"/>
+          </a:effectRef>
+          <a:fontRef idx="minor">
+            <a:schemeClr val="lt1"/>
+          </a:fontRef>
+        </p:style>
+        <p:txBody>
+          <a:bodyPr rtlCol="0" anchor="ctr"/>
+          <a:lstStyle/>
+          <a:p>
+            <a:pPr algn="ctr"/>
+            <a:endParaRPr lang="en-US"/>
+          </a:p>
+        </p:txBody>
+      </p:sp>
+      <p:sp>
+        <p:nvSpPr>
+          <p:cNvPr id="14" name="TextBox 13"/>
+          <p:cNvSpPr txBox="1"/>
+          <p:nvPr/>
+        </p:nvSpPr>
+        <p:spPr>
+          <a:xfrm>
+            <a:off x="6400800" y="5715000"/>
+            <a:ext cx="2895600" cy="261610"/>
+          </a:xfrm>
+          <a:prstGeom prst="rect">
+            <a:avLst/>
+          </a:prstGeom>
+          <a:noFill/>
+        </p:spPr>
+        <p:txBody>
+          <a:bodyPr wrap="square" rtlCol="0">
+            <a:spAutoFit/>
+          </a:bodyPr>
+          <a:lstStyle/>
+          <a:p>
+            <a:r>
+              <a:rPr lang="en-US" sz="1100" dirty="0" smtClean="0"/>
+              <a:t>Diagnosis   Treatment             </a:t>
+            </a:r>
+            <a:r>
+              <a:rPr lang="en-US" sz="1100" dirty="0" err="1" smtClean="0"/>
+              <a:t>Followup</a:t>
+            </a:r>
+            <a:r>
+              <a:rPr lang="en-US" sz="1100" dirty="0" smtClean="0"/>
+              <a:t> </a:t>
+            </a:r>
+            <a:endParaRPr lang="en-US" sz="1100" dirty="0"/>
+          </a:p>
+        </p:txBody>
+      </p:sp>
+      <p:sp>
+        <p:nvSpPr>
+          <p:cNvPr id="15" name="TextBox 14"/>
+          <p:cNvSpPr txBox="1"/>
+          <p:nvPr/>
+        </p:nvSpPr>
+        <p:spPr>
+          <a:xfrm>
+            <a:off x="4579520" y="4711911"/>
+            <a:ext cx="1524000" cy="369332"/>
+          </a:xfrm>
+          <a:prstGeom prst="rect">
+            <a:avLst/>
+          </a:prstGeom>
+          <a:noFill/>
+        </p:spPr>
+        <p:txBody>
+          <a:bodyPr wrap="square" rtlCol="0">
+            <a:spAutoFit/>
+          </a:bodyPr>
+          <a:lstStyle/>
+          <a:p>
+            <a:r>
+              <a:rPr lang="en-US" b="1" dirty="0" err="1" smtClean="0"/>
+              <a:t>geWorkbench</a:t>
+            </a:r>
+            <a:endParaRPr lang="en-US" b="1" dirty="0"/>
+          </a:p>
+        </p:txBody>
+      </p:sp>
+    </p:spTree>
+  </p:cSld>
+  <p:clrMapOvr>
+    <a:masterClrMapping/>
+  </p:clrMapOvr>
+  <p:timing>
+    <p:tnLst>
+      <p:par>
+        <p:cTn id="1" dur="indefinite" restart="never" nodeType="tmRoot"/>
+      </p:par>
+    </p:tnLst>
+  </p:timing>
+</p:sld>
+</file>
+
+<file path=ppt/slides/slide14.xml><?xml version="1.0" encoding="utf-8"?>
+<p:sld xmlns:a="http://schemas.openxmlformats.org/drawingml/2006/main" xmlns:r="http://schemas.openxmlformats.org/officeDocument/2006/relationships" xmlns:p="http://schemas.openxmlformats.org/presentationml/2006/main">
+  <p:cSld>
+    <p:spTree>
+      <p:nvGrpSpPr>
+        <p:cNvPr id="1" name=""/>
+        <p:cNvGrpSpPr/>
+        <p:nvPr/>
+      </p:nvGrpSpPr>
+      <p:grpSpPr>
+        <a:xfrm>
+          <a:off x="0" y="0"/>
+          <a:ext cx="0" cy="0"/>
+          <a:chOff x="0" y="0"/>
+          <a:chExt cx="0" cy="0"/>
+        </a:xfrm>
+      </p:grpSpPr>
+      <p:sp>
+        <p:nvSpPr>
+          <p:cNvPr id="2" name="Title 1"/>
+          <p:cNvSpPr>
+            <a:spLocks noGrp="1"/>
+          </p:cNvSpPr>
+          <p:nvPr>
+            <p:ph type="title"/>
+          </p:nvPr>
+        </p:nvSpPr>
+        <p:spPr/>
+        <p:txBody>
+          <a:bodyPr/>
+          <a:lstStyle/>
+          <a:p>
+            <a:r>
+              <a:rPr lang="en-US" dirty="0" smtClean="0"/>
+              <a:t>Credits</a:t>
+            </a:r>
+            <a:endParaRPr lang="en-US" dirty="0"/>
+          </a:p>
+        </p:txBody>
+      </p:sp>
+      <p:sp>
+        <p:nvSpPr>
+          <p:cNvPr id="4" name="Content Placeholder 3"/>
+          <p:cNvSpPr>
+            <a:spLocks noGrp="1"/>
+          </p:cNvSpPr>
+          <p:nvPr>
+            <p:ph sz="half" idx="1"/>
+          </p:nvPr>
+        </p:nvSpPr>
+        <p:spPr/>
+        <p:txBody>
+          <a:bodyPr>
+            <a:normAutofit lnSpcReduction="10000"/>
+          </a:bodyPr>
+          <a:lstStyle/>
+          <a:p>
+            <a:r>
+              <a:rPr lang="en-US" dirty="0" smtClean="0"/>
+              <a:t>Developers, Architects and Project Managers</a:t>
+            </a:r>
+          </a:p>
+          <a:p>
+            <a:pPr lvl="1"/>
+            <a:r>
+              <a:rPr lang="en-US" dirty="0" smtClean="0"/>
+              <a:t>TJ Andrews</a:t>
+            </a:r>
+          </a:p>
+          <a:p>
+            <a:pPr lvl="1"/>
+            <a:r>
+              <a:rPr lang="en-US" dirty="0" smtClean="0"/>
+              <a:t>William </a:t>
+            </a:r>
+            <a:r>
+              <a:rPr lang="en-US" dirty="0" err="1" smtClean="0"/>
+              <a:t>FitzHugh</a:t>
+            </a:r>
+            <a:endParaRPr lang="en-US" dirty="0" smtClean="0"/>
+          </a:p>
+          <a:p>
+            <a:pPr lvl="1"/>
+            <a:r>
+              <a:rPr lang="en-US" dirty="0" smtClean="0"/>
+              <a:t>Michael </a:t>
+            </a:r>
+            <a:r>
+              <a:rPr lang="en-US" dirty="0" err="1" smtClean="0"/>
+              <a:t>Holck</a:t>
+            </a:r>
+            <a:endParaRPr lang="en-US" dirty="0" smtClean="0"/>
+          </a:p>
+          <a:p>
+            <a:pPr lvl="1"/>
+            <a:r>
+              <a:rPr lang="en-US" dirty="0" smtClean="0"/>
+              <a:t>Shine Jacob	</a:t>
+            </a:r>
+          </a:p>
+          <a:p>
+            <a:pPr lvl="1"/>
+            <a:r>
+              <a:rPr lang="en-US" dirty="0" smtClean="0"/>
+              <a:t>Mark Lewis</a:t>
+            </a:r>
+          </a:p>
+          <a:p>
+            <a:pPr lvl="1"/>
+            <a:r>
+              <a:rPr lang="en-US" dirty="0" smtClean="0"/>
+              <a:t>JP </a:t>
+            </a:r>
+            <a:r>
+              <a:rPr lang="en-US" dirty="0" err="1" smtClean="0"/>
+              <a:t>Marple</a:t>
+            </a:r>
+            <a:endParaRPr lang="en-US" dirty="0" smtClean="0"/>
+          </a:p>
+          <a:p>
+            <a:pPr lvl="1"/>
+            <a:r>
+              <a:rPr lang="en-US" dirty="0" err="1" smtClean="0"/>
+              <a:t>Sangeetha</a:t>
+            </a:r>
+            <a:r>
+              <a:rPr lang="en-US" dirty="0" smtClean="0"/>
+              <a:t> </a:t>
+            </a:r>
+            <a:r>
+              <a:rPr lang="en-US" dirty="0" err="1" smtClean="0"/>
+              <a:t>Rajagopal</a:t>
+            </a:r>
+            <a:r>
+              <a:rPr lang="en-US" dirty="0" smtClean="0"/>
+              <a:t> </a:t>
+            </a:r>
+          </a:p>
+          <a:p>
+            <a:pPr lvl="1"/>
+            <a:r>
+              <a:rPr lang="en-US" dirty="0" smtClean="0"/>
+              <a:t>Eric </a:t>
+            </a:r>
+            <a:r>
+              <a:rPr lang="en-US" dirty="0" err="1" smtClean="0"/>
+              <a:t>Tavela</a:t>
+            </a:r>
+            <a:endParaRPr lang="en-US" dirty="0" smtClean="0"/>
+          </a:p>
+        </p:txBody>
+      </p:sp>
+      <p:sp>
+        <p:nvSpPr>
+          <p:cNvPr id="5" name="Content Placeholder 4"/>
+          <p:cNvSpPr>
+            <a:spLocks noGrp="1"/>
+          </p:cNvSpPr>
+          <p:nvPr>
+            <p:ph sz="half" idx="2"/>
+          </p:nvPr>
+        </p:nvSpPr>
+        <p:spPr/>
+        <p:txBody>
+          <a:bodyPr>
+            <a:normAutofit lnSpcReduction="10000"/>
+          </a:bodyPr>
+          <a:lstStyle/>
+          <a:p>
+            <a:r>
+              <a:rPr lang="en-US" dirty="0" smtClean="0"/>
+              <a:t>Leadership and Requirements</a:t>
+            </a:r>
+          </a:p>
+          <a:p>
+            <a:pPr lvl="1"/>
+            <a:r>
+              <a:rPr lang="en-US" dirty="0" err="1" smtClean="0"/>
+              <a:t>Anand</a:t>
+            </a:r>
+            <a:r>
+              <a:rPr lang="en-US" dirty="0" smtClean="0"/>
+              <a:t> </a:t>
+            </a:r>
+            <a:r>
+              <a:rPr lang="en-US" dirty="0" err="1" smtClean="0"/>
+              <a:t>Basu</a:t>
+            </a:r>
+            <a:endParaRPr lang="en-US" dirty="0" smtClean="0"/>
+          </a:p>
+          <a:p>
+            <a:pPr lvl="1"/>
+            <a:r>
+              <a:rPr lang="en-US" dirty="0" err="1" smtClean="0"/>
+              <a:t>Subhashree</a:t>
+            </a:r>
+            <a:r>
+              <a:rPr lang="en-US" dirty="0" smtClean="0"/>
+              <a:t> </a:t>
+            </a:r>
+            <a:r>
+              <a:rPr lang="en-US" dirty="0" err="1" smtClean="0"/>
+              <a:t>Madhavan</a:t>
+            </a:r>
+            <a:endParaRPr lang="en-US" dirty="0" smtClean="0"/>
+          </a:p>
+          <a:p>
+            <a:endParaRPr lang="en-US" dirty="0" smtClean="0"/>
+          </a:p>
+          <a:p>
+            <a:r>
+              <a:rPr lang="en-US" dirty="0" smtClean="0"/>
+              <a:t>NCIA &amp; VASARI</a:t>
+            </a:r>
+          </a:p>
+          <a:p>
+            <a:pPr lvl="1"/>
+            <a:r>
+              <a:rPr lang="en-US" dirty="0" smtClean="0"/>
+              <a:t>Adam Flanders</a:t>
+            </a:r>
+          </a:p>
+          <a:p>
+            <a:pPr lvl="1"/>
+            <a:r>
+              <a:rPr lang="en-US" dirty="0" smtClean="0"/>
+              <a:t>John </a:t>
+            </a:r>
+            <a:r>
+              <a:rPr lang="en-US" dirty="0" err="1" smtClean="0"/>
+              <a:t>Freymann</a:t>
+            </a:r>
+            <a:endParaRPr lang="en-US" dirty="0" smtClean="0"/>
+          </a:p>
+          <a:p>
+            <a:pPr lvl="1"/>
+            <a:r>
+              <a:rPr lang="en-US" dirty="0" smtClean="0"/>
+              <a:t>Carl Jaffe</a:t>
+            </a:r>
+          </a:p>
+          <a:p>
+            <a:pPr lvl="1"/>
+            <a:r>
+              <a:rPr lang="en-US" dirty="0" smtClean="0"/>
+              <a:t>Daniel Rubin</a:t>
+            </a:r>
+          </a:p>
+          <a:p>
+            <a:endParaRPr lang="en-US" dirty="0"/>
+          </a:p>
+        </p:txBody>
+      </p:sp>
+    </p:spTree>
+  </p:cSld>
+  <p:clrMapOvr>
+    <a:masterClrMapping/>
+  </p:clrMapOvr>
+  <p:timing>
+    <p:tnLst>
+      <p:par>
+        <p:cTn id="1" dur="indefinite" restart="never" nodeType="tmRoot"/>
+      </p:par>
+    </p:tnLst>
+  </p:timing>
 </p:sld>
 </file>
 
@@ -3252,7 +4294,12 @@
             <p:ph type="title"/>
           </p:nvPr>
         </p:nvSpPr>
-        <p:spPr/>
+        <p:spPr>
+          <a:xfrm>
+            <a:off x="457200" y="152400"/>
+            <a:ext cx="8229600" cy="1143000"/>
+          </a:xfrm>
+        </p:spPr>
         <p:txBody>
           <a:bodyPr/>
           <a:lstStyle/>
@@ -3275,9 +4322,16 @@
             <p:ph idx="1"/>
           </p:nvPr>
         </p:nvSpPr>
-        <p:spPr/>
-        <p:txBody>
-          <a:bodyPr/>
+        <p:spPr>
+          <a:xfrm>
+            <a:off x="457200" y="1371600"/>
+            <a:ext cx="8229600" cy="5105400"/>
+          </a:xfrm>
+        </p:spPr>
+        <p:txBody>
+          <a:bodyPr>
+            <a:normAutofit fontScale="92500" lnSpcReduction="20000"/>
+          </a:bodyPr>
           <a:lstStyle/>
           <a:p>
             <a:r>
@@ -3316,14 +4370,45 @@
             <a:pPr lvl="1"/>
             <a:r>
               <a:rPr lang="en-US" dirty="0" smtClean="0"/>
-              <a:t>Explore and confirm hypotheses</a:t>
-            </a:r>
+              <a:t>Explore and confirm </a:t>
+            </a:r>
+            <a:r>
+              <a:rPr lang="en-US" dirty="0" smtClean="0"/>
+              <a:t>hypotheses</a:t>
+            </a:r>
+            <a:endParaRPr lang="en-US" dirty="0" smtClean="0"/>
           </a:p>
           <a:p>
             <a:pPr lvl="1"/>
             <a:r>
               <a:rPr lang="en-US" dirty="0" smtClean="0"/>
-              <a:t>Publish results and lists, e.g. of interesting genes </a:t>
+              <a:t>Publish results and lists, e.g. of interesting genes</a:t>
+            </a:r>
+          </a:p>
+          <a:p>
+            <a:r>
+              <a:rPr lang="en-US" dirty="0" smtClean="0"/>
+              <a:t>Have a way to roll out new studies easily</a:t>
+            </a:r>
+          </a:p>
+          <a:p>
+            <a:r>
+              <a:rPr lang="en-US" dirty="0" smtClean="0"/>
+              <a:t>Have a consistent user experience across different </a:t>
+            </a:r>
+            <a:r>
+              <a:rPr lang="en-US" dirty="0" smtClean="0"/>
+              <a:t>studies</a:t>
+            </a:r>
+          </a:p>
+          <a:p>
+            <a:r>
+              <a:rPr lang="en-US" dirty="0" smtClean="0"/>
+              <a:t>L</a:t>
+            </a:r>
+            <a:r>
+              <a:rPr lang="en-US" dirty="0" smtClean="0"/>
+              <a:t>ay the groundwork for cross-study comparisons</a:t>
             </a:r>
             <a:endParaRPr lang="en-US" dirty="0"/>
           </a:p>
@@ -3334,6 +4419,13 @@
   <p:clrMapOvr>
     <a:masterClrMapping/>
   </p:clrMapOvr>
+  <p:timing>
+    <p:tnLst>
+      <p:par>
+        <p:cTn id="1" dur="indefinite" restart="never" nodeType="tmRoot"/>
+      </p:par>
+    </p:tnLst>
+  </p:timing>
 </p:sld>
 </file>
 
@@ -3432,21 +4524,8 @@
             <a:pPr lvl="1"/>
             <a:r>
               <a:rPr lang="en-US" dirty="0" smtClean="0"/>
-              <a:t>A</a:t>
-            </a:r>
-            <a:r>
-              <a:rPr lang="en-US" dirty="0" smtClean="0"/>
-              <a:t> study </a:t>
-            </a:r>
-            <a:r>
-              <a:rPr lang="en-US" dirty="0" smtClean="0"/>
-              <a:t>to identify biomarkers predictive of response to therapy throughout the treatment cycle for women with Stage 3 breast cancer</a:t>
-            </a:r>
-            <a:r>
-              <a:rPr lang="en-US" dirty="0" smtClean="0"/>
-              <a:t>.</a:t>
-            </a:r>
-            <a:endParaRPr lang="en-US" dirty="0" smtClean="0"/>
+              <a:t>A study to identify biomarkers predictive of response to therapy throughout the treatment cycle for women with Stage 3 breast cancer.</a:t>
+            </a:r>
           </a:p>
         </p:txBody>
       </p:sp>
@@ -3521,6 +4600,13 @@
   <p:clrMapOvr>
     <a:masterClrMapping/>
   </p:clrMapOvr>
+  <p:timing>
+    <p:tnLst>
+      <p:par>
+        <p:cTn id="1" dur="indefinite" restart="never" nodeType="tmRoot"/>
+      </p:par>
+    </p:tnLst>
+  </p:timing>
 </p:sld>
 </file>
 
@@ -7521,129 +8607,86 @@
           <a:chExt cx="0" cy="0"/>
         </a:xfrm>
       </p:grpSpPr>
-      <p:sp>
-        <p:nvSpPr>
-          <p:cNvPr id="2" name="Title 1"/>
-          <p:cNvSpPr>
-            <a:spLocks noGrp="1"/>
-          </p:cNvSpPr>
-          <p:nvPr>
-            <p:ph type="title"/>
-          </p:nvPr>
-        </p:nvSpPr>
-        <p:spPr/>
-        <p:txBody>
-          <a:bodyPr/>
+      <p:pic>
+        <p:nvPicPr>
+          <p:cNvPr id="1027" name="Picture 3"/>
+          <p:cNvPicPr>
+            <a:picLocks noChangeAspect="1" noChangeArrowheads="1"/>
+          </p:cNvPicPr>
+          <p:nvPr/>
+        </p:nvPicPr>
+        <p:blipFill>
+          <a:blip r:embed="rId2"/>
+          <a:srcRect/>
+          <a:stretch>
+            <a:fillRect/>
+          </a:stretch>
+        </p:blipFill>
+        <p:spPr bwMode="auto">
+          <a:xfrm>
+            <a:off x="228600" y="304800"/>
+            <a:ext cx="8665369" cy="6086475"/>
+          </a:xfrm>
+          <a:prstGeom prst="rect">
+            <a:avLst/>
+          </a:prstGeom>
+          <a:noFill/>
+          <a:ln w="9525">
+            <a:noFill/>
+            <a:miter lim="800000"/>
+            <a:headEnd/>
+            <a:tailEnd/>
+          </a:ln>
+          <a:effectLst/>
+        </p:spPr>
+      </p:pic>
+      <p:sp>
+        <p:nvSpPr>
+          <p:cNvPr id="11" name="Left Arrow 10"/>
+          <p:cNvSpPr/>
+          <p:nvPr/>
+        </p:nvSpPr>
+        <p:spPr>
+          <a:xfrm>
+            <a:off x="1247274" y="3657600"/>
+            <a:ext cx="609600" cy="457200"/>
+          </a:xfrm>
+          <a:prstGeom prst="leftArrow">
+            <a:avLst/>
+          </a:prstGeom>
+          <a:solidFill>
+            <a:srgbClr val="FFFF00"/>
+          </a:solidFill>
+          <a:ln>
+            <a:solidFill>
+              <a:schemeClr val="accent6">
+                <a:lumMod val="50000"/>
+              </a:schemeClr>
+            </a:solidFill>
+          </a:ln>
+        </p:spPr>
+        <p:style>
+          <a:lnRef idx="2">
+            <a:schemeClr val="accent1">
+              <a:shade val="50000"/>
+            </a:schemeClr>
+          </a:lnRef>
+          <a:fillRef idx="1">
+            <a:schemeClr val="accent1"/>
+          </a:fillRef>
+          <a:effectRef idx="0">
+            <a:schemeClr val="accent1"/>
+          </a:effectRef>
+          <a:fontRef idx="minor">
+            <a:schemeClr val="lt1"/>
+          </a:fontRef>
+        </p:style>
+        <p:txBody>
+          <a:bodyPr rtlCol="0" anchor="ctr"/>
           <a:lstStyle/>
           <a:p>
-            <a:r>
-              <a:rPr lang="en-US" dirty="0" smtClean="0"/>
-              <a:t>Other Stuff</a:t>
-            </a:r>
-            <a:endParaRPr lang="en-US" dirty="0"/>
-          </a:p>
-        </p:txBody>
-      </p:sp>
-      <p:sp>
-        <p:nvSpPr>
-          <p:cNvPr id="3" name="Content Placeholder 2"/>
-          <p:cNvSpPr>
-            <a:spLocks noGrp="1"/>
-          </p:cNvSpPr>
-          <p:nvPr>
-            <p:ph idx="1"/>
-          </p:nvPr>
-        </p:nvSpPr>
-        <p:spPr/>
-        <p:txBody>
-          <a:bodyPr>
-            <a:normAutofit fontScale="92500" lnSpcReduction="10000"/>
-          </a:bodyPr>
-          <a:lstStyle/>
-          <a:p>
-            <a:r>
-              <a:rPr lang="en-US" dirty="0" smtClean="0"/>
-              <a:t>Schedule</a:t>
-            </a:r>
-          </a:p>
-          <a:p>
-            <a:pPr lvl="1"/>
-            <a:r>
-              <a:rPr lang="en-US" dirty="0" smtClean="0"/>
-              <a:t>Version 1.0 on mm/</a:t>
-            </a:r>
-            <a:r>
-              <a:rPr lang="en-US" dirty="0" err="1" smtClean="0"/>
-              <a:t>dd</a:t>
-            </a:r>
-            <a:r>
-              <a:rPr lang="en-US" dirty="0" smtClean="0"/>
-              <a:t>/</a:t>
-            </a:r>
-            <a:r>
-              <a:rPr lang="en-US" dirty="0" err="1" smtClean="0"/>
-              <a:t>yy</a:t>
-            </a:r>
-            <a:r>
-              <a:rPr lang="en-US" dirty="0" smtClean="0"/>
-              <a:t>?</a:t>
-            </a:r>
-          </a:p>
-          <a:p>
-            <a:r>
-              <a:rPr lang="en-US" dirty="0" smtClean="0"/>
-              <a:t>Where it will be hosted?</a:t>
-            </a:r>
-          </a:p>
-          <a:p>
-            <a:r>
-              <a:rPr lang="en-US" dirty="0" smtClean="0"/>
-              <a:t>Technology?</a:t>
-            </a:r>
-          </a:p>
-          <a:p>
-            <a:r>
-              <a:rPr lang="en-US" dirty="0" smtClean="0"/>
-              <a:t>Future Directions</a:t>
-            </a:r>
-          </a:p>
-          <a:p>
-            <a:pPr lvl="1"/>
-            <a:r>
-              <a:rPr lang="en-US" dirty="0" smtClean="0"/>
-              <a:t>Incorporate other types of genomic data such as copy number, </a:t>
-            </a:r>
-            <a:r>
-              <a:rPr lang="en-US" dirty="0" err="1" smtClean="0"/>
-              <a:t>methylation</a:t>
-            </a:r>
-            <a:r>
-              <a:rPr lang="en-US" dirty="0" smtClean="0"/>
-              <a:t>, and genotypes</a:t>
-            </a:r>
-          </a:p>
-          <a:p>
-            <a:pPr lvl="1"/>
-            <a:r>
-              <a:rPr lang="en-US" dirty="0" smtClean="0"/>
-              <a:t>Tighter integration with </a:t>
-            </a:r>
-            <a:r>
-              <a:rPr lang="en-US" dirty="0" err="1" smtClean="0"/>
-              <a:t>GenePattern</a:t>
-            </a:r>
-            <a:r>
-              <a:rPr lang="en-US" dirty="0" smtClean="0"/>
-              <a:t> and other analysis tools</a:t>
-            </a:r>
-            <a:endParaRPr lang="en-US" dirty="0"/>
-          </a:p>
-          <a:p>
-            <a:pPr lvl="1"/>
-            <a:r>
-              <a:rPr lang="en-US" dirty="0" smtClean="0"/>
-              <a:t>Allow regular updates of data</a:t>
-            </a:r>
+            <a:pPr algn="ctr"/>
+            <a:endParaRPr lang="en-US"/>
           </a:p>
         </p:txBody>
       </p:sp>
@@ -7679,251 +8722,181 @@
           <a:chExt cx="0" cy="0"/>
         </a:xfrm>
       </p:grpSpPr>
-      <p:sp>
-        <p:nvSpPr>
-          <p:cNvPr id="2" name="Title 1"/>
-          <p:cNvSpPr>
-            <a:spLocks noGrp="1"/>
-          </p:cNvSpPr>
-          <p:nvPr>
-            <p:ph type="title"/>
-          </p:nvPr>
-        </p:nvSpPr>
-        <p:spPr/>
-        <p:txBody>
-          <a:bodyPr/>
-          <a:lstStyle/>
-          <a:p>
-            <a:r>
-              <a:rPr lang="en-US" dirty="0" smtClean="0"/>
-              <a:t>Credits</a:t>
-            </a:r>
-            <a:endParaRPr lang="en-US" dirty="0"/>
-          </a:p>
-        </p:txBody>
-      </p:sp>
-      <p:sp>
-        <p:nvSpPr>
-          <p:cNvPr id="4" name="Content Placeholder 3"/>
-          <p:cNvSpPr>
-            <a:spLocks noGrp="1"/>
-          </p:cNvSpPr>
-          <p:nvPr>
-            <p:ph sz="half" idx="1"/>
-          </p:nvPr>
-        </p:nvSpPr>
-        <p:spPr/>
-        <p:txBody>
-          <a:bodyPr>
-            <a:normAutofit lnSpcReduction="10000"/>
-          </a:bodyPr>
-          <a:lstStyle/>
-          <a:p>
-            <a:r>
-              <a:rPr lang="en-US" dirty="0" smtClean="0"/>
-              <a:t>Developers, Architects and Project Managers</a:t>
-            </a:r>
-          </a:p>
-          <a:p>
-            <a:pPr lvl="1"/>
-            <a:r>
-              <a:rPr lang="en-US" dirty="0" smtClean="0"/>
-              <a:t>TJ Andrews</a:t>
-            </a:r>
-          </a:p>
-          <a:p>
-            <a:pPr lvl="1"/>
-            <a:r>
-              <a:rPr lang="en-US" dirty="0" smtClean="0"/>
-              <a:t>William </a:t>
-            </a:r>
-            <a:r>
-              <a:rPr lang="en-US" dirty="0" err="1" smtClean="0"/>
-              <a:t>FitzHugh</a:t>
-            </a:r>
-            <a:endParaRPr lang="en-US" dirty="0" smtClean="0"/>
-          </a:p>
-          <a:p>
-            <a:pPr lvl="1"/>
-            <a:r>
-              <a:rPr lang="en-US" dirty="0" smtClean="0"/>
-              <a:t>Michael </a:t>
-            </a:r>
-            <a:r>
-              <a:rPr lang="en-US" dirty="0" err="1" smtClean="0"/>
-              <a:t>Holck</a:t>
-            </a:r>
-            <a:endParaRPr lang="en-US" dirty="0" smtClean="0"/>
-          </a:p>
-          <a:p>
-            <a:pPr lvl="1"/>
-            <a:r>
-              <a:rPr lang="en-US" dirty="0" smtClean="0"/>
-              <a:t>Shine Jacob	</a:t>
-            </a:r>
-          </a:p>
-          <a:p>
-            <a:pPr lvl="1"/>
-            <a:r>
-              <a:rPr lang="en-US" dirty="0" smtClean="0"/>
-              <a:t>Mark Lewis</a:t>
-            </a:r>
-          </a:p>
-          <a:p>
-            <a:pPr lvl="1"/>
-            <a:r>
-              <a:rPr lang="en-US" dirty="0" smtClean="0"/>
-              <a:t>JP </a:t>
-            </a:r>
-            <a:r>
-              <a:rPr lang="en-US" dirty="0" err="1" smtClean="0"/>
-              <a:t>Marple</a:t>
-            </a:r>
-            <a:endParaRPr lang="en-US" dirty="0" smtClean="0"/>
-          </a:p>
-          <a:p>
-            <a:pPr lvl="1"/>
-            <a:r>
-              <a:rPr lang="en-US" dirty="0" err="1" smtClean="0"/>
-              <a:t>Sangeetha</a:t>
-            </a:r>
-            <a:r>
-              <a:rPr lang="en-US" dirty="0" smtClean="0"/>
-              <a:t> </a:t>
-            </a:r>
-            <a:r>
-              <a:rPr lang="en-US" dirty="0" err="1" smtClean="0"/>
-              <a:t>Rajagopal</a:t>
-            </a:r>
-            <a:r>
-              <a:rPr lang="en-US" dirty="0" smtClean="0"/>
-              <a:t> </a:t>
-            </a:r>
-          </a:p>
-          <a:p>
-            <a:pPr lvl="1"/>
-            <a:r>
-              <a:rPr lang="en-US" dirty="0" smtClean="0"/>
-              <a:t>Eric </a:t>
-            </a:r>
-            <a:r>
-              <a:rPr lang="en-US" dirty="0" err="1" smtClean="0"/>
-              <a:t>Tavela</a:t>
-            </a:r>
-            <a:endParaRPr lang="en-US" dirty="0" smtClean="0"/>
-          </a:p>
-        </p:txBody>
-      </p:sp>
-      <p:sp>
-        <p:nvSpPr>
-          <p:cNvPr id="5" name="Content Placeholder 4"/>
-          <p:cNvSpPr>
-            <a:spLocks noGrp="1"/>
-          </p:cNvSpPr>
-          <p:nvPr>
-            <p:ph sz="half" idx="2"/>
-          </p:nvPr>
-        </p:nvSpPr>
-        <p:spPr/>
-        <p:txBody>
-          <a:bodyPr>
-            <a:normAutofit lnSpcReduction="10000"/>
-          </a:bodyPr>
-          <a:lstStyle/>
-          <a:p>
-            <a:r>
-              <a:rPr lang="en-US" dirty="0" smtClean="0"/>
-              <a:t>Leadership and Requirements</a:t>
-            </a:r>
-          </a:p>
-          <a:p>
-            <a:pPr lvl="1"/>
-            <a:r>
-              <a:rPr lang="en-US" dirty="0" err="1" smtClean="0"/>
-              <a:t>Anand</a:t>
-            </a:r>
-            <a:r>
-              <a:rPr lang="en-US" dirty="0" smtClean="0"/>
-              <a:t> </a:t>
-            </a:r>
-            <a:r>
-              <a:rPr lang="en-US" dirty="0" err="1" smtClean="0"/>
-              <a:t>Basu</a:t>
-            </a:r>
-            <a:endParaRPr lang="en-US" dirty="0" smtClean="0"/>
-          </a:p>
-          <a:p>
-            <a:pPr lvl="1"/>
-            <a:r>
-              <a:rPr lang="en-US" dirty="0" err="1" smtClean="0"/>
-              <a:t>Subhashree</a:t>
-            </a:r>
-            <a:r>
-              <a:rPr lang="en-US" dirty="0" smtClean="0"/>
-              <a:t> </a:t>
-            </a:r>
-            <a:r>
-              <a:rPr lang="en-US" dirty="0" err="1" smtClean="0"/>
-              <a:t>Madhavan</a:t>
-            </a:r>
-            <a:endParaRPr lang="en-US" dirty="0" smtClean="0"/>
-          </a:p>
-          <a:p>
-            <a:endParaRPr lang="en-US" dirty="0" smtClean="0"/>
-          </a:p>
-          <a:p>
-            <a:r>
-              <a:rPr lang="en-US" dirty="0" smtClean="0"/>
-              <a:t>NCIA &amp; VASARI</a:t>
-            </a:r>
-          </a:p>
-          <a:p>
-            <a:pPr lvl="1"/>
-            <a:r>
-              <a:rPr lang="en-US" dirty="0" smtClean="0"/>
-              <a:t>Adam Flanders</a:t>
-            </a:r>
-          </a:p>
-          <a:p>
-            <a:pPr lvl="1"/>
-            <a:r>
-              <a:rPr lang="en-US" dirty="0" smtClean="0"/>
-              <a:t>John </a:t>
-            </a:r>
-            <a:r>
-              <a:rPr lang="en-US" dirty="0" err="1" smtClean="0"/>
-              <a:t>Freymann</a:t>
-            </a:r>
-            <a:endParaRPr lang="en-US" dirty="0" smtClean="0"/>
-          </a:p>
-          <a:p>
-            <a:pPr lvl="1"/>
-            <a:r>
-              <a:rPr lang="en-US" dirty="0" smtClean="0"/>
-              <a:t>Carl Jaffe</a:t>
-            </a:r>
-          </a:p>
-          <a:p>
-            <a:pPr lvl="1"/>
-            <a:r>
-              <a:rPr lang="en-US" dirty="0" smtClean="0"/>
-              <a:t>Daniel </a:t>
-            </a:r>
-            <a:r>
-              <a:rPr lang="en-US" dirty="0" smtClean="0"/>
-              <a:t>Rubin</a:t>
-            </a:r>
-          </a:p>
-          <a:p>
-            <a:endParaRPr lang="en-US" dirty="0"/>
-          </a:p>
-        </p:txBody>
-      </p:sp>
+      <p:pic>
+        <p:nvPicPr>
+          <p:cNvPr id="2" name="Picture 4"/>
+          <p:cNvPicPr>
+            <a:picLocks noChangeAspect="1" noChangeArrowheads="1"/>
+          </p:cNvPicPr>
+          <p:nvPr/>
+        </p:nvPicPr>
+        <p:blipFill>
+          <a:blip r:embed="rId2"/>
+          <a:srcRect/>
+          <a:stretch>
+            <a:fillRect/>
+          </a:stretch>
+        </p:blipFill>
+        <p:spPr bwMode="auto">
+          <a:xfrm>
+            <a:off x="228600" y="304800"/>
+            <a:ext cx="8665369" cy="6086475"/>
+          </a:xfrm>
+          <a:prstGeom prst="rect">
+            <a:avLst/>
+          </a:prstGeom>
+          <a:noFill/>
+          <a:ln w="9525">
+            <a:noFill/>
+            <a:miter lim="800000"/>
+            <a:headEnd/>
+            <a:tailEnd/>
+          </a:ln>
+          <a:effectLst/>
+        </p:spPr>
+      </p:pic>
     </p:spTree>
   </p:cSld>
   <p:clrMapOvr>
     <a:masterClrMapping/>
   </p:clrMapOvr>
+  <p:timing>
+    <p:tnLst>
+      <p:par>
+        <p:cTn id="1" dur="indefinite" restart="never" nodeType="tmRoot"/>
+      </p:par>
+    </p:tnLst>
+  </p:timing>
+</p:sld>
+</file>
+
+<file path=ppt/slides/slide8.xml><?xml version="1.0" encoding="utf-8"?>
+<p:sld xmlns:a="http://schemas.openxmlformats.org/drawingml/2006/main" xmlns:r="http://schemas.openxmlformats.org/officeDocument/2006/relationships" xmlns:p="http://schemas.openxmlformats.org/presentationml/2006/main">
+  <p:cSld>
+    <p:spTree>
+      <p:nvGrpSpPr>
+        <p:cNvPr id="1" name=""/>
+        <p:cNvGrpSpPr/>
+        <p:nvPr/>
+      </p:nvGrpSpPr>
+      <p:grpSpPr>
+        <a:xfrm>
+          <a:off x="0" y="0"/>
+          <a:ext cx="0" cy="0"/>
+          <a:chOff x="0" y="0"/>
+          <a:chExt cx="0" cy="0"/>
+        </a:xfrm>
+      </p:grpSpPr>
+      <p:pic>
+        <p:nvPicPr>
+          <p:cNvPr id="2" name="Picture 5"/>
+          <p:cNvPicPr>
+            <a:picLocks noChangeAspect="1" noChangeArrowheads="1"/>
+          </p:cNvPicPr>
+          <p:nvPr/>
+        </p:nvPicPr>
+        <p:blipFill>
+          <a:blip r:embed="rId2"/>
+          <a:srcRect/>
+          <a:stretch>
+            <a:fillRect/>
+          </a:stretch>
+        </p:blipFill>
+        <p:spPr bwMode="auto">
+          <a:xfrm>
+            <a:off x="228600" y="304800"/>
+            <a:ext cx="8665369" cy="6086475"/>
+          </a:xfrm>
+          <a:prstGeom prst="rect">
+            <a:avLst/>
+          </a:prstGeom>
+          <a:noFill/>
+          <a:ln w="9525">
+            <a:noFill/>
+            <a:miter lim="800000"/>
+            <a:headEnd/>
+            <a:tailEnd/>
+          </a:ln>
+          <a:effectLst/>
+        </p:spPr>
+      </p:pic>
+    </p:spTree>
+  </p:cSld>
+  <p:clrMapOvr>
+    <a:masterClrMapping/>
+  </p:clrMapOvr>
+  <p:timing>
+    <p:tnLst>
+      <p:par>
+        <p:cTn id="1" dur="indefinite" restart="never" nodeType="tmRoot"/>
+      </p:par>
+    </p:tnLst>
+  </p:timing>
+</p:sld>
+</file>
+
+<file path=ppt/slides/slide9.xml><?xml version="1.0" encoding="utf-8"?>
+<p:sld xmlns:a="http://schemas.openxmlformats.org/drawingml/2006/main" xmlns:r="http://schemas.openxmlformats.org/officeDocument/2006/relationships" xmlns:p="http://schemas.openxmlformats.org/presentationml/2006/main">
+  <p:cSld>
+    <p:spTree>
+      <p:nvGrpSpPr>
+        <p:cNvPr id="1" name=""/>
+        <p:cNvGrpSpPr/>
+        <p:nvPr/>
+      </p:nvGrpSpPr>
+      <p:grpSpPr>
+        <a:xfrm>
+          <a:off x="0" y="0"/>
+          <a:ext cx="0" cy="0"/>
+          <a:chOff x="0" y="0"/>
+          <a:chExt cx="0" cy="0"/>
+        </a:xfrm>
+      </p:grpSpPr>
+      <p:pic>
+        <p:nvPicPr>
+          <p:cNvPr id="2" name="Picture 6"/>
+          <p:cNvPicPr>
+            <a:picLocks noChangeAspect="1" noChangeArrowheads="1"/>
+          </p:cNvPicPr>
+          <p:nvPr/>
+        </p:nvPicPr>
+        <p:blipFill>
+          <a:blip r:embed="rId2"/>
+          <a:srcRect/>
+          <a:stretch>
+            <a:fillRect/>
+          </a:stretch>
+        </p:blipFill>
+        <p:spPr bwMode="auto">
+          <a:xfrm>
+            <a:off x="228600" y="304800"/>
+            <a:ext cx="8665369" cy="6086475"/>
+          </a:xfrm>
+          <a:prstGeom prst="rect">
+            <a:avLst/>
+          </a:prstGeom>
+          <a:noFill/>
+          <a:ln w="9525">
+            <a:noFill/>
+            <a:miter lim="800000"/>
+            <a:headEnd/>
+            <a:tailEnd/>
+          </a:ln>
+          <a:effectLst/>
+        </p:spPr>
+      </p:pic>
+    </p:spTree>
+  </p:cSld>
+  <p:clrMapOvr>
+    <a:masterClrMapping/>
+  </p:clrMapOvr>
+  <p:timing>
+    <p:tnLst>
+      <p:par>
+        <p:cTn id="1" dur="indefinite" restart="never" nodeType="tmRoot"/>
+      </p:par>
+    </p:tnLst>
+  </p:timing>
 </p:sld>
 </file>
 

</xml_diff>

<commit_message>
minor changes to credits and title page
</commit_message>
<xml_diff>
--- a/docs/project_management/external_meetings/ICR Workspace Mtg Sept 2008 Slides.pptx
+++ b/docs/project_management/external_meetings/ICR Workspace Mtg Sept 2008 Slides.pptx
@@ -175,59 +175,6 @@
           </a:ln>
         </p:spPr>
       </p:pic>
-      <p:sp>
-        <p:nvSpPr>
-          <p:cNvPr id="5" name="Text Box 18"/>
-          <p:cNvSpPr txBox="1">
-            <a:spLocks noChangeArrowheads="1"/>
-          </p:cNvSpPr>
-          <p:nvPr userDrawn="1"/>
-        </p:nvSpPr>
-        <p:spPr bwMode="auto">
-          <a:xfrm>
-            <a:off x="171450" y="6457950"/>
-            <a:ext cx="990600" cy="214313"/>
-          </a:xfrm>
-          <a:prstGeom prst="rect">
-            <a:avLst/>
-          </a:prstGeom>
-          <a:noFill/>
-          <a:ln w="9525">
-            <a:noFill/>
-            <a:miter lim="800000"/>
-            <a:headEnd/>
-            <a:tailEnd/>
-          </a:ln>
-          <a:effectLst/>
-        </p:spPr>
-        <p:txBody>
-          <a:bodyPr>
-            <a:spAutoFit/>
-          </a:bodyPr>
-          <a:lstStyle/>
-          <a:p>
-            <a:pPr>
-              <a:spcBef>
-                <a:spcPct val="50000"/>
-              </a:spcBef>
-              <a:defRPr/>
-            </a:pPr>
-            <a:r>
-              <a:rPr lang="en-US" sz="800" dirty="0" smtClean="0">
-                <a:solidFill>
-                  <a:srgbClr val="C0C0C0"/>
-                </a:solidFill>
-              </a:rPr>
-              <a:t>September 2008</a:t>
-            </a:r>
-            <a:endParaRPr lang="en-US" sz="800" dirty="0">
-              <a:solidFill>
-                <a:srgbClr val="C0C0C0"/>
-              </a:solidFill>
-            </a:endParaRPr>
-          </a:p>
-        </p:txBody>
-      </p:sp>
       <p:sp>
         <p:nvSpPr>
           <p:cNvPr id="4098" name="Rectangle 2"/>
@@ -2466,28 +2413,33 @@
               </a:rPr>
               <a:t>FitzHugh</a:t>
             </a:r>
+            <a:endParaRPr lang="en-US" sz="1400" dirty="0" smtClean="0">
+              <a:solidFill>
+                <a:schemeClr val="bg2"/>
+              </a:solidFill>
+            </a:endParaRPr>
+          </a:p>
+          <a:p>
+            <a:pPr>
+              <a:spcBef>
+                <a:spcPct val="50000"/>
+              </a:spcBef>
+            </a:pPr>
             <a:r>
               <a:rPr lang="en-US" sz="1400" dirty="0" smtClean="0">
                 <a:solidFill>
                   <a:schemeClr val="bg2"/>
                 </a:solidFill>
               </a:rPr>
-              <a:t> – 5AM Solutions</a:t>
-            </a:r>
-          </a:p>
-          <a:p>
-            <a:pPr>
-              <a:spcBef>
-                <a:spcPct val="50000"/>
-              </a:spcBef>
-            </a:pPr>
-            <a:r>
-              <a:rPr lang="en-US" sz="1400" dirty="0" smtClean="0">
+              <a:t>Eric </a:t>
+            </a:r>
+            <a:r>
+              <a:rPr lang="en-US" sz="1400" dirty="0" err="1" smtClean="0">
                 <a:solidFill>
                   <a:schemeClr val="bg2"/>
                 </a:solidFill>
               </a:rPr>
-              <a:t>wfitzhugh@5amsolutions.com</a:t>
+              <a:t>Tavela</a:t>
             </a:r>
             <a:endParaRPr lang="en-US" sz="1400" dirty="0">
               <a:solidFill>
@@ -2888,10 +2840,10 @@
           <a:lstStyle/>
           <a:p>
             <a:r>
-              <a:rPr lang="en-US" dirty="0" smtClean="0"/>
-              <a:t>The Future</a:t>
-            </a:r>
-            <a:endParaRPr lang="en-US" dirty="0"/>
+              <a:rPr lang="en-US" sz="3600" dirty="0" smtClean="0"/>
+              <a:t>What’s next</a:t>
+            </a:r>
+            <a:endParaRPr lang="en-US" sz="3600" dirty="0"/>
           </a:p>
         </p:txBody>
       </p:sp>
@@ -2950,11 +2902,7 @@
             <a:pPr lvl="1"/>
             <a:r>
               <a:rPr lang="en-US" dirty="0" smtClean="0"/>
-              <a:t>Incorporate </a:t>
-            </a:r>
-            <a:r>
-              <a:rPr lang="en-US" dirty="0" smtClean="0"/>
-              <a:t>other types of genomic data such as copy number, </a:t>
+              <a:t>Incorporate other types of genomic data such as copy number, </a:t>
             </a:r>
             <a:r>
               <a:rPr lang="en-US" dirty="0" err="1" smtClean="0"/>
@@ -2962,15 +2910,7 @@
             </a:r>
             <a:r>
               <a:rPr lang="en-US" dirty="0" smtClean="0"/>
-              <a:t>, </a:t>
-            </a:r>
-            <a:r>
-              <a:rPr lang="en-US" dirty="0" smtClean="0"/>
-              <a:t>tissue microarray, and </a:t>
-            </a:r>
-            <a:r>
-              <a:rPr lang="en-US" dirty="0" smtClean="0"/>
-              <a:t>genotypes</a:t>
+              <a:t>, tissue microarray, and genotypes</a:t>
             </a:r>
           </a:p>
           <a:p>
@@ -2989,11 +2929,7 @@
             </a:r>
             <a:r>
               <a:rPr lang="en-US" dirty="0" smtClean="0"/>
-              <a:t> and other analysis </a:t>
-            </a:r>
-            <a:r>
-              <a:rPr lang="en-US" dirty="0" smtClean="0"/>
-              <a:t>tools</a:t>
+              <a:t> and other analysis tools</a:t>
             </a:r>
           </a:p>
           <a:p>
@@ -3028,11 +2964,7 @@
             <a:pPr lvl="1"/>
             <a:r>
               <a:rPr lang="en-US" dirty="0" smtClean="0"/>
-              <a:t>Allow </a:t>
-            </a:r>
-            <a:r>
-              <a:rPr lang="en-US" dirty="0" smtClean="0"/>
-              <a:t>regular updates of data</a:t>
+              <a:t>Allow regular updates of data</a:t>
             </a:r>
           </a:p>
         </p:txBody>
@@ -3341,11 +3273,7 @@
             <a:p>
               <a:r>
                 <a:rPr lang="en-US" sz="1100" dirty="0" smtClean="0"/>
-                <a:t>Diagnosis   Treatment    </a:t>
-              </a:r>
-              <a:r>
-                <a:rPr lang="en-US" sz="1100" dirty="0" smtClean="0"/>
-                <a:t>    </a:t>
+                <a:t>Diagnosis   Treatment        </a:t>
               </a:r>
               <a:r>
                 <a:rPr lang="en-US" sz="1100" dirty="0" err="1" smtClean="0"/>
@@ -3438,10 +3366,10 @@
           <a:lstStyle/>
           <a:p>
             <a:r>
-              <a:rPr lang="en-US" dirty="0" smtClean="0"/>
+              <a:rPr lang="en-US" sz="3600" dirty="0" smtClean="0"/>
               <a:t>Credits</a:t>
             </a:r>
-            <a:endParaRPr lang="en-US" dirty="0"/>
+            <a:endParaRPr lang="en-US" sz="3600" dirty="0"/>
           </a:p>
         </p:txBody>
       </p:sp>
@@ -3471,13 +3399,16 @@
               <a:rPr lang="en-US" sz="2400" dirty="0" smtClean="0"/>
               <a:t>caIntegrator2 Team</a:t>
             </a:r>
-            <a:endParaRPr lang="en-US" sz="2400" dirty="0" smtClean="0"/>
           </a:p>
           <a:p>
             <a:pPr lvl="1"/>
             <a:r>
               <a:rPr lang="en-US" dirty="0" smtClean="0"/>
-              <a:t>TJ Andrews</a:t>
+              <a:t>TJ </a:t>
+            </a:r>
+            <a:r>
+              <a:rPr lang="en-US" dirty="0" smtClean="0"/>
+              <a:t>Andrews</a:t>
             </a:r>
           </a:p>
           <a:p>
@@ -3598,7 +3529,6 @@
               <a:rPr lang="en-US" sz="2400" dirty="0" smtClean="0"/>
               <a:t>Leadership and Vision</a:t>
             </a:r>
-            <a:endParaRPr lang="en-US" sz="2400" dirty="0" smtClean="0"/>
           </a:p>
           <a:p>
             <a:pPr lvl="1"/>
@@ -3672,11 +3602,7 @@
             <a:pPr lvl="1"/>
             <a:r>
               <a:rPr lang="en-US" sz="2000" dirty="0" smtClean="0"/>
-              <a:t>Daniel </a:t>
-            </a:r>
-            <a:r>
-              <a:rPr lang="en-US" sz="2000" dirty="0" smtClean="0"/>
-              <a:t>Rubin</a:t>
+              <a:t>Daniel Rubin</a:t>
             </a:r>
           </a:p>
           <a:p>
@@ -3692,7 +3618,6 @@
               <a:rPr lang="en-US" sz="2400" dirty="0" smtClean="0"/>
               <a:t> Development Teams</a:t>
             </a:r>
-            <a:endParaRPr lang="en-US" sz="2400" dirty="0" smtClean="0"/>
           </a:p>
           <a:p>
             <a:endParaRPr lang="en-US" sz="2400" dirty="0"/>
@@ -3752,10 +3677,10 @@
           <a:lstStyle/>
           <a:p>
             <a:r>
-              <a:rPr lang="en-US" sz="2800" dirty="0" smtClean="0"/>
+              <a:rPr lang="en-US" sz="3600" dirty="0" smtClean="0"/>
               <a:t>Goals</a:t>
             </a:r>
-            <a:endParaRPr lang="en-US" sz="2800" dirty="0"/>
+            <a:endParaRPr lang="en-US" sz="3600" dirty="0"/>
           </a:p>
         </p:txBody>
       </p:sp>
@@ -3896,14 +3821,14 @@
           <a:lstStyle/>
           <a:p>
             <a:r>
-              <a:rPr lang="en-US" sz="2800" dirty="0" err="1" smtClean="0"/>
+              <a:rPr lang="en-US" sz="3600" dirty="0" err="1" smtClean="0"/>
               <a:t>caIntegrator</a:t>
             </a:r>
             <a:r>
-              <a:rPr lang="en-US" sz="2800" dirty="0" smtClean="0"/>
+              <a:rPr lang="en-US" sz="3600" dirty="0" smtClean="0"/>
               <a:t> Examples</a:t>
             </a:r>
-            <a:endParaRPr lang="en-US" sz="2800" dirty="0"/>
+            <a:endParaRPr lang="en-US" sz="3600" dirty="0"/>
           </a:p>
         </p:txBody>
       </p:sp>
@@ -3942,11 +3867,7 @@
             </a:r>
             <a:r>
               <a:rPr lang="en-US" dirty="0" err="1" smtClean="0"/>
-              <a:t>g</a:t>
-            </a:r>
-            <a:r>
-              <a:rPr lang="en-US" dirty="0" err="1" smtClean="0"/>
-              <a:t>liomas</a:t>
+              <a:t>gliomas</a:t>
             </a:r>
             <a:endParaRPr lang="en-US" dirty="0" smtClean="0"/>
           </a:p>
@@ -3967,11 +3888,7 @@
             <a:pPr lvl="1"/>
             <a:r>
               <a:rPr lang="en-US" dirty="0" smtClean="0"/>
-              <a:t>A project to identify genetic alterations that make people susceptible to prostate and breast cancer</a:t>
-            </a:r>
-            <a:r>
-              <a:rPr lang="en-US" dirty="0" smtClean="0"/>
-              <a:t> </a:t>
+              <a:t>A project to identify genetic alterations that make people susceptible to prostate and breast cancer </a:t>
             </a:r>
           </a:p>
           <a:p>
@@ -3989,17 +3906,12 @@
               <a:rPr lang="en-US" dirty="0" smtClean="0"/>
               <a:t>I-SPY</a:t>
             </a:r>
-            <a:endParaRPr lang="en-US" dirty="0" smtClean="0"/>
           </a:p>
           <a:p>
             <a:pPr lvl="1"/>
             <a:r>
               <a:rPr lang="en-US" dirty="0" err="1" smtClean="0"/>
-              <a:t>c</a:t>
-            </a:r>
-            <a:r>
-              <a:rPr lang="en-US" dirty="0" err="1" smtClean="0"/>
-              <a:t>aGWAS</a:t>
+              <a:t>caGWAS</a:t>
             </a:r>
             <a:endParaRPr lang="en-US" dirty="0" smtClean="0"/>
           </a:p>
@@ -4112,7 +4024,7 @@
           <p:nvPr/>
         </p:nvPicPr>
         <p:blipFill>
-          <a:blip r:embed="rId2">
+          <a:blip r:embed="rId2" cstate="print">
             <a:lum/>
           </a:blip>
           <a:srcRect/>
@@ -4147,7 +4059,7 @@
           <p:nvPr/>
         </p:nvPicPr>
         <p:blipFill>
-          <a:blip r:embed="rId2">
+          <a:blip r:embed="rId3">
             <a:lum/>
           </a:blip>
           <a:srcRect/>
@@ -4182,7 +4094,7 @@
           <p:nvPr/>
         </p:nvPicPr>
         <p:blipFill>
-          <a:blip r:embed="rId3"/>
+          <a:blip r:embed="rId4"/>
           <a:srcRect/>
           <a:stretch>
             <a:fillRect/>
@@ -4215,7 +4127,7 @@
           <p:nvPr/>
         </p:nvPicPr>
         <p:blipFill>
-          <a:blip r:embed="rId4"/>
+          <a:blip r:embed="rId5"/>
           <a:stretch>
             <a:fillRect/>
           </a:stretch>
@@ -4239,7 +4151,7 @@
           <p:nvPr/>
         </p:nvPicPr>
         <p:blipFill>
-          <a:blip r:embed="rId5" cstate="print"/>
+          <a:blip r:embed="rId6" cstate="print"/>
           <a:srcRect/>
           <a:stretch>
             <a:fillRect/>
@@ -4272,7 +4184,7 @@
           <p:nvPr/>
         </p:nvPicPr>
         <p:blipFill>
-          <a:blip r:embed="rId5" cstate="print"/>
+          <a:blip r:embed="rId6" cstate="print"/>
           <a:srcRect/>
           <a:stretch>
             <a:fillRect/>
@@ -4791,7 +4703,7 @@
           <p:nvPr/>
         </p:nvPicPr>
         <p:blipFill>
-          <a:blip r:embed="rId6" cstate="print"/>
+          <a:blip r:embed="rId7" cstate="print"/>
           <a:srcRect/>
           <a:stretch>
             <a:fillRect/>
@@ -4956,13 +4868,15 @@
       <p:cxnSp>
         <p:nvCxnSpPr>
           <p:cNvPr id="30" name="Straight Arrow Connector 29"/>
-          <p:cNvCxnSpPr/>
+          <p:cNvCxnSpPr>
+            <a:endCxn id="21" idx="1"/>
+          </p:cNvCxnSpPr>
           <p:nvPr/>
         </p:nvCxnSpPr>
         <p:spPr>
           <a:xfrm>
             <a:off x="5638800" y="5562600"/>
-            <a:ext cx="457200" cy="73324"/>
+            <a:ext cx="457200" cy="28545"/>
           </a:xfrm>
           <a:prstGeom prst="straightConnector1">
             <a:avLst/>
@@ -5108,8 +5022,8 @@
         </p:nvSpPr>
         <p:spPr>
           <a:xfrm>
-            <a:off x="4495800" y="6248400"/>
-            <a:ext cx="2971800" cy="461665"/>
+            <a:off x="3810000" y="6172200"/>
+            <a:ext cx="3200400" cy="523220"/>
           </a:xfrm>
           <a:prstGeom prst="rect">
             <a:avLst/>
@@ -5123,10 +5037,22 @@
           <a:lstStyle/>
           <a:p>
             <a:r>
-              <a:rPr lang="en-US" sz="1200" dirty="0" smtClean="0"/>
-              <a:t>Process repeated again for each project, reusing code and developer expertise.</a:t>
-            </a:r>
-            <a:endParaRPr lang="en-US" sz="1200" dirty="0"/>
+              <a:rPr lang="en-US" sz="1400" dirty="0" smtClean="0"/>
+              <a:t>Process repeated </a:t>
+            </a:r>
+            <a:r>
+              <a:rPr lang="en-US" sz="1400" dirty="0" smtClean="0"/>
+              <a:t>for </a:t>
+            </a:r>
+            <a:r>
+              <a:rPr lang="en-US" sz="1400" dirty="0" smtClean="0"/>
+              <a:t>each project, reusing code and developer </a:t>
+            </a:r>
+            <a:r>
+              <a:rPr lang="en-US" sz="1400" dirty="0" smtClean="0"/>
+              <a:t>expertise</a:t>
+            </a:r>
+            <a:endParaRPr lang="en-US" sz="1400" dirty="0"/>
           </a:p>
         </p:txBody>
       </p:sp>
@@ -5536,7 +5462,7 @@
           <p:nvPr/>
         </p:nvPicPr>
         <p:blipFill>
-          <a:blip r:embed="rId7" cstate="print"/>
+          <a:blip r:embed="rId8" cstate="print"/>
           <a:stretch>
             <a:fillRect/>
           </a:stretch>
@@ -5869,7 +5795,7 @@
           <p:nvPr/>
         </p:nvPicPr>
         <p:blipFill>
-          <a:blip r:embed="rId8" cstate="print"/>
+          <a:blip r:embed="rId9" cstate="print"/>
           <a:stretch>
             <a:fillRect/>
           </a:stretch>
@@ -6163,7 +6089,7 @@
           <p:nvPr/>
         </p:nvPicPr>
         <p:blipFill>
-          <a:blip r:embed="rId9"/>
+          <a:blip r:embed="rId10"/>
           <a:srcRect/>
           <a:stretch>
             <a:fillRect/>
@@ -6267,7 +6193,7 @@
         </p:nvSpPr>
         <p:spPr>
           <a:xfrm>
-            <a:off x="1752600" y="4202668"/>
+            <a:off x="1828800" y="4202668"/>
             <a:ext cx="2209800" cy="338554"/>
           </a:xfrm>
           <a:prstGeom prst="rect">
@@ -6283,15 +6209,7 @@
           <a:p>
             <a:r>
               <a:rPr lang="en-US" sz="1600" dirty="0" smtClean="0"/>
-              <a:t>Tissue</a:t>
-            </a:r>
-            <a:r>
-              <a:rPr lang="en-US" sz="1600" dirty="0" smtClean="0"/>
-              <a:t> </a:t>
-            </a:r>
-            <a:r>
-              <a:rPr lang="en-US" sz="1600" dirty="0" smtClean="0"/>
-              <a:t>Data</a:t>
+              <a:t>Tissue Data</a:t>
             </a:r>
             <a:endParaRPr lang="en-US" sz="1600" dirty="0"/>
           </a:p>
@@ -6306,7 +6224,7 @@
         <p:spPr>
           <a:xfrm>
             <a:off x="685800" y="3505200"/>
-            <a:ext cx="1080245" cy="829235"/>
+            <a:ext cx="1143000" cy="762000"/>
           </a:xfrm>
           <a:prstGeom prst="straightConnector1">
             <a:avLst/>
@@ -6342,7 +6260,7 @@
           <p:nvPr/>
         </p:nvPicPr>
         <p:blipFill>
-          <a:blip r:embed="rId10"/>
+          <a:blip r:embed="rId11"/>
           <a:srcRect/>
           <a:stretch>
             <a:fillRect/>
@@ -6374,8 +6292,8 @@
         </p:nvCxnSpPr>
         <p:spPr>
           <a:xfrm>
-            <a:off x="3048000" y="4343400"/>
-            <a:ext cx="1219200" cy="1588"/>
+            <a:off x="3092940" y="4366845"/>
+            <a:ext cx="1143000" cy="1588"/>
           </a:xfrm>
           <a:prstGeom prst="straightConnector1">
             <a:avLst/>
@@ -8478,11 +8396,7 @@
           <a:p>
             <a:r>
               <a:rPr lang="en-US" sz="3600" dirty="0" smtClean="0"/>
-              <a:t>What </a:t>
-            </a:r>
-            <a:r>
-              <a:rPr lang="en-US" sz="3600" dirty="0" smtClean="0"/>
-              <a:t>caIntegrator2 can do</a:t>
+              <a:t>What caIntegrator2 can do</a:t>
             </a:r>
             <a:endParaRPr lang="en-US" sz="3600" dirty="0"/>
           </a:p>

</xml_diff>

<commit_message>
added new title page template
</commit_message>
<xml_diff>
--- a/docs/project_management/external_meetings/ICR Workspace Mtg Sept 2008 Slides.pptx
+++ b/docs/project_management/external_meetings/ICR Workspace Mtg Sept 2008 Slides.pptx
@@ -250,6 +250,190 @@
 </file>
 
 <file path=ppt/slideLayouts/slideLayout10.xml><?xml version="1.0" encoding="utf-8"?>
+<p:sldLayout xmlns:a="http://schemas.openxmlformats.org/drawingml/2006/main" xmlns:r="http://schemas.openxmlformats.org/officeDocument/2006/relationships" xmlns:p="http://schemas.openxmlformats.org/presentationml/2006/main" type="picTx" preserve="1">
+  <p:cSld name="Picture with Caption">
+    <p:spTree>
+      <p:nvGrpSpPr>
+        <p:cNvPr id="1" name=""/>
+        <p:cNvGrpSpPr/>
+        <p:nvPr/>
+      </p:nvGrpSpPr>
+      <p:grpSpPr>
+        <a:xfrm>
+          <a:off x="0" y="0"/>
+          <a:ext cx="0" cy="0"/>
+          <a:chOff x="0" y="0"/>
+          <a:chExt cx="0" cy="0"/>
+        </a:xfrm>
+      </p:grpSpPr>
+      <p:sp>
+        <p:nvSpPr>
+          <p:cNvPr id="2" name="Title 1"/>
+          <p:cNvSpPr>
+            <a:spLocks noGrp="1"/>
+          </p:cNvSpPr>
+          <p:nvPr>
+            <p:ph type="title"/>
+          </p:nvPr>
+        </p:nvSpPr>
+        <p:spPr>
+          <a:xfrm>
+            <a:off x="1792288" y="4800600"/>
+            <a:ext cx="5486400" cy="566738"/>
+          </a:xfrm>
+        </p:spPr>
+        <p:txBody>
+          <a:bodyPr anchor="b"/>
+          <a:lstStyle>
+            <a:lvl1pPr algn="l">
+              <a:defRPr sz="2000" b="1"/>
+            </a:lvl1pPr>
+          </a:lstStyle>
+          <a:p>
+            <a:r>
+              <a:rPr lang="en-US" smtClean="0"/>
+              <a:t>Click to edit Master title style</a:t>
+            </a:r>
+            <a:endParaRPr lang="en-US"/>
+          </a:p>
+        </p:txBody>
+      </p:sp>
+      <p:sp>
+        <p:nvSpPr>
+          <p:cNvPr id="3" name="Picture Placeholder 2"/>
+          <p:cNvSpPr>
+            <a:spLocks noGrp="1"/>
+          </p:cNvSpPr>
+          <p:nvPr>
+            <p:ph type="pic" idx="1"/>
+          </p:nvPr>
+        </p:nvSpPr>
+        <p:spPr>
+          <a:xfrm>
+            <a:off x="1792288" y="612775"/>
+            <a:ext cx="5486400" cy="4114800"/>
+          </a:xfrm>
+        </p:spPr>
+        <p:txBody>
+          <a:bodyPr/>
+          <a:lstStyle>
+            <a:lvl1pPr marL="0" indent="0">
+              <a:buNone/>
+              <a:defRPr sz="3200"/>
+            </a:lvl1pPr>
+            <a:lvl2pPr marL="457200" indent="0">
+              <a:buNone/>
+              <a:defRPr sz="2800"/>
+            </a:lvl2pPr>
+            <a:lvl3pPr marL="914400" indent="0">
+              <a:buNone/>
+              <a:defRPr sz="2400"/>
+            </a:lvl3pPr>
+            <a:lvl4pPr marL="1371600" indent="0">
+              <a:buNone/>
+              <a:defRPr sz="2000"/>
+            </a:lvl4pPr>
+            <a:lvl5pPr marL="1828800" indent="0">
+              <a:buNone/>
+              <a:defRPr sz="2000"/>
+            </a:lvl5pPr>
+            <a:lvl6pPr marL="2286000" indent="0">
+              <a:buNone/>
+              <a:defRPr sz="2000"/>
+            </a:lvl6pPr>
+            <a:lvl7pPr marL="2743200" indent="0">
+              <a:buNone/>
+              <a:defRPr sz="2000"/>
+            </a:lvl7pPr>
+            <a:lvl8pPr marL="3200400" indent="0">
+              <a:buNone/>
+              <a:defRPr sz="2000"/>
+            </a:lvl8pPr>
+            <a:lvl9pPr marL="3657600" indent="0">
+              <a:buNone/>
+              <a:defRPr sz="2000"/>
+            </a:lvl9pPr>
+          </a:lstStyle>
+          <a:p>
+            <a:pPr lvl="0"/>
+            <a:endParaRPr lang="en-US" noProof="0" smtClean="0"/>
+          </a:p>
+        </p:txBody>
+      </p:sp>
+      <p:sp>
+        <p:nvSpPr>
+          <p:cNvPr id="4" name="Text Placeholder 3"/>
+          <p:cNvSpPr>
+            <a:spLocks noGrp="1"/>
+          </p:cNvSpPr>
+          <p:nvPr>
+            <p:ph type="body" sz="half" idx="2"/>
+          </p:nvPr>
+        </p:nvSpPr>
+        <p:spPr>
+          <a:xfrm>
+            <a:off x="1792288" y="5367338"/>
+            <a:ext cx="5486400" cy="804862"/>
+          </a:xfrm>
+        </p:spPr>
+        <p:txBody>
+          <a:bodyPr/>
+          <a:lstStyle>
+            <a:lvl1pPr marL="0" indent="0">
+              <a:buNone/>
+              <a:defRPr sz="1400"/>
+            </a:lvl1pPr>
+            <a:lvl2pPr marL="457200" indent="0">
+              <a:buNone/>
+              <a:defRPr sz="1200"/>
+            </a:lvl2pPr>
+            <a:lvl3pPr marL="914400" indent="0">
+              <a:buNone/>
+              <a:defRPr sz="1000"/>
+            </a:lvl3pPr>
+            <a:lvl4pPr marL="1371600" indent="0">
+              <a:buNone/>
+              <a:defRPr sz="900"/>
+            </a:lvl4pPr>
+            <a:lvl5pPr marL="1828800" indent="0">
+              <a:buNone/>
+              <a:defRPr sz="900"/>
+            </a:lvl5pPr>
+            <a:lvl6pPr marL="2286000" indent="0">
+              <a:buNone/>
+              <a:defRPr sz="900"/>
+            </a:lvl6pPr>
+            <a:lvl7pPr marL="2743200" indent="0">
+              <a:buNone/>
+              <a:defRPr sz="900"/>
+            </a:lvl7pPr>
+            <a:lvl8pPr marL="3200400" indent="0">
+              <a:buNone/>
+              <a:defRPr sz="900"/>
+            </a:lvl8pPr>
+            <a:lvl9pPr marL="3657600" indent="0">
+              <a:buNone/>
+              <a:defRPr sz="900"/>
+            </a:lvl9pPr>
+          </a:lstStyle>
+          <a:p>
+            <a:pPr lvl="0"/>
+            <a:r>
+              <a:rPr lang="en-US" smtClean="0"/>
+              <a:t>Click to edit Master text styles</a:t>
+            </a:r>
+          </a:p>
+        </p:txBody>
+      </p:sp>
+    </p:spTree>
+  </p:cSld>
+  <p:clrMapOvr>
+    <a:masterClrMapping/>
+  </p:clrMapOvr>
+</p:sldLayout>
+</file>
+
+<file path=ppt/slideLayouts/slideLayout11.xml><?xml version="1.0" encoding="utf-8"?>
 <p:sldLayout xmlns:a="http://schemas.openxmlformats.org/drawingml/2006/main" xmlns:r="http://schemas.openxmlformats.org/officeDocument/2006/relationships" xmlns:p="http://schemas.openxmlformats.org/presentationml/2006/main" type="vertTx" preserve="1">
   <p:cSld name="Title and Vertical Text">
     <p:spTree>
@@ -349,7 +533,7 @@
 </p:sldLayout>
 </file>
 
-<file path=ppt/slideLayouts/slideLayout11.xml><?xml version="1.0" encoding="utf-8"?>
+<file path=ppt/slideLayouts/slideLayout12.xml><?xml version="1.0" encoding="utf-8"?>
 <p:sldLayout xmlns:a="http://schemas.openxmlformats.org/drawingml/2006/main" xmlns:r="http://schemas.openxmlformats.org/officeDocument/2006/relationships" xmlns:p="http://schemas.openxmlformats.org/presentationml/2006/main" type="vertTitleAndTx" preserve="1">
   <p:cSld name="Vertical Title and Text">
     <p:spTree>
@@ -460,6 +644,125 @@
 </file>
 
 <file path=ppt/slideLayouts/slideLayout2.xml><?xml version="1.0" encoding="utf-8"?>
+<p:sldLayout xmlns:a="http://schemas.openxmlformats.org/drawingml/2006/main" xmlns:r="http://schemas.openxmlformats.org/officeDocument/2006/relationships" xmlns:p="http://schemas.openxmlformats.org/presentationml/2006/main" showMasterSp="0" type="title" preserve="1">
+  <p:cSld name="1_Title Slide">
+    <p:spTree>
+      <p:nvGrpSpPr>
+        <p:cNvPr id="1" name=""/>
+        <p:cNvGrpSpPr/>
+        <p:nvPr/>
+      </p:nvGrpSpPr>
+      <p:grpSpPr>
+        <a:xfrm>
+          <a:off x="0" y="0"/>
+          <a:ext cx="0" cy="0"/>
+          <a:chOff x="0" y="0"/>
+          <a:chExt cx="0" cy="0"/>
+        </a:xfrm>
+      </p:grpSpPr>
+      <p:pic>
+        <p:nvPicPr>
+          <p:cNvPr id="4119" name="Picture 23" descr="caBIG-PPT-template---COVER"/>
+          <p:cNvPicPr>
+            <a:picLocks noChangeAspect="1" noChangeArrowheads="1"/>
+          </p:cNvPicPr>
+          <p:nvPr userDrawn="1"/>
+        </p:nvPicPr>
+        <p:blipFill>
+          <a:blip r:embed="rId2"/>
+          <a:srcRect/>
+          <a:stretch>
+            <a:fillRect/>
+          </a:stretch>
+        </p:blipFill>
+        <p:spPr bwMode="auto">
+          <a:xfrm>
+            <a:off x="0" y="0"/>
+            <a:ext cx="9144000" cy="6858000"/>
+          </a:xfrm>
+          <a:prstGeom prst="rect">
+            <a:avLst/>
+          </a:prstGeom>
+          <a:noFill/>
+        </p:spPr>
+      </p:pic>
+      <p:sp>
+        <p:nvSpPr>
+          <p:cNvPr id="4098" name="Rectangle 2"/>
+          <p:cNvSpPr>
+            <a:spLocks noGrp="1" noChangeArrowheads="1"/>
+          </p:cNvSpPr>
+          <p:nvPr>
+            <p:ph type="ctrTitle"/>
+          </p:nvPr>
+        </p:nvSpPr>
+        <p:spPr>
+          <a:xfrm>
+            <a:off x="4953000" y="2286000"/>
+            <a:ext cx="3810000" cy="609600"/>
+          </a:xfrm>
+        </p:spPr>
+        <p:txBody>
+          <a:bodyPr anchor="t"/>
+          <a:lstStyle>
+            <a:lvl1pPr algn="r">
+              <a:defRPr sz="4400">
+                <a:solidFill>
+                  <a:schemeClr val="accent2"/>
+                </a:solidFill>
+              </a:defRPr>
+            </a:lvl1pPr>
+          </a:lstStyle>
+          <a:p>
+            <a:r>
+              <a:rPr lang="en-US"/>
+              <a:t>Click to edit Master title style</a:t>
+            </a:r>
+          </a:p>
+        </p:txBody>
+      </p:sp>
+      <p:sp>
+        <p:nvSpPr>
+          <p:cNvPr id="4099" name="Rectangle 3"/>
+          <p:cNvSpPr>
+            <a:spLocks noGrp="1" noChangeArrowheads="1"/>
+          </p:cNvSpPr>
+          <p:nvPr>
+            <p:ph type="subTitle" idx="1"/>
+          </p:nvPr>
+        </p:nvSpPr>
+        <p:spPr>
+          <a:xfrm>
+            <a:off x="5486400" y="4114800"/>
+            <a:ext cx="3200400" cy="457200"/>
+          </a:xfrm>
+        </p:spPr>
+        <p:txBody>
+          <a:bodyPr/>
+          <a:lstStyle>
+            <a:lvl1pPr marL="0" indent="0" algn="r">
+              <a:buFontTx/>
+              <a:buNone/>
+              <a:defRPr/>
+            </a:lvl1pPr>
+          </a:lstStyle>
+          <a:p>
+            <a:r>
+              <a:rPr lang="en-US"/>
+              <a:t>Click to edit Master subtitle style</a:t>
+            </a:r>
+          </a:p>
+        </p:txBody>
+      </p:sp>
+    </p:spTree>
+  </p:cSld>
+  <p:clrMapOvr>
+    <a:masterClrMapping/>
+  </p:clrMapOvr>
+</p:sldLayout>
+</file>
+
+<file path=ppt/slideLayouts/slideLayout3.xml><?xml version="1.0" encoding="utf-8"?>
 <p:sldLayout xmlns:a="http://schemas.openxmlformats.org/drawingml/2006/main" xmlns:r="http://schemas.openxmlformats.org/officeDocument/2006/relationships" xmlns:p="http://schemas.openxmlformats.org/presentationml/2006/main" type="obj" preserve="1">
   <p:cSld name="Title and Content">
     <p:spTree>
@@ -559,7 +862,7 @@
 </p:sldLayout>
 </file>
 
-<file path=ppt/slideLayouts/slideLayout3.xml><?xml version="1.0" encoding="utf-8"?>
+<file path=ppt/slideLayouts/slideLayout4.xml><?xml version="1.0" encoding="utf-8"?>
 <p:sldLayout xmlns:a="http://schemas.openxmlformats.org/drawingml/2006/main" xmlns:r="http://schemas.openxmlformats.org/officeDocument/2006/relationships" xmlns:p="http://schemas.openxmlformats.org/presentationml/2006/main" type="secHead" preserve="1">
   <p:cSld name="Section Header">
     <p:spTree>
@@ -681,7 +984,7 @@
 </p:sldLayout>
 </file>
 
-<file path=ppt/slideLayouts/slideLayout4.xml><?xml version="1.0" encoding="utf-8"?>
+<file path=ppt/slideLayouts/slideLayout5.xml><?xml version="1.0" encoding="utf-8"?>
 <p:sldLayout xmlns:a="http://schemas.openxmlformats.org/drawingml/2006/main" xmlns:r="http://schemas.openxmlformats.org/officeDocument/2006/relationships" xmlns:p="http://schemas.openxmlformats.org/presentationml/2006/main" type="twoObj" preserve="1">
   <p:cSld name="Two Content">
     <p:spTree>
@@ -899,7 +1202,7 @@
 </p:sldLayout>
 </file>
 
-<file path=ppt/slideLayouts/slideLayout5.xml><?xml version="1.0" encoding="utf-8"?>
+<file path=ppt/slideLayouts/slideLayout6.xml><?xml version="1.0" encoding="utf-8"?>
 <p:sldLayout xmlns:a="http://schemas.openxmlformats.org/drawingml/2006/main" xmlns:r="http://schemas.openxmlformats.org/officeDocument/2006/relationships" xmlns:p="http://schemas.openxmlformats.org/presentationml/2006/main" type="twoTxTwoObj" preserve="1">
   <p:cSld name="Comparison">
     <p:spTree>
@@ -1256,7 +1559,7 @@
 </p:sldLayout>
 </file>
 
-<file path=ppt/slideLayouts/slideLayout6.xml><?xml version="1.0" encoding="utf-8"?>
+<file path=ppt/slideLayouts/slideLayout7.xml><?xml version="1.0" encoding="utf-8"?>
 <p:sldLayout xmlns:a="http://schemas.openxmlformats.org/drawingml/2006/main" xmlns:r="http://schemas.openxmlformats.org/officeDocument/2006/relationships" xmlns:p="http://schemas.openxmlformats.org/presentationml/2006/main" type="titleOnly" preserve="1">
   <p:cSld name="Title Only">
     <p:spTree>
@@ -1304,7 +1607,7 @@
 </p:sldLayout>
 </file>
 
-<file path=ppt/slideLayouts/slideLayout7.xml><?xml version="1.0" encoding="utf-8"?>
+<file path=ppt/slideLayouts/slideLayout8.xml><?xml version="1.0" encoding="utf-8"?>
 <p:sldLayout xmlns:a="http://schemas.openxmlformats.org/drawingml/2006/main" xmlns:r="http://schemas.openxmlformats.org/officeDocument/2006/relationships" xmlns:p="http://schemas.openxmlformats.org/presentationml/2006/main" type="blank" preserve="1">
   <p:cSld name="Blank">
     <p:spTree>
@@ -1329,7 +1632,7 @@
 </p:sldLayout>
 </file>
 
-<file path=ppt/slideLayouts/slideLayout8.xml><?xml version="1.0" encoding="utf-8"?>
+<file path=ppt/slideLayouts/slideLayout9.xml><?xml version="1.0" encoding="utf-8"?>
 <p:sldLayout xmlns:a="http://schemas.openxmlformats.org/drawingml/2006/main" xmlns:r="http://schemas.openxmlformats.org/officeDocument/2006/relationships" xmlns:p="http://schemas.openxmlformats.org/presentationml/2006/main" type="objTx" preserve="1">
   <p:cSld name="Content with Caption">
     <p:spTree>
@@ -1477,190 +1780,6 @@
           <a:xfrm>
             <a:off x="457200" y="1435100"/>
             <a:ext cx="3008313" cy="4691063"/>
-          </a:xfrm>
-        </p:spPr>
-        <p:txBody>
-          <a:bodyPr/>
-          <a:lstStyle>
-            <a:lvl1pPr marL="0" indent="0">
-              <a:buNone/>
-              <a:defRPr sz="1400"/>
-            </a:lvl1pPr>
-            <a:lvl2pPr marL="457200" indent="0">
-              <a:buNone/>
-              <a:defRPr sz="1200"/>
-            </a:lvl2pPr>
-            <a:lvl3pPr marL="914400" indent="0">
-              <a:buNone/>
-              <a:defRPr sz="1000"/>
-            </a:lvl3pPr>
-            <a:lvl4pPr marL="1371600" indent="0">
-              <a:buNone/>
-              <a:defRPr sz="900"/>
-            </a:lvl4pPr>
-            <a:lvl5pPr marL="1828800" indent="0">
-              <a:buNone/>
-              <a:defRPr sz="900"/>
-            </a:lvl5pPr>
-            <a:lvl6pPr marL="2286000" indent="0">
-              <a:buNone/>
-              <a:defRPr sz="900"/>
-            </a:lvl6pPr>
-            <a:lvl7pPr marL="2743200" indent="0">
-              <a:buNone/>
-              <a:defRPr sz="900"/>
-            </a:lvl7pPr>
-            <a:lvl8pPr marL="3200400" indent="0">
-              <a:buNone/>
-              <a:defRPr sz="900"/>
-            </a:lvl8pPr>
-            <a:lvl9pPr marL="3657600" indent="0">
-              <a:buNone/>
-              <a:defRPr sz="900"/>
-            </a:lvl9pPr>
-          </a:lstStyle>
-          <a:p>
-            <a:pPr lvl="0"/>
-            <a:r>
-              <a:rPr lang="en-US" smtClean="0"/>
-              <a:t>Click to edit Master text styles</a:t>
-            </a:r>
-          </a:p>
-        </p:txBody>
-      </p:sp>
-    </p:spTree>
-  </p:cSld>
-  <p:clrMapOvr>
-    <a:masterClrMapping/>
-  </p:clrMapOvr>
-</p:sldLayout>
-</file>
-
-<file path=ppt/slideLayouts/slideLayout9.xml><?xml version="1.0" encoding="utf-8"?>
-<p:sldLayout xmlns:a="http://schemas.openxmlformats.org/drawingml/2006/main" xmlns:r="http://schemas.openxmlformats.org/officeDocument/2006/relationships" xmlns:p="http://schemas.openxmlformats.org/presentationml/2006/main" type="picTx" preserve="1">
-  <p:cSld name="Picture with Caption">
-    <p:spTree>
-      <p:nvGrpSpPr>
-        <p:cNvPr id="1" name=""/>
-        <p:cNvGrpSpPr/>
-        <p:nvPr/>
-      </p:nvGrpSpPr>
-      <p:grpSpPr>
-        <a:xfrm>
-          <a:off x="0" y="0"/>
-          <a:ext cx="0" cy="0"/>
-          <a:chOff x="0" y="0"/>
-          <a:chExt cx="0" cy="0"/>
-        </a:xfrm>
-      </p:grpSpPr>
-      <p:sp>
-        <p:nvSpPr>
-          <p:cNvPr id="2" name="Title 1"/>
-          <p:cNvSpPr>
-            <a:spLocks noGrp="1"/>
-          </p:cNvSpPr>
-          <p:nvPr>
-            <p:ph type="title"/>
-          </p:nvPr>
-        </p:nvSpPr>
-        <p:spPr>
-          <a:xfrm>
-            <a:off x="1792288" y="4800600"/>
-            <a:ext cx="5486400" cy="566738"/>
-          </a:xfrm>
-        </p:spPr>
-        <p:txBody>
-          <a:bodyPr anchor="b"/>
-          <a:lstStyle>
-            <a:lvl1pPr algn="l">
-              <a:defRPr sz="2000" b="1"/>
-            </a:lvl1pPr>
-          </a:lstStyle>
-          <a:p>
-            <a:r>
-              <a:rPr lang="en-US" smtClean="0"/>
-              <a:t>Click to edit Master title style</a:t>
-            </a:r>
-            <a:endParaRPr lang="en-US"/>
-          </a:p>
-        </p:txBody>
-      </p:sp>
-      <p:sp>
-        <p:nvSpPr>
-          <p:cNvPr id="3" name="Picture Placeholder 2"/>
-          <p:cNvSpPr>
-            <a:spLocks noGrp="1"/>
-          </p:cNvSpPr>
-          <p:nvPr>
-            <p:ph type="pic" idx="1"/>
-          </p:nvPr>
-        </p:nvSpPr>
-        <p:spPr>
-          <a:xfrm>
-            <a:off x="1792288" y="612775"/>
-            <a:ext cx="5486400" cy="4114800"/>
-          </a:xfrm>
-        </p:spPr>
-        <p:txBody>
-          <a:bodyPr/>
-          <a:lstStyle>
-            <a:lvl1pPr marL="0" indent="0">
-              <a:buNone/>
-              <a:defRPr sz="3200"/>
-            </a:lvl1pPr>
-            <a:lvl2pPr marL="457200" indent="0">
-              <a:buNone/>
-              <a:defRPr sz="2800"/>
-            </a:lvl2pPr>
-            <a:lvl3pPr marL="914400" indent="0">
-              <a:buNone/>
-              <a:defRPr sz="2400"/>
-            </a:lvl3pPr>
-            <a:lvl4pPr marL="1371600" indent="0">
-              <a:buNone/>
-              <a:defRPr sz="2000"/>
-            </a:lvl4pPr>
-            <a:lvl5pPr marL="1828800" indent="0">
-              <a:buNone/>
-              <a:defRPr sz="2000"/>
-            </a:lvl5pPr>
-            <a:lvl6pPr marL="2286000" indent="0">
-              <a:buNone/>
-              <a:defRPr sz="2000"/>
-            </a:lvl6pPr>
-            <a:lvl7pPr marL="2743200" indent="0">
-              <a:buNone/>
-              <a:defRPr sz="2000"/>
-            </a:lvl7pPr>
-            <a:lvl8pPr marL="3200400" indent="0">
-              <a:buNone/>
-              <a:defRPr sz="2000"/>
-            </a:lvl8pPr>
-            <a:lvl9pPr marL="3657600" indent="0">
-              <a:buNone/>
-              <a:defRPr sz="2000"/>
-            </a:lvl9pPr>
-          </a:lstStyle>
-          <a:p>
-            <a:pPr lvl="0"/>
-            <a:endParaRPr lang="en-US" noProof="0" smtClean="0"/>
-          </a:p>
-        </p:txBody>
-      </p:sp>
-      <p:sp>
-        <p:nvSpPr>
-          <p:cNvPr id="4" name="Text Placeholder 3"/>
-          <p:cNvSpPr>
-            <a:spLocks noGrp="1"/>
-          </p:cNvSpPr>
-          <p:nvPr>
-            <p:ph type="body" sz="half" idx="2"/>
-          </p:nvPr>
-        </p:nvSpPr>
-        <p:spPr>
-          <a:xfrm>
-            <a:off x="1792288" y="5367338"/>
-            <a:ext cx="5486400" cy="804862"/>
           </a:xfrm>
         </p:spPr>
         <p:txBody>
@@ -1754,7 +1873,7 @@
           <p:nvPr userDrawn="1"/>
         </p:nvPicPr>
         <p:blipFill>
-          <a:blip r:embed="rId13"/>
+          <a:blip r:embed="rId14"/>
           <a:srcRect/>
           <a:stretch>
             <a:fillRect/>
@@ -1894,16 +2013,17 @@
   <p:clrMap bg1="lt1" tx1="dk1" bg2="lt2" tx2="dk2" accent1="accent1" accent2="accent2" accent3="accent3" accent4="accent4" accent5="accent5" accent6="accent6" hlink="hlink" folHlink="folHlink"/>
   <p:sldLayoutIdLst>
     <p:sldLayoutId id="2147483661" r:id="rId1"/>
-    <p:sldLayoutId id="2147483662" r:id="rId2"/>
-    <p:sldLayoutId id="2147483663" r:id="rId3"/>
-    <p:sldLayoutId id="2147483664" r:id="rId4"/>
-    <p:sldLayoutId id="2147483665" r:id="rId5"/>
-    <p:sldLayoutId id="2147483666" r:id="rId6"/>
-    <p:sldLayoutId id="2147483667" r:id="rId7"/>
-    <p:sldLayoutId id="2147483668" r:id="rId8"/>
-    <p:sldLayoutId id="2147483669" r:id="rId9"/>
-    <p:sldLayoutId id="2147483670" r:id="rId10"/>
-    <p:sldLayoutId id="2147483671" r:id="rId11"/>
+    <p:sldLayoutId id="2147483672" r:id="rId2"/>
+    <p:sldLayoutId id="2147483662" r:id="rId3"/>
+    <p:sldLayoutId id="2147483663" r:id="rId4"/>
+    <p:sldLayoutId id="2147483664" r:id="rId5"/>
+    <p:sldLayoutId id="2147483665" r:id="rId6"/>
+    <p:sldLayoutId id="2147483666" r:id="rId7"/>
+    <p:sldLayoutId id="2147483667" r:id="rId8"/>
+    <p:sldLayoutId id="2147483668" r:id="rId9"/>
+    <p:sldLayoutId id="2147483669" r:id="rId10"/>
+    <p:sldLayoutId id="2147483670" r:id="rId11"/>
+    <p:sldLayoutId id="2147483671" r:id="rId12"/>
   </p:sldLayoutIdLst>
   <p:txStyles>
     <p:titleStyle>
@@ -2330,8 +2450,8 @@
         </p:nvSpPr>
         <p:spPr>
           <a:xfrm>
-            <a:off x="3733800" y="1806575"/>
-            <a:ext cx="5562600" cy="1470025"/>
+            <a:off x="4724400" y="1676400"/>
+            <a:ext cx="4038600" cy="609600"/>
           </a:xfrm>
         </p:spPr>
         <p:txBody>
@@ -2359,113 +2479,6 @@
               <a:rPr lang="en-US" sz="2400" dirty="0" smtClean="0"/>
             </a:br>
             <a:endParaRPr lang="en-US" sz="2400" dirty="0"/>
-          </a:p>
-        </p:txBody>
-      </p:sp>
-      <p:sp>
-        <p:nvSpPr>
-          <p:cNvPr id="7" name="Text Box 7"/>
-          <p:cNvSpPr txBox="1">
-            <a:spLocks noChangeArrowheads="1"/>
-          </p:cNvSpPr>
-          <p:nvPr/>
-        </p:nvSpPr>
-        <p:spPr bwMode="auto">
-          <a:xfrm>
-            <a:off x="3733800" y="4876800"/>
-            <a:ext cx="4343400" cy="954107"/>
-          </a:xfrm>
-          <a:prstGeom prst="rect">
-            <a:avLst/>
-          </a:prstGeom>
-          <a:noFill/>
-          <a:ln w="9525">
-            <a:noFill/>
-            <a:miter lim="800000"/>
-            <a:headEnd/>
-            <a:tailEnd/>
-          </a:ln>
-        </p:spPr>
-        <p:txBody>
-          <a:bodyPr wrap="square">
-            <a:spAutoFit/>
-          </a:bodyPr>
-          <a:lstStyle/>
-          <a:p>
-            <a:pPr>
-              <a:spcBef>
-                <a:spcPct val="50000"/>
-              </a:spcBef>
-            </a:pPr>
-            <a:r>
-              <a:rPr lang="en-US" sz="1400" dirty="0" smtClean="0">
-                <a:solidFill>
-                  <a:schemeClr val="bg2"/>
-                </a:solidFill>
-              </a:rPr>
-              <a:t>William </a:t>
-            </a:r>
-            <a:r>
-              <a:rPr lang="en-US" sz="1400" dirty="0" err="1" smtClean="0">
-                <a:solidFill>
-                  <a:schemeClr val="bg2"/>
-                </a:solidFill>
-              </a:rPr>
-              <a:t>FitzHugh</a:t>
-            </a:r>
-            <a:endParaRPr lang="en-US" sz="1400" dirty="0" smtClean="0">
-              <a:solidFill>
-                <a:schemeClr val="bg2"/>
-              </a:solidFill>
-            </a:endParaRPr>
-          </a:p>
-          <a:p>
-            <a:pPr>
-              <a:spcBef>
-                <a:spcPct val="50000"/>
-              </a:spcBef>
-            </a:pPr>
-            <a:r>
-              <a:rPr lang="en-US" sz="1400" dirty="0" smtClean="0">
-                <a:solidFill>
-                  <a:schemeClr val="bg2"/>
-                </a:solidFill>
-              </a:rPr>
-              <a:t>Eric </a:t>
-            </a:r>
-            <a:r>
-              <a:rPr lang="en-US" sz="1400" dirty="0" err="1" smtClean="0">
-                <a:solidFill>
-                  <a:schemeClr val="bg2"/>
-                </a:solidFill>
-              </a:rPr>
-              <a:t>Tavela</a:t>
-            </a:r>
-            <a:endParaRPr lang="en-US" sz="1400" dirty="0">
-              <a:solidFill>
-                <a:schemeClr val="bg2"/>
-              </a:solidFill>
-            </a:endParaRPr>
-          </a:p>
-          <a:p>
-            <a:pPr>
-              <a:spcBef>
-                <a:spcPct val="50000"/>
-              </a:spcBef>
-            </a:pPr>
-            <a:r>
-              <a:rPr lang="en-US" sz="1400" b="1" dirty="0" smtClean="0">
-                <a:solidFill>
-                  <a:schemeClr val="bg2"/>
-                </a:solidFill>
-              </a:rPr>
-              <a:t>September 23, 2008</a:t>
-            </a:r>
-            <a:endParaRPr lang="en-US" sz="1400" b="1" dirty="0">
-              <a:solidFill>
-                <a:schemeClr val="bg2"/>
-              </a:solidFill>
-            </a:endParaRPr>
           </a:p>
         </p:txBody>
       </p:sp>
@@ -2481,8 +2494,8 @@
         </p:nvSpPr>
         <p:spPr>
           <a:xfrm>
-            <a:off x="3733800" y="3962400"/>
-            <a:ext cx="4267200" cy="457200"/>
+            <a:off x="5023335" y="4038600"/>
+            <a:ext cx="3733800" cy="457200"/>
           </a:xfrm>
         </p:spPr>
         <p:txBody>
@@ -2494,6 +2507,113 @@
               <a:t>A Tool for Publishing and Analyzing Integrated Study Data</a:t>
             </a:r>
             <a:endParaRPr lang="en-US" dirty="0"/>
+          </a:p>
+        </p:txBody>
+      </p:sp>
+      <p:sp>
+        <p:nvSpPr>
+          <p:cNvPr id="7" name="Text Box 7"/>
+          <p:cNvSpPr txBox="1">
+            <a:spLocks noChangeArrowheads="1"/>
+          </p:cNvSpPr>
+          <p:nvPr/>
+        </p:nvSpPr>
+        <p:spPr bwMode="auto">
+          <a:xfrm>
+            <a:off x="4411785" y="4953000"/>
+            <a:ext cx="4343400" cy="954107"/>
+          </a:xfrm>
+          <a:prstGeom prst="rect">
+            <a:avLst/>
+          </a:prstGeom>
+          <a:noFill/>
+          <a:ln w="9525">
+            <a:noFill/>
+            <a:miter lim="800000"/>
+            <a:headEnd/>
+            <a:tailEnd/>
+          </a:ln>
+        </p:spPr>
+        <p:txBody>
+          <a:bodyPr wrap="square">
+            <a:spAutoFit/>
+          </a:bodyPr>
+          <a:lstStyle/>
+          <a:p>
+            <a:pPr algn="r">
+              <a:spcBef>
+                <a:spcPct val="50000"/>
+              </a:spcBef>
+            </a:pPr>
+            <a:r>
+              <a:rPr lang="en-US" sz="1400" dirty="0" smtClean="0">
+                <a:solidFill>
+                  <a:schemeClr val="bg2"/>
+                </a:solidFill>
+              </a:rPr>
+              <a:t>William </a:t>
+            </a:r>
+            <a:r>
+              <a:rPr lang="en-US" sz="1400" dirty="0" err="1" smtClean="0">
+                <a:solidFill>
+                  <a:schemeClr val="bg2"/>
+                </a:solidFill>
+              </a:rPr>
+              <a:t>FitzHugh</a:t>
+            </a:r>
+            <a:endParaRPr lang="en-US" sz="1400" dirty="0" smtClean="0">
+              <a:solidFill>
+                <a:schemeClr val="bg2"/>
+              </a:solidFill>
+            </a:endParaRPr>
+          </a:p>
+          <a:p>
+            <a:pPr algn="r">
+              <a:spcBef>
+                <a:spcPct val="50000"/>
+              </a:spcBef>
+            </a:pPr>
+            <a:r>
+              <a:rPr lang="en-US" sz="1400" dirty="0" smtClean="0">
+                <a:solidFill>
+                  <a:schemeClr val="bg2"/>
+                </a:solidFill>
+              </a:rPr>
+              <a:t>Eric </a:t>
+            </a:r>
+            <a:r>
+              <a:rPr lang="en-US" sz="1400" dirty="0" err="1" smtClean="0">
+                <a:solidFill>
+                  <a:schemeClr val="bg2"/>
+                </a:solidFill>
+              </a:rPr>
+              <a:t>Tavela</a:t>
+            </a:r>
+            <a:endParaRPr lang="en-US" sz="1400" dirty="0">
+              <a:solidFill>
+                <a:schemeClr val="bg2"/>
+              </a:solidFill>
+            </a:endParaRPr>
+          </a:p>
+          <a:p>
+            <a:pPr algn="r">
+              <a:spcBef>
+                <a:spcPct val="50000"/>
+              </a:spcBef>
+            </a:pPr>
+            <a:r>
+              <a:rPr lang="en-US" sz="1400" b="1" dirty="0" smtClean="0">
+                <a:solidFill>
+                  <a:schemeClr val="bg2"/>
+                </a:solidFill>
+              </a:rPr>
+              <a:t>September 23, 2008</a:t>
+            </a:r>
+            <a:endParaRPr lang="en-US" sz="1400" b="1" dirty="0">
+              <a:solidFill>
+                <a:schemeClr val="bg2"/>
+              </a:solidFill>
+            </a:endParaRPr>
           </a:p>
         </p:txBody>
       </p:sp>
@@ -3404,11 +3524,7 @@
             <a:pPr lvl="1"/>
             <a:r>
               <a:rPr lang="en-US" dirty="0" smtClean="0"/>
-              <a:t>TJ </a:t>
-            </a:r>
-            <a:r>
-              <a:rPr lang="en-US" dirty="0" smtClean="0"/>
-              <a:t>Andrews</a:t>
+              <a:t>TJ Andrews</a:t>
             </a:r>
           </a:p>
           <a:p>
@@ -5038,19 +5154,7 @@
           <a:p>
             <a:r>
               <a:rPr lang="en-US" sz="1400" dirty="0" smtClean="0"/>
-              <a:t>Process repeated </a:t>
-            </a:r>
-            <a:r>
-              <a:rPr lang="en-US" sz="1400" dirty="0" smtClean="0"/>
-              <a:t>for </a:t>
-            </a:r>
-            <a:r>
-              <a:rPr lang="en-US" sz="1400" dirty="0" smtClean="0"/>
-              <a:t>each project, reusing code and developer </a:t>
-            </a:r>
-            <a:r>
-              <a:rPr lang="en-US" sz="1400" dirty="0" smtClean="0"/>
-              <a:t>expertise</a:t>
+              <a:t>Process repeated for each project, reusing code and developer expertise</a:t>
             </a:r>
             <a:endParaRPr lang="en-US" sz="1400" dirty="0"/>
           </a:p>

</xml_diff>